<commit_message>
Update Kings County HousIng Price Analysis.pptx
</commit_message>
<xml_diff>
--- a/Kings County HousIng Price Analysis.pptx
+++ b/Kings County HousIng Price Analysis.pptx
@@ -6240,6 +6240,90 @@
 </p:notes>
 </file>
 
+<file path=ppt/notesSlides/notesSlide5.xml><?xml version="1.0" encoding="utf-8"?>
+<p:notes xmlns:a="http://schemas.openxmlformats.org/drawingml/2006/main" xmlns:r="http://schemas.openxmlformats.org/officeDocument/2006/relationships" xmlns:p="http://schemas.openxmlformats.org/presentationml/2006/main">
+  <p:cSld>
+    <p:spTree>
+      <p:nvGrpSpPr>
+        <p:cNvPr id="1" name=""/>
+        <p:cNvGrpSpPr/>
+        <p:nvPr/>
+      </p:nvGrpSpPr>
+      <p:grpSpPr>
+        <a:xfrm>
+          <a:off x="0" y="0"/>
+          <a:ext cx="0" cy="0"/>
+          <a:chOff x="0" y="0"/>
+          <a:chExt cx="0" cy="0"/>
+        </a:xfrm>
+      </p:grpSpPr>
+      <p:sp>
+        <p:nvSpPr>
+          <p:cNvPr id="2" name="Slide Image Placeholder 1"/>
+          <p:cNvSpPr>
+            <a:spLocks noGrp="1" noRot="1" noChangeAspect="1"/>
+          </p:cNvSpPr>
+          <p:nvPr>
+            <p:ph type="sldImg"/>
+          </p:nvPr>
+        </p:nvSpPr>
+        <p:spPr/>
+      </p:sp>
+      <p:sp>
+        <p:nvSpPr>
+          <p:cNvPr id="3" name="Notes Placeholder 2"/>
+          <p:cNvSpPr>
+            <a:spLocks noGrp="1"/>
+          </p:cNvSpPr>
+          <p:nvPr>
+            <p:ph type="body" idx="1"/>
+          </p:nvPr>
+        </p:nvSpPr>
+        <p:spPr/>
+        <p:txBody>
+          <a:bodyPr/>
+          <a:lstStyle/>
+          <a:p>
+            <a:endParaRPr lang="en-US"/>
+          </a:p>
+        </p:txBody>
+      </p:sp>
+      <p:sp>
+        <p:nvSpPr>
+          <p:cNvPr id="4" name="Slide Number Placeholder 3"/>
+          <p:cNvSpPr>
+            <a:spLocks noGrp="1"/>
+          </p:cNvSpPr>
+          <p:nvPr>
+            <p:ph type="sldNum" sz="quarter" idx="5"/>
+          </p:nvPr>
+        </p:nvSpPr>
+        <p:spPr/>
+        <p:txBody>
+          <a:bodyPr/>
+          <a:lstStyle/>
+          <a:p>
+            <a:fld id="{7908473F-620A-46E7-939F-1AD0939B3342}" type="slidenum">
+              <a:rPr lang="en-US" smtClean="0"/>
+              <a:t>12</a:t>
+            </a:fld>
+            <a:endParaRPr lang="en-US"/>
+          </a:p>
+        </p:txBody>
+      </p:sp>
+    </p:spTree>
+    <p:extLst>
+      <p:ext uri="{BB962C8B-B14F-4D97-AF65-F5344CB8AC3E}">
+        <p14:creationId xmlns:p14="http://schemas.microsoft.com/office/powerpoint/2010/main" val="1044166909"/>
+      </p:ext>
+    </p:extLst>
+  </p:cSld>
+  <p:clrMapOvr>
+    <a:masterClrMapping/>
+  </p:clrMapOvr>
+</p:notes>
+</file>
+
 <file path=ppt/slideLayouts/slideLayout1.xml><?xml version="1.0" encoding="utf-8"?>
 <p:sldLayout xmlns:a="http://schemas.openxmlformats.org/drawingml/2006/main" xmlns:r="http://schemas.openxmlformats.org/officeDocument/2006/relationships" xmlns:p="http://schemas.openxmlformats.org/presentationml/2006/main" type="title" preserve="1">
   <p:cSld name="Title Slide">
@@ -10754,6 +10838,14 @@
 <file path=ppt/slides/slide12.xml><?xml version="1.0" encoding="utf-8"?>
 <p:sld xmlns:a="http://schemas.openxmlformats.org/drawingml/2006/main" xmlns:r="http://schemas.openxmlformats.org/officeDocument/2006/relationships" xmlns:p="http://schemas.openxmlformats.org/presentationml/2006/main">
   <p:cSld>
+    <p:bg>
+      <p:bgPr>
+        <a:solidFill>
+          <a:schemeClr val="bg1"/>
+        </a:solidFill>
+        <a:effectLst/>
+      </p:bgPr>
+    </p:bg>
     <p:spTree>
       <p:nvGrpSpPr>
         <p:cNvPr id="1" name=""/>
@@ -10768,6 +10860,208 @@
           <a:chExt cx="0" cy="0"/>
         </a:xfrm>
       </p:grpSpPr>
+      <p:sp useBgFill="1">
+        <p:nvSpPr>
+          <p:cNvPr id="71" name="Rectangle 70">
+            <a:extLst>
+              <a:ext uri="{FF2B5EF4-FFF2-40B4-BE49-F238E27FC236}">
+                <a16:creationId xmlns:a16="http://schemas.microsoft.com/office/drawing/2014/main" id="{1C8B38D4-9D92-4608-A16B-260E8CC21335}"/>
+              </a:ext>
+              <a:ext uri="{C183D7F6-B498-43B3-948B-1728B52AA6E4}">
+                <adec:decorative xmlns:adec="http://schemas.microsoft.com/office/drawing/2017/decorative" val="1"/>
+              </a:ext>
+            </a:extLst>
+          </p:cNvPr>
+          <p:cNvSpPr>
+            <a:spLocks noGrp="1" noRot="1" noChangeAspect="1" noMove="1" noResize="1" noEditPoints="1" noAdjustHandles="1" noChangeArrowheads="1" noChangeShapeType="1" noTextEdit="1"/>
+          </p:cNvSpPr>
+          <p:nvPr>
+            <p:extLst>
+              <p:ext uri="{386F3935-93C4-4BCD-93E2-E3B085C9AB24}">
+                <p16:designElem xmlns:p16="http://schemas.microsoft.com/office/powerpoint/2015/main" val="1"/>
+              </p:ext>
+            </p:extLst>
+          </p:nvPr>
+        </p:nvSpPr>
+        <p:spPr>
+          <a:xfrm>
+            <a:off x="0" y="0"/>
+            <a:ext cx="12192000" cy="6858000"/>
+          </a:xfrm>
+          <a:prstGeom prst="rect">
+            <a:avLst/>
+          </a:prstGeom>
+          <a:ln w="12700" cap="flat" cmpd="sng" algn="ctr">
+            <a:noFill/>
+            <a:prstDash val="solid"/>
+            <a:miter lim="800000"/>
+          </a:ln>
+          <a:effectLst/>
+          <a:extLst>
+            <a:ext uri="{91240B29-F687-4F45-9708-019B960494DF}">
+              <a14:hiddenLine xmlns:a14="http://schemas.microsoft.com/office/drawing/2010/main" w="12700" cap="flat" cmpd="sng" algn="ctr">
+                <a:solidFill>
+                  <a:schemeClr val="accent1">
+                    <a:shade val="50000"/>
+                  </a:schemeClr>
+                </a:solidFill>
+                <a:prstDash val="solid"/>
+                <a:miter lim="800000"/>
+              </a14:hiddenLine>
+            </a:ext>
+          </a:extLst>
+        </p:spPr>
+        <p:style>
+          <a:lnRef idx="2">
+            <a:schemeClr val="accent1">
+              <a:shade val="50000"/>
+            </a:schemeClr>
+          </a:lnRef>
+          <a:fillRef idx="1">
+            <a:schemeClr val="accent1"/>
+          </a:fillRef>
+          <a:effectRef idx="0">
+            <a:schemeClr val="accent1"/>
+          </a:effectRef>
+          <a:fontRef idx="minor">
+            <a:schemeClr val="lt1"/>
+          </a:fontRef>
+        </p:style>
+        <p:txBody>
+          <a:bodyPr rtlCol="0" anchor="ctr"/>
+          <a:lstStyle/>
+          <a:p>
+            <a:pPr algn="ctr"/>
+            <a:endParaRPr lang="en-US"/>
+          </a:p>
+        </p:txBody>
+      </p:sp>
+      <p:sp>
+        <p:nvSpPr>
+          <p:cNvPr id="73" name="Rectangle 72">
+            <a:extLst>
+              <a:ext uri="{FF2B5EF4-FFF2-40B4-BE49-F238E27FC236}">
+                <a16:creationId xmlns:a16="http://schemas.microsoft.com/office/drawing/2014/main" id="{771C95FB-D509-408E-A75D-965B400C78E3}"/>
+              </a:ext>
+              <a:ext uri="{C183D7F6-B498-43B3-948B-1728B52AA6E4}">
+                <adec:decorative xmlns:adec="http://schemas.microsoft.com/office/drawing/2017/decorative" val="1"/>
+              </a:ext>
+            </a:extLst>
+          </p:cNvPr>
+          <p:cNvSpPr>
+            <a:spLocks noGrp="1" noRot="1" noChangeAspect="1" noMove="1" noResize="1" noEditPoints="1" noAdjustHandles="1" noChangeArrowheads="1" noChangeShapeType="1" noTextEdit="1"/>
+          </p:cNvSpPr>
+          <p:nvPr>
+            <p:extLst>
+              <p:ext uri="{386F3935-93C4-4BCD-93E2-E3B085C9AB24}">
+                <p16:designElem xmlns:p16="http://schemas.microsoft.com/office/powerpoint/2015/main" val="1"/>
+              </p:ext>
+            </p:extLst>
+          </p:nvPr>
+        </p:nvSpPr>
+        <p:spPr>
+          <a:xfrm>
+            <a:off x="0" y="5768"/>
+            <a:ext cx="6096000" cy="6858000"/>
+          </a:xfrm>
+          <a:prstGeom prst="rect">
+            <a:avLst/>
+          </a:prstGeom>
+          <a:solidFill>
+            <a:schemeClr val="tx1"/>
+          </a:solidFill>
+          <a:ln>
+            <a:noFill/>
+          </a:ln>
+        </p:spPr>
+        <p:style>
+          <a:lnRef idx="2">
+            <a:schemeClr val="accent1">
+              <a:shade val="50000"/>
+            </a:schemeClr>
+          </a:lnRef>
+          <a:fillRef idx="1">
+            <a:schemeClr val="accent1"/>
+          </a:fillRef>
+          <a:effectRef idx="0">
+            <a:schemeClr val="accent1"/>
+          </a:effectRef>
+          <a:fontRef idx="minor">
+            <a:schemeClr val="lt1"/>
+          </a:fontRef>
+        </p:style>
+        <p:txBody>
+          <a:bodyPr rtlCol="0" anchor="ctr"/>
+          <a:lstStyle/>
+          <a:p>
+            <a:pPr algn="ctr"/>
+            <a:endParaRPr lang="en-US"/>
+          </a:p>
+        </p:txBody>
+      </p:sp>
+      <p:sp>
+        <p:nvSpPr>
+          <p:cNvPr id="75" name="Oval 74">
+            <a:extLst>
+              <a:ext uri="{FF2B5EF4-FFF2-40B4-BE49-F238E27FC236}">
+                <a16:creationId xmlns:a16="http://schemas.microsoft.com/office/drawing/2014/main" id="{01A94AE6-0978-4A09-B78E-D60AC484231B}"/>
+              </a:ext>
+              <a:ext uri="{C183D7F6-B498-43B3-948B-1728B52AA6E4}">
+                <adec:decorative xmlns:adec="http://schemas.microsoft.com/office/drawing/2017/decorative" val="1"/>
+              </a:ext>
+            </a:extLst>
+          </p:cNvPr>
+          <p:cNvSpPr>
+            <a:spLocks noGrp="1" noRot="1" noChangeAspect="1" noMove="1" noResize="1" noEditPoints="1" noAdjustHandles="1" noChangeArrowheads="1" noChangeShapeType="1" noTextEdit="1"/>
+          </p:cNvSpPr>
+          <p:nvPr>
+            <p:extLst>
+              <p:ext uri="{386F3935-93C4-4BCD-93E2-E3B085C9AB24}">
+                <p16:designElem xmlns:p16="http://schemas.microsoft.com/office/powerpoint/2015/main" val="1"/>
+              </p:ext>
+            </p:extLst>
+          </p:nvPr>
+        </p:nvSpPr>
+        <p:spPr>
+          <a:xfrm>
+            <a:off x="733197" y="1113411"/>
+            <a:ext cx="4629606" cy="4629606"/>
+          </a:xfrm>
+          <a:prstGeom prst="ellipse">
+            <a:avLst/>
+          </a:prstGeom>
+          <a:solidFill>
+            <a:schemeClr val="bg1"/>
+          </a:solidFill>
+          <a:ln>
+            <a:noFill/>
+          </a:ln>
+        </p:spPr>
+        <p:style>
+          <a:lnRef idx="2">
+            <a:schemeClr val="accent1">
+              <a:shade val="50000"/>
+            </a:schemeClr>
+          </a:lnRef>
+          <a:fillRef idx="1">
+            <a:schemeClr val="accent1"/>
+          </a:fillRef>
+          <a:effectRef idx="0">
+            <a:schemeClr val="accent1"/>
+          </a:effectRef>
+          <a:fontRef idx="minor">
+            <a:schemeClr val="lt1"/>
+          </a:fontRef>
+        </p:style>
+        <p:txBody>
+          <a:bodyPr rtlCol="0" anchor="ctr"/>
+          <a:lstStyle/>
+          <a:p>
+            <a:pPr algn="ctr"/>
+            <a:endParaRPr lang="en-US"/>
+          </a:p>
+        </p:txBody>
+      </p:sp>
       <p:sp>
         <p:nvSpPr>
           <p:cNvPr id="2" name="Title 1">
@@ -10786,21 +11080,189 @@
         </p:nvSpPr>
         <p:spPr>
           <a:xfrm>
-            <a:off x="1476783" y="3000220"/>
-            <a:ext cx="9238434" cy="857559"/>
+            <a:off x="1207828" y="2286000"/>
+            <a:ext cx="3643951" cy="2286000"/>
           </a:xfrm>
         </p:spPr>
         <p:txBody>
-          <a:bodyPr/>
+          <a:bodyPr anchor="ctr">
+            <a:normAutofit/>
+          </a:bodyPr>
           <a:lstStyle/>
           <a:p>
+            <a:pPr algn="ctr"/>
             <a:r>
               <a:rPr lang="en-US" dirty="0"/>
               <a:t>Thank you!</a:t>
             </a:r>
+            <a:endParaRPr lang="en-US"/>
           </a:p>
         </p:txBody>
       </p:sp>
+      <p:grpSp>
+        <p:nvGrpSpPr>
+          <p:cNvPr id="5" name="Group 4">
+            <a:extLst>
+              <a:ext uri="{FF2B5EF4-FFF2-40B4-BE49-F238E27FC236}">
+                <a16:creationId xmlns:a16="http://schemas.microsoft.com/office/drawing/2014/main" id="{0E6E2C79-C17B-4CC0-A849-F3D0865A4BBB}"/>
+              </a:ext>
+            </a:extLst>
+          </p:cNvPr>
+          <p:cNvGrpSpPr/>
+          <p:nvPr/>
+        </p:nvGrpSpPr>
+        <p:grpSpPr>
+          <a:xfrm>
+            <a:off x="6857999" y="1186971"/>
+            <a:ext cx="4543197" cy="4543197"/>
+            <a:chOff x="6096000" y="1661208"/>
+            <a:chExt cx="4762500" cy="4762500"/>
+          </a:xfrm>
+        </p:grpSpPr>
+        <p:pic>
+          <p:nvPicPr>
+            <p:cNvPr id="1026" name="Picture 2" descr="Image of the Copper | Alchemy symbols, Symbols and meanings, Symbols">
+              <a:extLst>
+                <a:ext uri="{FF2B5EF4-FFF2-40B4-BE49-F238E27FC236}">
+                  <a16:creationId xmlns:a16="http://schemas.microsoft.com/office/drawing/2014/main" id="{12292E55-D533-4656-81E3-857E783794D3}"/>
+                </a:ext>
+              </a:extLst>
+            </p:cNvPr>
+            <p:cNvPicPr>
+              <a:picLocks noChangeAspect="1" noChangeArrowheads="1"/>
+            </p:cNvPicPr>
+            <p:nvPr/>
+          </p:nvPicPr>
+          <p:blipFill>
+            <a:blip r:embed="rId3">
+              <a:extLst>
+                <a:ext uri="{28A0092B-C50C-407E-A947-70E740481C1C}">
+                  <a14:useLocalDpi xmlns:a14="http://schemas.microsoft.com/office/drawing/2010/main" val="0"/>
+                </a:ext>
+              </a:extLst>
+            </a:blip>
+            <a:srcRect/>
+            <a:stretch>
+              <a:fillRect/>
+            </a:stretch>
+          </p:blipFill>
+          <p:spPr bwMode="auto">
+            <a:xfrm>
+              <a:off x="6096000" y="1661208"/>
+              <a:ext cx="4762500" cy="4762500"/>
+            </a:xfrm>
+            <a:prstGeom prst="rect">
+              <a:avLst/>
+            </a:prstGeom>
+            <a:noFill/>
+            <a:extLst>
+              <a:ext uri="{909E8E84-426E-40DD-AFC4-6F175D3DCCD1}">
+                <a14:hiddenFill xmlns:a14="http://schemas.microsoft.com/office/drawing/2010/main">
+                  <a:solidFill>
+                    <a:srgbClr val="FFFFFF"/>
+                  </a:solidFill>
+                </a14:hiddenFill>
+              </a:ext>
+            </a:extLst>
+          </p:spPr>
+        </p:pic>
+        <p:sp>
+          <p:nvSpPr>
+            <p:cNvPr id="3" name="TextBox 2">
+              <a:extLst>
+                <a:ext uri="{FF2B5EF4-FFF2-40B4-BE49-F238E27FC236}">
+                  <a16:creationId xmlns:a16="http://schemas.microsoft.com/office/drawing/2014/main" id="{CE5C4F85-46C0-4EAA-845B-AF6190B87CDD}"/>
+                </a:ext>
+              </a:extLst>
+            </p:cNvPr>
+            <p:cNvSpPr txBox="1"/>
+            <p:nvPr/>
+          </p:nvSpPr>
+          <p:spPr>
+            <a:xfrm>
+              <a:off x="7416237" y="1984373"/>
+              <a:ext cx="2534855" cy="646331"/>
+            </a:xfrm>
+            <a:prstGeom prst="rect">
+              <a:avLst/>
+            </a:prstGeom>
+            <a:noFill/>
+          </p:spPr>
+          <p:txBody>
+            <a:bodyPr wrap="square" rtlCol="0">
+              <a:normAutofit/>
+            </a:bodyPr>
+            <a:lstStyle/>
+            <a:p>
+              <a:pPr>
+                <a:lnSpc>
+                  <a:spcPct val="90000"/>
+                </a:lnSpc>
+                <a:spcAft>
+                  <a:spcPts val="600"/>
+                </a:spcAft>
+              </a:pPr>
+              <a:r>
+                <a:rPr lang="en-US" sz="3500" dirty="0">
+                  <a:solidFill>
+                    <a:srgbClr val="EAA032"/>
+                  </a:solidFill>
+                  <a:latin typeface="Arial Black" panose="020B0A04020102020204" pitchFamily="34" charset="0"/>
+                </a:rPr>
+                <a:t>COPPER</a:t>
+              </a:r>
+            </a:p>
+          </p:txBody>
+        </p:sp>
+        <p:sp>
+          <p:nvSpPr>
+            <p:cNvPr id="6" name="TextBox 5">
+              <a:extLst>
+                <a:ext uri="{FF2B5EF4-FFF2-40B4-BE49-F238E27FC236}">
+                  <a16:creationId xmlns:a16="http://schemas.microsoft.com/office/drawing/2014/main" id="{E0F3D04E-9485-4DC1-B0E7-A634A89BDA49}"/>
+                </a:ext>
+              </a:extLst>
+            </p:cNvPr>
+            <p:cNvSpPr txBox="1"/>
+            <p:nvPr/>
+          </p:nvSpPr>
+          <p:spPr>
+            <a:xfrm>
+              <a:off x="6891036" y="5715383"/>
+              <a:ext cx="3585257" cy="646331"/>
+            </a:xfrm>
+            <a:prstGeom prst="rect">
+              <a:avLst/>
+            </a:prstGeom>
+            <a:noFill/>
+          </p:spPr>
+          <p:txBody>
+            <a:bodyPr wrap="square">
+              <a:normAutofit/>
+            </a:bodyPr>
+            <a:lstStyle/>
+            <a:p>
+              <a:pPr>
+                <a:lnSpc>
+                  <a:spcPct val="90000"/>
+                </a:lnSpc>
+                <a:spcAft>
+                  <a:spcPts val="600"/>
+                </a:spcAft>
+              </a:pPr>
+              <a:r>
+                <a:rPr lang="en-US" sz="3100" dirty="0">
+                  <a:solidFill>
+                    <a:srgbClr val="EAA032"/>
+                  </a:solidFill>
+                  <a:latin typeface="Arial Black" panose="020B0A04020102020204" pitchFamily="34" charset="0"/>
+                </a:rPr>
+                <a:t>CONSULTING </a:t>
+              </a:r>
+            </a:p>
+          </p:txBody>
+        </p:sp>
+      </p:grpSp>
     </p:spTree>
     <p:extLst>
       <p:ext uri="{BB962C8B-B14F-4D97-AF65-F5344CB8AC3E}">

</xml_diff>

<commit_message>
Add pdf of presentation deck & updated pwr pt deck
</commit_message>
<xml_diff>
--- a/Kings County HousIng Price Analysis.pptx
+++ b/Kings County HousIng Price Analysis.pptx
@@ -5,14 +5,14 @@
     <p:sldMasterId id="2147483738" r:id="rId1"/>
   </p:sldMasterIdLst>
   <p:notesMasterIdLst>
-    <p:notesMasterId r:id="rId15"/>
+    <p:notesMasterId r:id="rId14"/>
   </p:notesMasterIdLst>
   <p:sldIdLst>
     <p:sldId id="256" r:id="rId2"/>
     <p:sldId id="257" r:id="rId3"/>
     <p:sldId id="258" r:id="rId4"/>
     <p:sldId id="259" r:id="rId5"/>
-    <p:sldId id="264" r:id="rId6"/>
+    <p:sldId id="269" r:id="rId6"/>
     <p:sldId id="260" r:id="rId7"/>
     <p:sldId id="261" r:id="rId8"/>
     <p:sldId id="265" r:id="rId9"/>
@@ -20,7 +20,6 @@
     <p:sldId id="267" r:id="rId11"/>
     <p:sldId id="262" r:id="rId12"/>
     <p:sldId id="268" r:id="rId13"/>
-    <p:sldId id="263" r:id="rId14"/>
   </p:sldIdLst>
   <p:sldSz cx="12192000" cy="6858000"/>
   <p:notesSz cx="6858000" cy="9144000"/>
@@ -1850,8 +1849,8 @@
         <a:lstStyle/>
         <a:p>
           <a:r>
-            <a:rPr lang="en-US"/>
-            <a:t>We want to be able to provide King Country real estate brokers a  viable model that uses house features (e.g. # of bedrooms, square footage) to predict sales price so they can identify properties that will be excellent clients.</a:t>
+            <a:rPr lang="en-US" dirty="0"/>
+            <a:t>Provide modeling by using single family house features for King County</a:t>
           </a:r>
         </a:p>
       </dgm:t>
@@ -1887,7 +1886,7 @@
         <a:p>
           <a:r>
             <a:rPr lang="en-US" dirty="0"/>
-            <a:t>Copper Consulting used linear regression modeling as a framework for analyzing property sales data to find the features with the greatest impact on price and then use those features to predict a property’s sale price</a:t>
+            <a:t>Predict sales price using Linear Regression Modeling </a:t>
           </a:r>
         </a:p>
       </dgm:t>
@@ -1960,7 +1959,7 @@
   <dgm:whole/>
   <dgm:extLst>
     <a:ext uri="http://schemas.microsoft.com/office/drawing/2008/diagram">
-      <dsp:dataModelExt xmlns:dsp="http://schemas.microsoft.com/office/drawing/2008/diagram" relId="rId6" minVer="http://schemas.openxmlformats.org/drawingml/2006/diagram"/>
+      <dsp:dataModelExt xmlns:dsp="http://schemas.microsoft.com/office/drawing/2008/diagram" relId="rId7" minVer="http://schemas.openxmlformats.org/drawingml/2006/diagram"/>
     </a:ext>
   </dgm:extLst>
 </dgm:dataModel>
@@ -1988,8 +1987,16 @@
         <a:lstStyle/>
         <a:p>
           <a:r>
-            <a:rPr lang="en-US"/>
-            <a:t>Model explains 52% of the variance in sales prices for homes in King County</a:t>
+            <a:rPr lang="en-US" dirty="0"/>
+            <a:t>Model explains </a:t>
+          </a:r>
+          <a:r>
+            <a:rPr lang="en-US" b="1" dirty="0"/>
+            <a:t>52</a:t>
+          </a:r>
+          <a:r>
+            <a:rPr lang="en-US" dirty="0"/>
+            <a:t>% of the variance in sales prices for homes in King County</a:t>
           </a:r>
         </a:p>
       </dgm:t>
@@ -2024,8 +2031,16 @@
         <a:lstStyle/>
         <a:p>
           <a:r>
-            <a:rPr lang="en-US"/>
-            <a:t>Square footage : 23%  increase in sales price</a:t>
+            <a:rPr lang="en-US" dirty="0"/>
+            <a:t>Square footage : </a:t>
+          </a:r>
+          <a:r>
+            <a:rPr lang="en-US" b="1" dirty="0"/>
+            <a:t>23</a:t>
+          </a:r>
+          <a:r>
+            <a:rPr lang="en-US" dirty="0"/>
+            <a:t>%  increase in sales price</a:t>
           </a:r>
         </a:p>
       </dgm:t>
@@ -2060,8 +2075,16 @@
         <a:lstStyle/>
         <a:p>
           <a:r>
-            <a:rPr lang="en-US"/>
-            <a:t>Square footage of 15 closest neighbors: 9% increase in sales price </a:t>
+            <a:rPr lang="en-US" dirty="0"/>
+            <a:t>Square footage of 15 closest neighbors: </a:t>
+          </a:r>
+          <a:r>
+            <a:rPr lang="en-US" b="1" dirty="0"/>
+            <a:t>9</a:t>
+          </a:r>
+          <a:r>
+            <a:rPr lang="en-US" dirty="0"/>
+            <a:t>% increase in sales price </a:t>
           </a:r>
         </a:p>
       </dgm:t>
@@ -2096,8 +2119,16 @@
         <a:lstStyle/>
         <a:p>
           <a:r>
-            <a:rPr lang="en-US"/>
-            <a:t>High Grade: 9% increase in sales price</a:t>
+            <a:rPr lang="en-US" dirty="0"/>
+            <a:t>High Grade: </a:t>
+          </a:r>
+          <a:r>
+            <a:rPr lang="en-US" b="1" dirty="0"/>
+            <a:t>9</a:t>
+          </a:r>
+          <a:r>
+            <a:rPr lang="en-US" dirty="0"/>
+            <a:t>% increase in sales price</a:t>
           </a:r>
         </a:p>
       </dgm:t>
@@ -2124,114 +2155,6 @@
         </a:p>
       </dgm:t>
     </dgm:pt>
-    <dgm:pt modelId="{7C080317-214F-46F8-B67F-2CEB7E2451B0}">
-      <dgm:prSet/>
-      <dgm:spPr/>
-      <dgm:t>
-        <a:bodyPr/>
-        <a:lstStyle/>
-        <a:p>
-          <a:r>
-            <a:rPr lang="en-US"/>
-            <a:t>View: 6% increase in sales price </a:t>
-          </a:r>
-        </a:p>
-      </dgm:t>
-    </dgm:pt>
-    <dgm:pt modelId="{5997A507-9210-4C40-A974-E549352BAC8C}" type="parTrans" cxnId="{9562C93F-65D0-48F0-8213-327CC208BB8D}">
-      <dgm:prSet/>
-      <dgm:spPr/>
-      <dgm:t>
-        <a:bodyPr/>
-        <a:lstStyle/>
-        <a:p>
-          <a:endParaRPr lang="en-US"/>
-        </a:p>
-      </dgm:t>
-    </dgm:pt>
-    <dgm:pt modelId="{378CCD4E-A906-4718-928F-FD15E5434DD4}" type="sibTrans" cxnId="{9562C93F-65D0-48F0-8213-327CC208BB8D}">
-      <dgm:prSet/>
-      <dgm:spPr/>
-      <dgm:t>
-        <a:bodyPr/>
-        <a:lstStyle/>
-        <a:p>
-          <a:endParaRPr lang="en-US"/>
-        </a:p>
-      </dgm:t>
-    </dgm:pt>
-    <dgm:pt modelId="{4719C4C9-8D2A-490D-99B0-F5008B71ACD8}">
-      <dgm:prSet/>
-      <dgm:spPr/>
-      <dgm:t>
-        <a:bodyPr/>
-        <a:lstStyle/>
-        <a:p>
-          <a:r>
-            <a:rPr lang="en-US"/>
-            <a:t>Location: 6% decrease in sales price </a:t>
-          </a:r>
-        </a:p>
-      </dgm:t>
-    </dgm:pt>
-    <dgm:pt modelId="{13F6FE4B-5E38-45F0-933F-7039AD9FA35F}" type="parTrans" cxnId="{E339181F-B573-4ADC-B69A-8706D185FA23}">
-      <dgm:prSet/>
-      <dgm:spPr/>
-      <dgm:t>
-        <a:bodyPr/>
-        <a:lstStyle/>
-        <a:p>
-          <a:endParaRPr lang="en-US"/>
-        </a:p>
-      </dgm:t>
-    </dgm:pt>
-    <dgm:pt modelId="{387D8272-27E5-4AE3-923F-0C0F7D5CE328}" type="sibTrans" cxnId="{E339181F-B573-4ADC-B69A-8706D185FA23}">
-      <dgm:prSet/>
-      <dgm:spPr/>
-      <dgm:t>
-        <a:bodyPr/>
-        <a:lstStyle/>
-        <a:p>
-          <a:endParaRPr lang="en-US"/>
-        </a:p>
-      </dgm:t>
-    </dgm:pt>
-    <dgm:pt modelId="{F1C5631A-C990-43D5-913D-A932437F98E4}">
-      <dgm:prSet/>
-      <dgm:spPr/>
-      <dgm:t>
-        <a:bodyPr/>
-        <a:lstStyle/>
-        <a:p>
-          <a:r>
-            <a:rPr lang="en-US"/>
-            <a:t>Number of bedrooms: 4% decrease in sales price </a:t>
-          </a:r>
-        </a:p>
-      </dgm:t>
-    </dgm:pt>
-    <dgm:pt modelId="{6F8DF718-4160-4228-87A5-2D7E5CF837A0}" type="parTrans" cxnId="{7241018E-534D-4C84-BD2F-3472E03B261F}">
-      <dgm:prSet/>
-      <dgm:spPr/>
-      <dgm:t>
-        <a:bodyPr/>
-        <a:lstStyle/>
-        <a:p>
-          <a:endParaRPr lang="en-US"/>
-        </a:p>
-      </dgm:t>
-    </dgm:pt>
-    <dgm:pt modelId="{C1EBE824-93C7-4329-BF24-94933663E729}" type="sibTrans" cxnId="{7241018E-534D-4C84-BD2F-3472E03B261F}">
-      <dgm:prSet/>
-      <dgm:spPr/>
-      <dgm:t>
-        <a:bodyPr/>
-        <a:lstStyle/>
-        <a:p>
-          <a:endParaRPr lang="en-US"/>
-        </a:p>
-      </dgm:t>
-    </dgm:pt>
     <dgm:pt modelId="{1F161DB5-1B03-40C4-875F-D8E7432A9108}" type="pres">
       <dgm:prSet presAssocID="{CC0D51A8-84FA-47A5-B4AC-1884208CD23E}" presName="diagram" presStyleCnt="0">
         <dgm:presLayoutVars>
@@ -2242,7 +2165,7 @@
       <dgm:spPr/>
     </dgm:pt>
     <dgm:pt modelId="{F50C1B5B-A463-458E-9169-1E0B4E70DE50}" type="pres">
-      <dgm:prSet presAssocID="{6514ED29-70CA-4986-A566-6759819CEA40}" presName="node" presStyleLbl="node1" presStyleIdx="0" presStyleCnt="7">
+      <dgm:prSet presAssocID="{6514ED29-70CA-4986-A566-6759819CEA40}" presName="node" presStyleLbl="node1" presStyleIdx="0" presStyleCnt="4">
         <dgm:presLayoutVars>
           <dgm:bulletEnabled val="1"/>
         </dgm:presLayoutVars>
@@ -2254,7 +2177,7 @@
       <dgm:spPr/>
     </dgm:pt>
     <dgm:pt modelId="{E0CA254F-1929-47FC-A750-1A76BDBDD99D}" type="pres">
-      <dgm:prSet presAssocID="{8CA20393-1388-4ED3-A3CE-C2ED0DED043F}" presName="node" presStyleLbl="node1" presStyleIdx="1" presStyleCnt="7">
+      <dgm:prSet presAssocID="{8CA20393-1388-4ED3-A3CE-C2ED0DED043F}" presName="node" presStyleLbl="node1" presStyleIdx="1" presStyleCnt="4">
         <dgm:presLayoutVars>
           <dgm:bulletEnabled val="1"/>
         </dgm:presLayoutVars>
@@ -2266,7 +2189,7 @@
       <dgm:spPr/>
     </dgm:pt>
     <dgm:pt modelId="{C54E3341-C0DA-46C6-B3D1-8CDD50CB76F8}" type="pres">
-      <dgm:prSet presAssocID="{E0AED2EA-F87B-4751-AE50-8C3E7BC676B6}" presName="node" presStyleLbl="node1" presStyleIdx="2" presStyleCnt="7">
+      <dgm:prSet presAssocID="{E0AED2EA-F87B-4751-AE50-8C3E7BC676B6}" presName="node" presStyleLbl="node1" presStyleIdx="2" presStyleCnt="4">
         <dgm:presLayoutVars>
           <dgm:bulletEnabled val="1"/>
         </dgm:presLayoutVars>
@@ -2278,43 +2201,7 @@
       <dgm:spPr/>
     </dgm:pt>
     <dgm:pt modelId="{0E11097B-EEFF-4F93-AC2D-E668ED849B1F}" type="pres">
-      <dgm:prSet presAssocID="{985FCD1B-BFA0-4B6E-AF49-124A5B86CDF4}" presName="node" presStyleLbl="node1" presStyleIdx="3" presStyleCnt="7">
-        <dgm:presLayoutVars>
-          <dgm:bulletEnabled val="1"/>
-        </dgm:presLayoutVars>
-      </dgm:prSet>
-      <dgm:spPr/>
-    </dgm:pt>
-    <dgm:pt modelId="{1F5A0E49-62FB-4C4E-B3C8-35ECA31E5CAD}" type="pres">
-      <dgm:prSet presAssocID="{D7C69975-A24D-4303-8A2B-CC6A6BB5AC84}" presName="sibTrans" presStyleCnt="0"/>
-      <dgm:spPr/>
-    </dgm:pt>
-    <dgm:pt modelId="{35E10768-6196-424C-966F-3E9D894263C7}" type="pres">
-      <dgm:prSet presAssocID="{7C080317-214F-46F8-B67F-2CEB7E2451B0}" presName="node" presStyleLbl="node1" presStyleIdx="4" presStyleCnt="7">
-        <dgm:presLayoutVars>
-          <dgm:bulletEnabled val="1"/>
-        </dgm:presLayoutVars>
-      </dgm:prSet>
-      <dgm:spPr/>
-    </dgm:pt>
-    <dgm:pt modelId="{CAD4BF8F-645D-4B92-97D5-F20926801ED1}" type="pres">
-      <dgm:prSet presAssocID="{378CCD4E-A906-4718-928F-FD15E5434DD4}" presName="sibTrans" presStyleCnt="0"/>
-      <dgm:spPr/>
-    </dgm:pt>
-    <dgm:pt modelId="{64CB6C1E-3AD7-40D7-A3D3-FA40A3895C90}" type="pres">
-      <dgm:prSet presAssocID="{4719C4C9-8D2A-490D-99B0-F5008B71ACD8}" presName="node" presStyleLbl="node1" presStyleIdx="5" presStyleCnt="7">
-        <dgm:presLayoutVars>
-          <dgm:bulletEnabled val="1"/>
-        </dgm:presLayoutVars>
-      </dgm:prSet>
-      <dgm:spPr/>
-    </dgm:pt>
-    <dgm:pt modelId="{7D3BB1E3-7117-403F-8903-A657C3E0D10C}" type="pres">
-      <dgm:prSet presAssocID="{387D8272-27E5-4AE3-923F-0C0F7D5CE328}" presName="sibTrans" presStyleCnt="0"/>
-      <dgm:spPr/>
-    </dgm:pt>
-    <dgm:pt modelId="{DA3C8D6C-0DC3-42E3-A910-AE240D22E303}" type="pres">
-      <dgm:prSet presAssocID="{F1C5631A-C990-43D5-913D-A932437F98E4}" presName="node" presStyleLbl="node1" presStyleIdx="6" presStyleCnt="7">
+      <dgm:prSet presAssocID="{985FCD1B-BFA0-4B6E-AF49-124A5B86CDF4}" presName="node" presStyleLbl="node1" presStyleIdx="3" presStyleCnt="4">
         <dgm:presLayoutVars>
           <dgm:bulletEnabled val="1"/>
         </dgm:presLayoutVars>
@@ -2324,20 +2211,14 @@
   </dgm:ptLst>
   <dgm:cxnLst>
     <dgm:cxn modelId="{3659D911-5B6A-4575-8B5A-176BD62DA648}" srcId="{CC0D51A8-84FA-47A5-B4AC-1884208CD23E}" destId="{E0AED2EA-F87B-4751-AE50-8C3E7BC676B6}" srcOrd="2" destOrd="0" parTransId="{2423C4E4-3007-40DA-B9BB-BB823B72CBC4}" sibTransId="{6AF1B3DD-FB1D-47FD-BD81-F3D2A9EE34B3}"/>
-    <dgm:cxn modelId="{E339181F-B573-4ADC-B69A-8706D185FA23}" srcId="{CC0D51A8-84FA-47A5-B4AC-1884208CD23E}" destId="{4719C4C9-8D2A-490D-99B0-F5008B71ACD8}" srcOrd="5" destOrd="0" parTransId="{13F6FE4B-5E38-45F0-933F-7039AD9FA35F}" sibTransId="{387D8272-27E5-4AE3-923F-0C0F7D5CE328}"/>
     <dgm:cxn modelId="{D553BA20-8668-4088-B8A3-1B6D8C9C967A}" type="presOf" srcId="{E0AED2EA-F87B-4751-AE50-8C3E7BC676B6}" destId="{C54E3341-C0DA-46C6-B3D1-8CDD50CB76F8}" srcOrd="0" destOrd="0" presId="urn:microsoft.com/office/officeart/2005/8/layout/default"/>
-    <dgm:cxn modelId="{ED336E2E-1E81-4738-AAD0-FD5D779CCC2A}" type="presOf" srcId="{F1C5631A-C990-43D5-913D-A932437F98E4}" destId="{DA3C8D6C-0DC3-42E3-A910-AE240D22E303}" srcOrd="0" destOrd="0" presId="urn:microsoft.com/office/officeart/2005/8/layout/default"/>
     <dgm:cxn modelId="{A8954230-E061-4ADD-B4D9-EABE8CCA9BEF}" srcId="{CC0D51A8-84FA-47A5-B4AC-1884208CD23E}" destId="{985FCD1B-BFA0-4B6E-AF49-124A5B86CDF4}" srcOrd="3" destOrd="0" parTransId="{356B8487-3A54-4F81-9CDB-56788B61D14A}" sibTransId="{D7C69975-A24D-4303-8A2B-CC6A6BB5AC84}"/>
-    <dgm:cxn modelId="{9562C93F-65D0-48F0-8213-327CC208BB8D}" srcId="{CC0D51A8-84FA-47A5-B4AC-1884208CD23E}" destId="{7C080317-214F-46F8-B67F-2CEB7E2451B0}" srcOrd="4" destOrd="0" parTransId="{5997A507-9210-4C40-A974-E549352BAC8C}" sibTransId="{378CCD4E-A906-4718-928F-FD15E5434DD4}"/>
     <dgm:cxn modelId="{F7DB5B55-A1E0-4351-AD0F-09F887509E91}" srcId="{CC0D51A8-84FA-47A5-B4AC-1884208CD23E}" destId="{6514ED29-70CA-4986-A566-6759819CEA40}" srcOrd="0" destOrd="0" parTransId="{747534FF-27B1-4E89-9CF8-9B103DCE4C7B}" sibTransId="{3BC15BB4-F4BE-4643-8D46-6542B1E607A6}"/>
     <dgm:cxn modelId="{36F44355-BDE4-45C3-B3DD-152E77E1B8EF}" type="presOf" srcId="{985FCD1B-BFA0-4B6E-AF49-124A5B86CDF4}" destId="{0E11097B-EEFF-4F93-AC2D-E668ED849B1F}" srcOrd="0" destOrd="0" presId="urn:microsoft.com/office/officeart/2005/8/layout/default"/>
-    <dgm:cxn modelId="{7241018E-534D-4C84-BD2F-3472E03B261F}" srcId="{CC0D51A8-84FA-47A5-B4AC-1884208CD23E}" destId="{F1C5631A-C990-43D5-913D-A932437F98E4}" srcOrd="6" destOrd="0" parTransId="{6F8DF718-4160-4228-87A5-2D7E5CF837A0}" sibTransId="{C1EBE824-93C7-4329-BF24-94933663E729}"/>
     <dgm:cxn modelId="{D102059F-3C2C-4D75-80F8-C58ABE142791}" type="presOf" srcId="{8CA20393-1388-4ED3-A3CE-C2ED0DED043F}" destId="{E0CA254F-1929-47FC-A750-1A76BDBDD99D}" srcOrd="0" destOrd="0" presId="urn:microsoft.com/office/officeart/2005/8/layout/default"/>
     <dgm:cxn modelId="{8F5748A4-0DB5-4E8B-B5A3-6EB1B4B0F2AA}" srcId="{CC0D51A8-84FA-47A5-B4AC-1884208CD23E}" destId="{8CA20393-1388-4ED3-A3CE-C2ED0DED043F}" srcOrd="1" destOrd="0" parTransId="{0946E85A-8417-4BEB-9AD9-635792D24ABD}" sibTransId="{3909D81C-7BCF-4BAF-BD0C-FA1B63B69FAB}"/>
-    <dgm:cxn modelId="{D82E98B6-61D1-49DA-9CA8-F332FE5F8661}" type="presOf" srcId="{7C080317-214F-46F8-B67F-2CEB7E2451B0}" destId="{35E10768-6196-424C-966F-3E9D894263C7}" srcOrd="0" destOrd="0" presId="urn:microsoft.com/office/officeart/2005/8/layout/default"/>
     <dgm:cxn modelId="{CCAA5DD0-4E20-41DE-95D1-ECDFCEEFF91C}" type="presOf" srcId="{6514ED29-70CA-4986-A566-6759819CEA40}" destId="{F50C1B5B-A463-458E-9169-1E0B4E70DE50}" srcOrd="0" destOrd="0" presId="urn:microsoft.com/office/officeart/2005/8/layout/default"/>
     <dgm:cxn modelId="{53112ED2-2589-41F3-B708-A58FBB7C8938}" type="presOf" srcId="{CC0D51A8-84FA-47A5-B4AC-1884208CD23E}" destId="{1F161DB5-1B03-40C4-875F-D8E7432A9108}" srcOrd="0" destOrd="0" presId="urn:microsoft.com/office/officeart/2005/8/layout/default"/>
-    <dgm:cxn modelId="{45F986E4-AB30-4A3D-B492-D4D767CDBC97}" type="presOf" srcId="{4719C4C9-8D2A-490D-99B0-F5008B71ACD8}" destId="{64CB6C1E-3AD7-40D7-A3D3-FA40A3895C90}" srcOrd="0" destOrd="0" presId="urn:microsoft.com/office/officeart/2005/8/layout/default"/>
     <dgm:cxn modelId="{EDE8FC73-A907-4344-BF1A-8C4A75A09108}" type="presParOf" srcId="{1F161DB5-1B03-40C4-875F-D8E7432A9108}" destId="{F50C1B5B-A463-458E-9169-1E0B4E70DE50}" srcOrd="0" destOrd="0" presId="urn:microsoft.com/office/officeart/2005/8/layout/default"/>
     <dgm:cxn modelId="{51C060B9-4AB0-43FC-AB66-95AB41F646E0}" type="presParOf" srcId="{1F161DB5-1B03-40C4-875F-D8E7432A9108}" destId="{E6962FBC-1483-4158-A015-EEA65740280F}" srcOrd="1" destOrd="0" presId="urn:microsoft.com/office/officeart/2005/8/layout/default"/>
     <dgm:cxn modelId="{9527766B-72C5-4D3F-B2CA-993CC0ABE662}" type="presParOf" srcId="{1F161DB5-1B03-40C4-875F-D8E7432A9108}" destId="{E0CA254F-1929-47FC-A750-1A76BDBDD99D}" srcOrd="2" destOrd="0" presId="urn:microsoft.com/office/officeart/2005/8/layout/default"/>
@@ -2345,18 +2226,12 @@
     <dgm:cxn modelId="{53337F1B-B986-4A46-8EEC-AFA7FC65D464}" type="presParOf" srcId="{1F161DB5-1B03-40C4-875F-D8E7432A9108}" destId="{C54E3341-C0DA-46C6-B3D1-8CDD50CB76F8}" srcOrd="4" destOrd="0" presId="urn:microsoft.com/office/officeart/2005/8/layout/default"/>
     <dgm:cxn modelId="{CABCB00B-A2AC-4F00-B186-48F4D09A865B}" type="presParOf" srcId="{1F161DB5-1B03-40C4-875F-D8E7432A9108}" destId="{0D66A01C-F5F3-49B1-9151-3A1CD41B10ED}" srcOrd="5" destOrd="0" presId="urn:microsoft.com/office/officeart/2005/8/layout/default"/>
     <dgm:cxn modelId="{1613E60C-4DFE-415B-A77E-89647743850E}" type="presParOf" srcId="{1F161DB5-1B03-40C4-875F-D8E7432A9108}" destId="{0E11097B-EEFF-4F93-AC2D-E668ED849B1F}" srcOrd="6" destOrd="0" presId="urn:microsoft.com/office/officeart/2005/8/layout/default"/>
-    <dgm:cxn modelId="{29404B64-4A64-4C92-B8C9-247CF19EED3F}" type="presParOf" srcId="{1F161DB5-1B03-40C4-875F-D8E7432A9108}" destId="{1F5A0E49-62FB-4C4E-B3C8-35ECA31E5CAD}" srcOrd="7" destOrd="0" presId="urn:microsoft.com/office/officeart/2005/8/layout/default"/>
-    <dgm:cxn modelId="{795853FB-4194-4AE0-B8CD-C0536614864D}" type="presParOf" srcId="{1F161DB5-1B03-40C4-875F-D8E7432A9108}" destId="{35E10768-6196-424C-966F-3E9D894263C7}" srcOrd="8" destOrd="0" presId="urn:microsoft.com/office/officeart/2005/8/layout/default"/>
-    <dgm:cxn modelId="{B3EEEA84-38EC-4DAE-A1E3-4912D71562FF}" type="presParOf" srcId="{1F161DB5-1B03-40C4-875F-D8E7432A9108}" destId="{CAD4BF8F-645D-4B92-97D5-F20926801ED1}" srcOrd="9" destOrd="0" presId="urn:microsoft.com/office/officeart/2005/8/layout/default"/>
-    <dgm:cxn modelId="{AA2240AD-FA57-43D6-A145-55495A37D14F}" type="presParOf" srcId="{1F161DB5-1B03-40C4-875F-D8E7432A9108}" destId="{64CB6C1E-3AD7-40D7-A3D3-FA40A3895C90}" srcOrd="10" destOrd="0" presId="urn:microsoft.com/office/officeart/2005/8/layout/default"/>
-    <dgm:cxn modelId="{191007E3-D5F4-4945-96BA-0B1F9CA91955}" type="presParOf" srcId="{1F161DB5-1B03-40C4-875F-D8E7432A9108}" destId="{7D3BB1E3-7117-403F-8903-A657C3E0D10C}" srcOrd="11" destOrd="0" presId="urn:microsoft.com/office/officeart/2005/8/layout/default"/>
-    <dgm:cxn modelId="{F5A6899C-ACCC-4282-A29D-AC5B0FAC13BF}" type="presParOf" srcId="{1F161DB5-1B03-40C4-875F-D8E7432A9108}" destId="{DA3C8D6C-0DC3-42E3-A910-AE240D22E303}" srcOrd="12" destOrd="0" presId="urn:microsoft.com/office/officeart/2005/8/layout/default"/>
   </dgm:cxnLst>
   <dgm:bg/>
   <dgm:whole/>
   <dgm:extLst>
     <a:ext uri="http://schemas.microsoft.com/office/drawing/2008/diagram">
-      <dsp:dataModelExt xmlns:dsp="http://schemas.microsoft.com/office/drawing/2008/diagram" relId="rId6" minVer="http://schemas.openxmlformats.org/drawingml/2006/diagram"/>
+      <dsp:dataModelExt xmlns:dsp="http://schemas.microsoft.com/office/drawing/2008/diagram" relId="rId7" minVer="http://schemas.openxmlformats.org/drawingml/2006/diagram"/>
     </a:ext>
   </dgm:extLst>
 </dgm:dataModel>
@@ -2377,10 +2252,178 @@
       </dsp:nvSpPr>
       <dsp:spPr>
         <a:xfrm>
-          <a:off x="0" y="373439"/>
-          <a:ext cx="5334000" cy="2260440"/>
+          <a:off x="0" y="59609"/>
+          <a:ext cx="5334000" cy="2554110"/>
         </a:xfrm>
         <a:prstGeom prst="roundRect">
+          <a:avLst/>
+        </a:prstGeom>
+        <a:solidFill>
+          <a:schemeClr val="accent2">
+            <a:hueOff val="0"/>
+            <a:satOff val="0"/>
+            <a:lumOff val="0"/>
+            <a:alphaOff val="0"/>
+          </a:schemeClr>
+        </a:solidFill>
+        <a:ln w="12700" cap="flat" cmpd="sng" algn="ctr">
+          <a:solidFill>
+            <a:schemeClr val="lt1">
+              <a:hueOff val="0"/>
+              <a:satOff val="0"/>
+              <a:lumOff val="0"/>
+              <a:alphaOff val="0"/>
+            </a:schemeClr>
+          </a:solidFill>
+          <a:prstDash val="solid"/>
+          <a:miter lim="800000"/>
+        </a:ln>
+        <a:effectLst/>
+      </dsp:spPr>
+      <dsp:style>
+        <a:lnRef idx="2">
+          <a:scrgbClr r="0" g="0" b="0"/>
+        </a:lnRef>
+        <a:fillRef idx="1">
+          <a:scrgbClr r="0" g="0" b="0"/>
+        </a:fillRef>
+        <a:effectRef idx="0">
+          <a:scrgbClr r="0" g="0" b="0"/>
+        </a:effectRef>
+        <a:fontRef idx="minor">
+          <a:schemeClr val="lt1"/>
+        </a:fontRef>
+      </dsp:style>
+      <dsp:txBody>
+        <a:bodyPr spcFirstLastPara="0" vert="horz" wrap="square" lIns="140970" tIns="140970" rIns="140970" bIns="140970" numCol="1" spcCol="1270" anchor="ctr" anchorCtr="0">
+          <a:noAutofit/>
+        </a:bodyPr>
+        <a:lstStyle/>
+        <a:p>
+          <a:pPr marL="0" lvl="0" indent="0" algn="l" defTabSz="1644650">
+            <a:lnSpc>
+              <a:spcPct val="90000"/>
+            </a:lnSpc>
+            <a:spcBef>
+              <a:spcPct val="0"/>
+            </a:spcBef>
+            <a:spcAft>
+              <a:spcPct val="35000"/>
+            </a:spcAft>
+            <a:buNone/>
+          </a:pPr>
+          <a:r>
+            <a:rPr lang="en-US" sz="3700" kern="1200" dirty="0"/>
+            <a:t>Provide modeling by using single family house features for King County</a:t>
+          </a:r>
+        </a:p>
+      </dsp:txBody>
+      <dsp:txXfrm>
+        <a:off x="124681" y="184290"/>
+        <a:ext cx="5084638" cy="2304748"/>
+      </dsp:txXfrm>
+    </dsp:sp>
+    <dsp:sp modelId="{FAA3BD0F-D636-4F02-924E-9BAD5E7757D8}">
+      <dsp:nvSpPr>
+        <dsp:cNvPr id="0" name=""/>
+        <dsp:cNvSpPr/>
+      </dsp:nvSpPr>
+      <dsp:spPr>
+        <a:xfrm>
+          <a:off x="0" y="2720279"/>
+          <a:ext cx="5334000" cy="2554110"/>
+        </a:xfrm>
+        <a:prstGeom prst="roundRect">
+          <a:avLst/>
+        </a:prstGeom>
+        <a:solidFill>
+          <a:schemeClr val="accent2">
+            <a:hueOff val="1500016"/>
+            <a:satOff val="-428"/>
+            <a:lumOff val="7059"/>
+            <a:alphaOff val="0"/>
+          </a:schemeClr>
+        </a:solidFill>
+        <a:ln w="12700" cap="flat" cmpd="sng" algn="ctr">
+          <a:solidFill>
+            <a:schemeClr val="lt1">
+              <a:hueOff val="0"/>
+              <a:satOff val="0"/>
+              <a:lumOff val="0"/>
+              <a:alphaOff val="0"/>
+            </a:schemeClr>
+          </a:solidFill>
+          <a:prstDash val="solid"/>
+          <a:miter lim="800000"/>
+        </a:ln>
+        <a:effectLst/>
+      </dsp:spPr>
+      <dsp:style>
+        <a:lnRef idx="2">
+          <a:scrgbClr r="0" g="0" b="0"/>
+        </a:lnRef>
+        <a:fillRef idx="1">
+          <a:scrgbClr r="0" g="0" b="0"/>
+        </a:fillRef>
+        <a:effectRef idx="0">
+          <a:scrgbClr r="0" g="0" b="0"/>
+        </a:effectRef>
+        <a:fontRef idx="minor">
+          <a:schemeClr val="lt1"/>
+        </a:fontRef>
+      </dsp:style>
+      <dsp:txBody>
+        <a:bodyPr spcFirstLastPara="0" vert="horz" wrap="square" lIns="140970" tIns="140970" rIns="140970" bIns="140970" numCol="1" spcCol="1270" anchor="ctr" anchorCtr="0">
+          <a:noAutofit/>
+        </a:bodyPr>
+        <a:lstStyle/>
+        <a:p>
+          <a:pPr marL="0" lvl="0" indent="0" algn="l" defTabSz="1644650">
+            <a:lnSpc>
+              <a:spcPct val="90000"/>
+            </a:lnSpc>
+            <a:spcBef>
+              <a:spcPct val="0"/>
+            </a:spcBef>
+            <a:spcAft>
+              <a:spcPct val="35000"/>
+            </a:spcAft>
+            <a:buNone/>
+          </a:pPr>
+          <a:r>
+            <a:rPr lang="en-US" sz="3700" kern="1200" dirty="0"/>
+            <a:t>Predict sales price using Linear Regression Modeling </a:t>
+          </a:r>
+        </a:p>
+      </dsp:txBody>
+      <dsp:txXfrm>
+        <a:off x="124681" y="2844960"/>
+        <a:ext cx="5084638" cy="2304748"/>
+      </dsp:txXfrm>
+    </dsp:sp>
+  </dsp:spTree>
+</dsp:drawing>
+</file>
+
+<file path=ppt/diagrams/drawing2.xml><?xml version="1.0" encoding="utf-8"?>
+<dsp:drawing xmlns:dgm="http://schemas.openxmlformats.org/drawingml/2006/diagram" xmlns:dsp="http://schemas.microsoft.com/office/drawing/2008/diagram" xmlns:a="http://schemas.openxmlformats.org/drawingml/2006/main">
+  <dsp:spTree>
+    <dsp:nvGrpSpPr>
+      <dsp:cNvPr id="0" name=""/>
+      <dsp:cNvGrpSpPr/>
+    </dsp:nvGrpSpPr>
+    <dsp:grpSpPr/>
+    <dsp:sp modelId="{F50C1B5B-A463-458E-9169-1E0B4E70DE50}">
+      <dsp:nvSpPr>
+        <dsp:cNvPr id="0" name=""/>
+        <dsp:cNvSpPr/>
+      </dsp:nvSpPr>
+      <dsp:spPr>
+        <a:xfrm>
+          <a:off x="1545098" y="2213"/>
+          <a:ext cx="2927364" cy="1756418"/>
+        </a:xfrm>
+        <a:prstGeom prst="rect">
           <a:avLst/>
         </a:prstGeom>
         <a:solidFill>
@@ -2425,85 +2468,7 @@
         </a:bodyPr>
         <a:lstStyle/>
         <a:p>
-          <a:pPr marL="0" lvl="0" indent="0" algn="l" defTabSz="1022350">
-            <a:lnSpc>
-              <a:spcPct val="90000"/>
-            </a:lnSpc>
-            <a:spcBef>
-              <a:spcPct val="0"/>
-            </a:spcBef>
-            <a:spcAft>
-              <a:spcPct val="35000"/>
-            </a:spcAft>
-            <a:buNone/>
-          </a:pPr>
-          <a:r>
-            <a:rPr lang="en-US" sz="2300" kern="1200"/>
-            <a:t>We want to be able to provide King Country real estate brokers a  viable model that uses house features (e.g. # of bedrooms, square footage) to predict sales price so they can identify properties that will be excellent clients.</a:t>
-          </a:r>
-        </a:p>
-      </dsp:txBody>
-      <dsp:txXfrm>
-        <a:off x="110346" y="483785"/>
-        <a:ext cx="5113308" cy="2039748"/>
-      </dsp:txXfrm>
-    </dsp:sp>
-    <dsp:sp modelId="{FAA3BD0F-D636-4F02-924E-9BAD5E7757D8}">
-      <dsp:nvSpPr>
-        <dsp:cNvPr id="0" name=""/>
-        <dsp:cNvSpPr/>
-      </dsp:nvSpPr>
-      <dsp:spPr>
-        <a:xfrm>
-          <a:off x="0" y="2700119"/>
-          <a:ext cx="5334000" cy="2260440"/>
-        </a:xfrm>
-        <a:prstGeom prst="roundRect">
-          <a:avLst/>
-        </a:prstGeom>
-        <a:solidFill>
-          <a:schemeClr val="accent2">
-            <a:hueOff val="1500016"/>
-            <a:satOff val="-428"/>
-            <a:lumOff val="7059"/>
-            <a:alphaOff val="0"/>
-          </a:schemeClr>
-        </a:solidFill>
-        <a:ln w="12700" cap="flat" cmpd="sng" algn="ctr">
-          <a:solidFill>
-            <a:schemeClr val="lt1">
-              <a:hueOff val="0"/>
-              <a:satOff val="0"/>
-              <a:lumOff val="0"/>
-              <a:alphaOff val="0"/>
-            </a:schemeClr>
-          </a:solidFill>
-          <a:prstDash val="solid"/>
-          <a:miter lim="800000"/>
-        </a:ln>
-        <a:effectLst/>
-      </dsp:spPr>
-      <dsp:style>
-        <a:lnRef idx="2">
-          <a:scrgbClr r="0" g="0" b="0"/>
-        </a:lnRef>
-        <a:fillRef idx="1">
-          <a:scrgbClr r="0" g="0" b="0"/>
-        </a:fillRef>
-        <a:effectRef idx="0">
-          <a:scrgbClr r="0" g="0" b="0"/>
-        </a:effectRef>
-        <a:fontRef idx="minor">
-          <a:schemeClr val="lt1"/>
-        </a:fontRef>
-      </dsp:style>
-      <dsp:txBody>
-        <a:bodyPr spcFirstLastPara="0" vert="horz" wrap="square" lIns="87630" tIns="87630" rIns="87630" bIns="87630" numCol="1" spcCol="1270" anchor="ctr" anchorCtr="0">
-          <a:noAutofit/>
-        </a:bodyPr>
-        <a:lstStyle/>
-        <a:p>
-          <a:pPr marL="0" lvl="0" indent="0" algn="l" defTabSz="1022350">
+          <a:pPr marL="0" lvl="0" indent="0" algn="ctr" defTabSz="1022350">
             <a:lnSpc>
               <a:spcPct val="90000"/>
             </a:lnSpc>
@@ -2517,103 +2482,21 @@
           </a:pPr>
           <a:r>
             <a:rPr lang="en-US" sz="2300" kern="1200" dirty="0"/>
-            <a:t>Copper Consulting used linear regression modeling as a framework for analyzing property sales data to find the features with the greatest impact on price and then use those features to predict a property’s sale price</a:t>
+            <a:t>Model explains </a:t>
+          </a:r>
+          <a:r>
+            <a:rPr lang="en-US" sz="2300" b="1" kern="1200" dirty="0"/>
+            <a:t>52</a:t>
+          </a:r>
+          <a:r>
+            <a:rPr lang="en-US" sz="2300" kern="1200" dirty="0"/>
+            <a:t>% of the variance in sales prices for homes in King County</a:t>
           </a:r>
         </a:p>
       </dsp:txBody>
       <dsp:txXfrm>
-        <a:off x="110346" y="2810465"/>
-        <a:ext cx="5113308" cy="2039748"/>
-      </dsp:txXfrm>
-    </dsp:sp>
-  </dsp:spTree>
-</dsp:drawing>
-</file>
-
-<file path=ppt/diagrams/drawing2.xml><?xml version="1.0" encoding="utf-8"?>
-<dsp:drawing xmlns:dgm="http://schemas.openxmlformats.org/drawingml/2006/diagram" xmlns:dsp="http://schemas.microsoft.com/office/drawing/2008/diagram" xmlns:a="http://schemas.openxmlformats.org/drawingml/2006/main">
-  <dsp:spTree>
-    <dsp:nvGrpSpPr>
-      <dsp:cNvPr id="0" name=""/>
-      <dsp:cNvGrpSpPr/>
-    </dsp:nvGrpSpPr>
-    <dsp:grpSpPr/>
-    <dsp:sp modelId="{F50C1B5B-A463-458E-9169-1E0B4E70DE50}">
-      <dsp:nvSpPr>
-        <dsp:cNvPr id="0" name=""/>
-        <dsp:cNvSpPr/>
-      </dsp:nvSpPr>
-      <dsp:spPr>
-        <a:xfrm>
-          <a:off x="2706" y="509427"/>
-          <a:ext cx="2147034" cy="1288220"/>
-        </a:xfrm>
-        <a:prstGeom prst="rect">
-          <a:avLst/>
-        </a:prstGeom>
-        <a:solidFill>
-          <a:schemeClr val="accent2">
-            <a:hueOff val="0"/>
-            <a:satOff val="0"/>
-            <a:lumOff val="0"/>
-            <a:alphaOff val="0"/>
-          </a:schemeClr>
-        </a:solidFill>
-        <a:ln w="12700" cap="flat" cmpd="sng" algn="ctr">
-          <a:solidFill>
-            <a:schemeClr val="lt1">
-              <a:hueOff val="0"/>
-              <a:satOff val="0"/>
-              <a:lumOff val="0"/>
-              <a:alphaOff val="0"/>
-            </a:schemeClr>
-          </a:solidFill>
-          <a:prstDash val="solid"/>
-          <a:miter lim="800000"/>
-        </a:ln>
-        <a:effectLst/>
-      </dsp:spPr>
-      <dsp:style>
-        <a:lnRef idx="2">
-          <a:scrgbClr r="0" g="0" b="0"/>
-        </a:lnRef>
-        <a:fillRef idx="1">
-          <a:scrgbClr r="0" g="0" b="0"/>
-        </a:fillRef>
-        <a:effectRef idx="0">
-          <a:scrgbClr r="0" g="0" b="0"/>
-        </a:effectRef>
-        <a:fontRef idx="minor">
-          <a:schemeClr val="lt1"/>
-        </a:fontRef>
-      </dsp:style>
-      <dsp:txBody>
-        <a:bodyPr spcFirstLastPara="0" vert="horz" wrap="square" lIns="64770" tIns="64770" rIns="64770" bIns="64770" numCol="1" spcCol="1270" anchor="ctr" anchorCtr="0">
-          <a:noAutofit/>
-        </a:bodyPr>
-        <a:lstStyle/>
-        <a:p>
-          <a:pPr marL="0" lvl="0" indent="0" algn="ctr" defTabSz="755650">
-            <a:lnSpc>
-              <a:spcPct val="90000"/>
-            </a:lnSpc>
-            <a:spcBef>
-              <a:spcPct val="0"/>
-            </a:spcBef>
-            <a:spcAft>
-              <a:spcPct val="35000"/>
-            </a:spcAft>
-            <a:buNone/>
-          </a:pPr>
-          <a:r>
-            <a:rPr lang="en-US" sz="1700" kern="1200"/>
-            <a:t>Model explains 52% of the variance in sales prices for homes in King County</a:t>
-          </a:r>
-        </a:p>
-      </dsp:txBody>
-      <dsp:txXfrm>
-        <a:off x="2706" y="509427"/>
-        <a:ext cx="2147034" cy="1288220"/>
+        <a:off x="1545098" y="2213"/>
+        <a:ext cx="2927364" cy="1756418"/>
       </dsp:txXfrm>
     </dsp:sp>
     <dsp:sp modelId="{E0CA254F-1929-47FC-A750-1A76BDBDD99D}">
@@ -2623,8 +2506,8 @@
       </dsp:nvSpPr>
       <dsp:spPr>
         <a:xfrm>
-          <a:off x="2364444" y="509427"/>
-          <a:ext cx="2147034" cy="1288220"/>
+          <a:off x="4765199" y="2213"/>
+          <a:ext cx="2927364" cy="1756418"/>
         </a:xfrm>
         <a:prstGeom prst="rect">
           <a:avLst/>
@@ -2666,12 +2549,12 @@
         </a:fontRef>
       </dsp:style>
       <dsp:txBody>
-        <a:bodyPr spcFirstLastPara="0" vert="horz" wrap="square" lIns="64770" tIns="64770" rIns="64770" bIns="64770" numCol="1" spcCol="1270" anchor="ctr" anchorCtr="0">
+        <a:bodyPr spcFirstLastPara="0" vert="horz" wrap="square" lIns="87630" tIns="87630" rIns="87630" bIns="87630" numCol="1" spcCol="1270" anchor="ctr" anchorCtr="0">
           <a:noAutofit/>
         </a:bodyPr>
         <a:lstStyle/>
         <a:p>
-          <a:pPr marL="0" lvl="0" indent="0" algn="ctr" defTabSz="755650">
+          <a:pPr marL="0" lvl="0" indent="0" algn="ctr" defTabSz="1022350">
             <a:lnSpc>
               <a:spcPct val="90000"/>
             </a:lnSpc>
@@ -2684,14 +2567,22 @@
             <a:buNone/>
           </a:pPr>
           <a:r>
-            <a:rPr lang="en-US" sz="1700" kern="1200"/>
-            <a:t>Square footage : 23%  increase in sales price</a:t>
+            <a:rPr lang="en-US" sz="2300" kern="1200" dirty="0"/>
+            <a:t>Square footage : </a:t>
+          </a:r>
+          <a:r>
+            <a:rPr lang="en-US" sz="2300" b="1" kern="1200" dirty="0"/>
+            <a:t>23</a:t>
+          </a:r>
+          <a:r>
+            <a:rPr lang="en-US" sz="2300" kern="1200" dirty="0"/>
+            <a:t>%  increase in sales price</a:t>
           </a:r>
         </a:p>
       </dsp:txBody>
       <dsp:txXfrm>
-        <a:off x="2364444" y="509427"/>
-        <a:ext cx="2147034" cy="1288220"/>
+        <a:off x="4765199" y="2213"/>
+        <a:ext cx="2927364" cy="1756418"/>
       </dsp:txXfrm>
     </dsp:sp>
     <dsp:sp modelId="{C54E3341-C0DA-46C6-B3D1-8CDD50CB76F8}">
@@ -2701,8 +2592,8 @@
       </dsp:nvSpPr>
       <dsp:spPr>
         <a:xfrm>
-          <a:off x="4726182" y="509427"/>
-          <a:ext cx="2147034" cy="1288220"/>
+          <a:off x="1545098" y="2051368"/>
+          <a:ext cx="2927364" cy="1756418"/>
         </a:xfrm>
         <a:prstGeom prst="rect">
           <a:avLst/>
@@ -2744,12 +2635,12 @@
         </a:fontRef>
       </dsp:style>
       <dsp:txBody>
-        <a:bodyPr spcFirstLastPara="0" vert="horz" wrap="square" lIns="64770" tIns="64770" rIns="64770" bIns="64770" numCol="1" spcCol="1270" anchor="ctr" anchorCtr="0">
+        <a:bodyPr spcFirstLastPara="0" vert="horz" wrap="square" lIns="87630" tIns="87630" rIns="87630" bIns="87630" numCol="1" spcCol="1270" anchor="ctr" anchorCtr="0">
           <a:noAutofit/>
         </a:bodyPr>
         <a:lstStyle/>
         <a:p>
-          <a:pPr marL="0" lvl="0" indent="0" algn="ctr" defTabSz="755650">
+          <a:pPr marL="0" lvl="0" indent="0" algn="ctr" defTabSz="1022350">
             <a:lnSpc>
               <a:spcPct val="90000"/>
             </a:lnSpc>
@@ -2762,14 +2653,22 @@
             <a:buNone/>
           </a:pPr>
           <a:r>
-            <a:rPr lang="en-US" sz="1700" kern="1200"/>
-            <a:t>Square footage of 15 closest neighbors: 9% increase in sales price </a:t>
+            <a:rPr lang="en-US" sz="2300" kern="1200" dirty="0"/>
+            <a:t>Square footage of 15 closest neighbors: </a:t>
+          </a:r>
+          <a:r>
+            <a:rPr lang="en-US" sz="2300" b="1" kern="1200" dirty="0"/>
+            <a:t>9</a:t>
+          </a:r>
+          <a:r>
+            <a:rPr lang="en-US" sz="2300" kern="1200" dirty="0"/>
+            <a:t>% increase in sales price </a:t>
           </a:r>
         </a:p>
       </dsp:txBody>
       <dsp:txXfrm>
-        <a:off x="4726182" y="509427"/>
-        <a:ext cx="2147034" cy="1288220"/>
+        <a:off x="1545098" y="2051368"/>
+        <a:ext cx="2927364" cy="1756418"/>
       </dsp:txXfrm>
     </dsp:sp>
     <dsp:sp modelId="{0E11097B-EEFF-4F93-AC2D-E668ED849B1F}">
@@ -2779,8 +2678,8 @@
       </dsp:nvSpPr>
       <dsp:spPr>
         <a:xfrm>
-          <a:off x="7087920" y="509427"/>
-          <a:ext cx="2147034" cy="1288220"/>
+          <a:off x="4765199" y="2051368"/>
+          <a:ext cx="2927364" cy="1756418"/>
         </a:xfrm>
         <a:prstGeom prst="rect">
           <a:avLst/>
@@ -2822,12 +2721,12 @@
         </a:fontRef>
       </dsp:style>
       <dsp:txBody>
-        <a:bodyPr spcFirstLastPara="0" vert="horz" wrap="square" lIns="64770" tIns="64770" rIns="64770" bIns="64770" numCol="1" spcCol="1270" anchor="ctr" anchorCtr="0">
+        <a:bodyPr spcFirstLastPara="0" vert="horz" wrap="square" lIns="87630" tIns="87630" rIns="87630" bIns="87630" numCol="1" spcCol="1270" anchor="ctr" anchorCtr="0">
           <a:noAutofit/>
         </a:bodyPr>
         <a:lstStyle/>
         <a:p>
-          <a:pPr marL="0" lvl="0" indent="0" algn="ctr" defTabSz="755650">
+          <a:pPr marL="0" lvl="0" indent="0" algn="ctr" defTabSz="1022350">
             <a:lnSpc>
               <a:spcPct val="90000"/>
             </a:lnSpc>
@@ -2840,248 +2739,22 @@
             <a:buNone/>
           </a:pPr>
           <a:r>
-            <a:rPr lang="en-US" sz="1700" kern="1200"/>
-            <a:t>High Grade: 9% increase in sales price</a:t>
+            <a:rPr lang="en-US" sz="2300" kern="1200" dirty="0"/>
+            <a:t>High Grade: </a:t>
+          </a:r>
+          <a:r>
+            <a:rPr lang="en-US" sz="2300" b="1" kern="1200" dirty="0"/>
+            <a:t>9</a:t>
+          </a:r>
+          <a:r>
+            <a:rPr lang="en-US" sz="2300" kern="1200" dirty="0"/>
+            <a:t>% increase in sales price</a:t>
           </a:r>
         </a:p>
       </dsp:txBody>
       <dsp:txXfrm>
-        <a:off x="7087920" y="509427"/>
-        <a:ext cx="2147034" cy="1288220"/>
-      </dsp:txXfrm>
-    </dsp:sp>
-    <dsp:sp modelId="{35E10768-6196-424C-966F-3E9D894263C7}">
-      <dsp:nvSpPr>
-        <dsp:cNvPr id="0" name=""/>
-        <dsp:cNvSpPr/>
-      </dsp:nvSpPr>
-      <dsp:spPr>
-        <a:xfrm>
-          <a:off x="1183575" y="2012351"/>
-          <a:ext cx="2147034" cy="1288220"/>
-        </a:xfrm>
-        <a:prstGeom prst="rect">
-          <a:avLst/>
-        </a:prstGeom>
-        <a:solidFill>
-          <a:schemeClr val="accent6">
-            <a:hueOff val="0"/>
-            <a:satOff val="0"/>
-            <a:lumOff val="0"/>
-            <a:alphaOff val="0"/>
-          </a:schemeClr>
-        </a:solidFill>
-        <a:ln w="12700" cap="flat" cmpd="sng" algn="ctr">
-          <a:solidFill>
-            <a:schemeClr val="lt1">
-              <a:hueOff val="0"/>
-              <a:satOff val="0"/>
-              <a:lumOff val="0"/>
-              <a:alphaOff val="0"/>
-            </a:schemeClr>
-          </a:solidFill>
-          <a:prstDash val="solid"/>
-          <a:miter lim="800000"/>
-        </a:ln>
-        <a:effectLst/>
-      </dsp:spPr>
-      <dsp:style>
-        <a:lnRef idx="2">
-          <a:scrgbClr r="0" g="0" b="0"/>
-        </a:lnRef>
-        <a:fillRef idx="1">
-          <a:scrgbClr r="0" g="0" b="0"/>
-        </a:fillRef>
-        <a:effectRef idx="0">
-          <a:scrgbClr r="0" g="0" b="0"/>
-        </a:effectRef>
-        <a:fontRef idx="minor">
-          <a:schemeClr val="lt1"/>
-        </a:fontRef>
-      </dsp:style>
-      <dsp:txBody>
-        <a:bodyPr spcFirstLastPara="0" vert="horz" wrap="square" lIns="64770" tIns="64770" rIns="64770" bIns="64770" numCol="1" spcCol="1270" anchor="ctr" anchorCtr="0">
-          <a:noAutofit/>
-        </a:bodyPr>
-        <a:lstStyle/>
-        <a:p>
-          <a:pPr marL="0" lvl="0" indent="0" algn="ctr" defTabSz="755650">
-            <a:lnSpc>
-              <a:spcPct val="90000"/>
-            </a:lnSpc>
-            <a:spcBef>
-              <a:spcPct val="0"/>
-            </a:spcBef>
-            <a:spcAft>
-              <a:spcPct val="35000"/>
-            </a:spcAft>
-            <a:buNone/>
-          </a:pPr>
-          <a:r>
-            <a:rPr lang="en-US" sz="1700" kern="1200"/>
-            <a:t>View: 6% increase in sales price </a:t>
-          </a:r>
-        </a:p>
-      </dsp:txBody>
-      <dsp:txXfrm>
-        <a:off x="1183575" y="2012351"/>
-        <a:ext cx="2147034" cy="1288220"/>
-      </dsp:txXfrm>
-    </dsp:sp>
-    <dsp:sp modelId="{64CB6C1E-3AD7-40D7-A3D3-FA40A3895C90}">
-      <dsp:nvSpPr>
-        <dsp:cNvPr id="0" name=""/>
-        <dsp:cNvSpPr/>
-      </dsp:nvSpPr>
-      <dsp:spPr>
-        <a:xfrm>
-          <a:off x="3545313" y="2012351"/>
-          <a:ext cx="2147034" cy="1288220"/>
-        </a:xfrm>
-        <a:prstGeom prst="rect">
-          <a:avLst/>
-        </a:prstGeom>
-        <a:solidFill>
-          <a:schemeClr val="accent2">
-            <a:hueOff val="0"/>
-            <a:satOff val="0"/>
-            <a:lumOff val="0"/>
-            <a:alphaOff val="0"/>
-          </a:schemeClr>
-        </a:solidFill>
-        <a:ln w="12700" cap="flat" cmpd="sng" algn="ctr">
-          <a:solidFill>
-            <a:schemeClr val="lt1">
-              <a:hueOff val="0"/>
-              <a:satOff val="0"/>
-              <a:lumOff val="0"/>
-              <a:alphaOff val="0"/>
-            </a:schemeClr>
-          </a:solidFill>
-          <a:prstDash val="solid"/>
-          <a:miter lim="800000"/>
-        </a:ln>
-        <a:effectLst/>
-      </dsp:spPr>
-      <dsp:style>
-        <a:lnRef idx="2">
-          <a:scrgbClr r="0" g="0" b="0"/>
-        </a:lnRef>
-        <a:fillRef idx="1">
-          <a:scrgbClr r="0" g="0" b="0"/>
-        </a:fillRef>
-        <a:effectRef idx="0">
-          <a:scrgbClr r="0" g="0" b="0"/>
-        </a:effectRef>
-        <a:fontRef idx="minor">
-          <a:schemeClr val="lt1"/>
-        </a:fontRef>
-      </dsp:style>
-      <dsp:txBody>
-        <a:bodyPr spcFirstLastPara="0" vert="horz" wrap="square" lIns="64770" tIns="64770" rIns="64770" bIns="64770" numCol="1" spcCol="1270" anchor="ctr" anchorCtr="0">
-          <a:noAutofit/>
-        </a:bodyPr>
-        <a:lstStyle/>
-        <a:p>
-          <a:pPr marL="0" lvl="0" indent="0" algn="ctr" defTabSz="755650">
-            <a:lnSpc>
-              <a:spcPct val="90000"/>
-            </a:lnSpc>
-            <a:spcBef>
-              <a:spcPct val="0"/>
-            </a:spcBef>
-            <a:spcAft>
-              <a:spcPct val="35000"/>
-            </a:spcAft>
-            <a:buNone/>
-          </a:pPr>
-          <a:r>
-            <a:rPr lang="en-US" sz="1700" kern="1200"/>
-            <a:t>Location: 6% decrease in sales price </a:t>
-          </a:r>
-        </a:p>
-      </dsp:txBody>
-      <dsp:txXfrm>
-        <a:off x="3545313" y="2012351"/>
-        <a:ext cx="2147034" cy="1288220"/>
-      </dsp:txXfrm>
-    </dsp:sp>
-    <dsp:sp modelId="{DA3C8D6C-0DC3-42E3-A910-AE240D22E303}">
-      <dsp:nvSpPr>
-        <dsp:cNvPr id="0" name=""/>
-        <dsp:cNvSpPr/>
-      </dsp:nvSpPr>
-      <dsp:spPr>
-        <a:xfrm>
-          <a:off x="5907051" y="2012351"/>
-          <a:ext cx="2147034" cy="1288220"/>
-        </a:xfrm>
-        <a:prstGeom prst="rect">
-          <a:avLst/>
-        </a:prstGeom>
-        <a:solidFill>
-          <a:schemeClr val="accent3">
-            <a:hueOff val="0"/>
-            <a:satOff val="0"/>
-            <a:lumOff val="0"/>
-            <a:alphaOff val="0"/>
-          </a:schemeClr>
-        </a:solidFill>
-        <a:ln w="12700" cap="flat" cmpd="sng" algn="ctr">
-          <a:solidFill>
-            <a:schemeClr val="lt1">
-              <a:hueOff val="0"/>
-              <a:satOff val="0"/>
-              <a:lumOff val="0"/>
-              <a:alphaOff val="0"/>
-            </a:schemeClr>
-          </a:solidFill>
-          <a:prstDash val="solid"/>
-          <a:miter lim="800000"/>
-        </a:ln>
-        <a:effectLst/>
-      </dsp:spPr>
-      <dsp:style>
-        <a:lnRef idx="2">
-          <a:scrgbClr r="0" g="0" b="0"/>
-        </a:lnRef>
-        <a:fillRef idx="1">
-          <a:scrgbClr r="0" g="0" b="0"/>
-        </a:fillRef>
-        <a:effectRef idx="0">
-          <a:scrgbClr r="0" g="0" b="0"/>
-        </a:effectRef>
-        <a:fontRef idx="minor">
-          <a:schemeClr val="lt1"/>
-        </a:fontRef>
-      </dsp:style>
-      <dsp:txBody>
-        <a:bodyPr spcFirstLastPara="0" vert="horz" wrap="square" lIns="64770" tIns="64770" rIns="64770" bIns="64770" numCol="1" spcCol="1270" anchor="ctr" anchorCtr="0">
-          <a:noAutofit/>
-        </a:bodyPr>
-        <a:lstStyle/>
-        <a:p>
-          <a:pPr marL="0" lvl="0" indent="0" algn="ctr" defTabSz="755650">
-            <a:lnSpc>
-              <a:spcPct val="90000"/>
-            </a:lnSpc>
-            <a:spcBef>
-              <a:spcPct val="0"/>
-            </a:spcBef>
-            <a:spcAft>
-              <a:spcPct val="35000"/>
-            </a:spcAft>
-            <a:buNone/>
-          </a:pPr>
-          <a:r>
-            <a:rPr lang="en-US" sz="1700" kern="1200"/>
-            <a:t>Number of bedrooms: 4% decrease in sales price </a:t>
-          </a:r>
-        </a:p>
-      </dsp:txBody>
-      <dsp:txXfrm>
-        <a:off x="5907051" y="2012351"/>
-        <a:ext cx="2147034" cy="1288220"/>
+        <a:off x="4765199" y="2051368"/>
+        <a:ext cx="2927364" cy="1756418"/>
       </dsp:txXfrm>
     </dsp:sp>
   </dsp:spTree>
@@ -5865,84 +5538,17 @@
           <a:p>
             <a:r>
               <a:rPr lang="en-US" dirty="0"/>
-              <a:t>Bigger is better! </a:t>
+              <a:t>Alex M</a:t>
             </a:r>
           </a:p>
           <a:p>
-            <a:pPr lvl="1"/>
+            <a:endParaRPr lang="en-US" dirty="0"/>
+          </a:p>
+          <a:p>
             <a:r>
               <a:rPr lang="en-US" dirty="0"/>
-              <a:t>The larger a property’s square footage, the more a house will sell for</a:t>
+              <a:t>Alex D</a:t>
             </a:r>
-          </a:p>
-          <a:p>
-            <a:r>
-              <a:rPr lang="en-US" dirty="0"/>
-              <a:t>… but More isn’t necessarily</a:t>
-            </a:r>
-          </a:p>
-          <a:p>
-            <a:pPr lvl="1"/>
-            <a:r>
-              <a:rPr lang="en-US" dirty="0"/>
-              <a:t>More bedrooms will bring down the price of a house</a:t>
-            </a:r>
-          </a:p>
-          <a:p>
-            <a:r>
-              <a:rPr lang="en-US" dirty="0"/>
-              <a:t>Location! Location! Location! </a:t>
-            </a:r>
-          </a:p>
-          <a:p>
-            <a:pPr lvl="1"/>
-            <a:r>
-              <a:rPr lang="en-US" dirty="0"/>
-              <a:t>A house located close to points of interest (schools, hospitals, </a:t>
-            </a:r>
-            <a:r>
-              <a:rPr lang="en-US" dirty="0" err="1"/>
-              <a:t>etc</a:t>
-            </a:r>
-            <a:r>
-              <a:rPr lang="en-US" dirty="0"/>
-              <a:t>) will sell for more</a:t>
-            </a:r>
-          </a:p>
-          <a:p>
-            <a:pPr lvl="1"/>
-            <a:r>
-              <a:rPr lang="en-US" dirty="0"/>
-              <a:t>A house with a good view  will sell for more</a:t>
-            </a:r>
-          </a:p>
-          <a:p>
-            <a:pPr lvl="1"/>
-            <a:r>
-              <a:rPr lang="en-US" dirty="0"/>
-              <a:t>Sqftg_living15 – the bigger the houses around you, the price goes up</a:t>
-            </a:r>
-          </a:p>
-          <a:p>
-            <a:r>
-              <a:rPr lang="en-US" dirty="0"/>
-              <a:t>Grades count!</a:t>
-            </a:r>
-          </a:p>
-          <a:p>
-            <a:r>
-              <a:rPr lang="en-US" dirty="0"/>
-              <a:t>            Grade 9,10,11 – Better, Very Good. Excellent =&gt; increase in price if house in this cat</a:t>
-            </a:r>
-          </a:p>
-          <a:p>
-            <a:r>
-              <a:rPr lang="en-US" dirty="0"/>
-              <a:t>	Condition – Good, Very Good =&gt; Increase in price if house in this cat, </a:t>
-            </a:r>
-          </a:p>
-          <a:p>
-            <a:endParaRPr lang="en-US" dirty="0"/>
           </a:p>
         </p:txBody>
       </p:sp>
@@ -5963,7 +5569,7 @@
           <a:p>
             <a:fld id="{7908473F-620A-46E7-939F-1AD0939B3342}" type="slidenum">
               <a:rPr lang="en-US" smtClean="0"/>
-              <a:t>3</a:t>
+              <a:t>2</a:t>
             </a:fld>
             <a:endParaRPr lang="en-US"/>
           </a:p>
@@ -5972,7 +5578,178 @@
     </p:spTree>
     <p:extLst>
       <p:ext uri="{BB962C8B-B14F-4D97-AF65-F5344CB8AC3E}">
-        <p14:creationId xmlns:p14="http://schemas.microsoft.com/office/powerpoint/2010/main" val="1072579159"/>
+        <p14:creationId xmlns:p14="http://schemas.microsoft.com/office/powerpoint/2010/main" val="2952180285"/>
+      </p:ext>
+    </p:extLst>
+  </p:cSld>
+  <p:clrMapOvr>
+    <a:masterClrMapping/>
+  </p:clrMapOvr>
+</p:notes>
+</file>
+
+<file path=ppt/notesSlides/notesSlide10.xml><?xml version="1.0" encoding="utf-8"?>
+<p:notes xmlns:a="http://schemas.openxmlformats.org/drawingml/2006/main" xmlns:r="http://schemas.openxmlformats.org/officeDocument/2006/relationships" xmlns:p="http://schemas.openxmlformats.org/presentationml/2006/main">
+  <p:cSld>
+    <p:spTree>
+      <p:nvGrpSpPr>
+        <p:cNvPr id="1" name=""/>
+        <p:cNvGrpSpPr/>
+        <p:nvPr/>
+      </p:nvGrpSpPr>
+      <p:grpSpPr>
+        <a:xfrm>
+          <a:off x="0" y="0"/>
+          <a:ext cx="0" cy="0"/>
+          <a:chOff x="0" y="0"/>
+          <a:chExt cx="0" cy="0"/>
+        </a:xfrm>
+      </p:grpSpPr>
+      <p:sp>
+        <p:nvSpPr>
+          <p:cNvPr id="2" name="Slide Image Placeholder 1"/>
+          <p:cNvSpPr>
+            <a:spLocks noGrp="1" noRot="1" noChangeAspect="1"/>
+          </p:cNvSpPr>
+          <p:nvPr>
+            <p:ph type="sldImg"/>
+          </p:nvPr>
+        </p:nvSpPr>
+        <p:spPr/>
+      </p:sp>
+      <p:sp>
+        <p:nvSpPr>
+          <p:cNvPr id="3" name="Notes Placeholder 2"/>
+          <p:cNvSpPr>
+            <a:spLocks noGrp="1"/>
+          </p:cNvSpPr>
+          <p:nvPr>
+            <p:ph type="body" idx="1"/>
+          </p:nvPr>
+        </p:nvSpPr>
+        <p:spPr/>
+        <p:txBody>
+          <a:bodyPr/>
+          <a:lstStyle/>
+          <a:p>
+            <a:r>
+              <a:rPr lang="en-US" dirty="0"/>
+              <a:t>Alex M</a:t>
+            </a:r>
+          </a:p>
+        </p:txBody>
+      </p:sp>
+      <p:sp>
+        <p:nvSpPr>
+          <p:cNvPr id="4" name="Slide Number Placeholder 3"/>
+          <p:cNvSpPr>
+            <a:spLocks noGrp="1"/>
+          </p:cNvSpPr>
+          <p:nvPr>
+            <p:ph type="sldNum" sz="quarter" idx="5"/>
+          </p:nvPr>
+        </p:nvSpPr>
+        <p:spPr/>
+        <p:txBody>
+          <a:bodyPr/>
+          <a:lstStyle/>
+          <a:p>
+            <a:fld id="{7908473F-620A-46E7-939F-1AD0939B3342}" type="slidenum">
+              <a:rPr lang="en-US" smtClean="0"/>
+              <a:t>11</a:t>
+            </a:fld>
+            <a:endParaRPr lang="en-US"/>
+          </a:p>
+        </p:txBody>
+      </p:sp>
+    </p:spTree>
+    <p:extLst>
+      <p:ext uri="{BB962C8B-B14F-4D97-AF65-F5344CB8AC3E}">
+        <p14:creationId xmlns:p14="http://schemas.microsoft.com/office/powerpoint/2010/main" val="1949708796"/>
+      </p:ext>
+    </p:extLst>
+  </p:cSld>
+  <p:clrMapOvr>
+    <a:masterClrMapping/>
+  </p:clrMapOvr>
+</p:notes>
+</file>
+
+<file path=ppt/notesSlides/notesSlide11.xml><?xml version="1.0" encoding="utf-8"?>
+<p:notes xmlns:a="http://schemas.openxmlformats.org/drawingml/2006/main" xmlns:r="http://schemas.openxmlformats.org/officeDocument/2006/relationships" xmlns:p="http://schemas.openxmlformats.org/presentationml/2006/main">
+  <p:cSld>
+    <p:spTree>
+      <p:nvGrpSpPr>
+        <p:cNvPr id="1" name=""/>
+        <p:cNvGrpSpPr/>
+        <p:nvPr/>
+      </p:nvGrpSpPr>
+      <p:grpSpPr>
+        <a:xfrm>
+          <a:off x="0" y="0"/>
+          <a:ext cx="0" cy="0"/>
+          <a:chOff x="0" y="0"/>
+          <a:chExt cx="0" cy="0"/>
+        </a:xfrm>
+      </p:grpSpPr>
+      <p:sp>
+        <p:nvSpPr>
+          <p:cNvPr id="2" name="Slide Image Placeholder 1"/>
+          <p:cNvSpPr>
+            <a:spLocks noGrp="1" noRot="1" noChangeAspect="1"/>
+          </p:cNvSpPr>
+          <p:nvPr>
+            <p:ph type="sldImg"/>
+          </p:nvPr>
+        </p:nvSpPr>
+        <p:spPr/>
+      </p:sp>
+      <p:sp>
+        <p:nvSpPr>
+          <p:cNvPr id="3" name="Notes Placeholder 2"/>
+          <p:cNvSpPr>
+            <a:spLocks noGrp="1"/>
+          </p:cNvSpPr>
+          <p:nvPr>
+            <p:ph type="body" idx="1"/>
+          </p:nvPr>
+        </p:nvSpPr>
+        <p:spPr/>
+        <p:txBody>
+          <a:bodyPr/>
+          <a:lstStyle/>
+          <a:p>
+            <a:endParaRPr lang="en-US"/>
+          </a:p>
+        </p:txBody>
+      </p:sp>
+      <p:sp>
+        <p:nvSpPr>
+          <p:cNvPr id="4" name="Slide Number Placeholder 3"/>
+          <p:cNvSpPr>
+            <a:spLocks noGrp="1"/>
+          </p:cNvSpPr>
+          <p:nvPr>
+            <p:ph type="sldNum" sz="quarter" idx="5"/>
+          </p:nvPr>
+        </p:nvSpPr>
+        <p:spPr/>
+        <p:txBody>
+          <a:bodyPr/>
+          <a:lstStyle/>
+          <a:p>
+            <a:fld id="{7908473F-620A-46E7-939F-1AD0939B3342}" type="slidenum">
+              <a:rPr lang="en-US" smtClean="0"/>
+              <a:t>12</a:t>
+            </a:fld>
+            <a:endParaRPr lang="en-US"/>
+          </a:p>
+        </p:txBody>
+      </p:sp>
+    </p:spTree>
+    <p:extLst>
+      <p:ext uri="{BB962C8B-B14F-4D97-AF65-F5344CB8AC3E}">
+        <p14:creationId xmlns:p14="http://schemas.microsoft.com/office/powerpoint/2010/main" val="1044166909"/>
       </p:ext>
     </p:extLst>
   </p:cSld>
@@ -6026,6 +5803,95 @@
           <a:bodyPr/>
           <a:lstStyle/>
           <a:p>
+            <a:r>
+              <a:rPr lang="en-US" dirty="0" err="1"/>
+              <a:t>AlexM</a:t>
+            </a:r>
+            <a:r>
+              <a:rPr lang="en-US" dirty="0"/>
+              <a:t>/ Alex D</a:t>
+            </a:r>
+          </a:p>
+          <a:p>
+            <a:r>
+              <a:rPr lang="en-US" dirty="0"/>
+              <a:t>Bigger is better! </a:t>
+            </a:r>
+          </a:p>
+          <a:p>
+            <a:pPr lvl="1"/>
+            <a:r>
+              <a:rPr lang="en-US" dirty="0"/>
+              <a:t>The larger a property’s square footage, the more a house will sell for</a:t>
+            </a:r>
+          </a:p>
+          <a:p>
+            <a:r>
+              <a:rPr lang="en-US" dirty="0"/>
+              <a:t>… but More isn’t necessarily</a:t>
+            </a:r>
+          </a:p>
+          <a:p>
+            <a:pPr lvl="1"/>
+            <a:r>
+              <a:rPr lang="en-US" dirty="0"/>
+              <a:t>More bedrooms will bring down the price of a house</a:t>
+            </a:r>
+          </a:p>
+          <a:p>
+            <a:r>
+              <a:rPr lang="en-US" dirty="0"/>
+              <a:t>Location! Location! Location! </a:t>
+            </a:r>
+          </a:p>
+          <a:p>
+            <a:pPr lvl="1"/>
+            <a:r>
+              <a:rPr lang="en-US" dirty="0"/>
+              <a:t>A house located close to points of interest (schools, hospitals, </a:t>
+            </a:r>
+            <a:r>
+              <a:rPr lang="en-US" dirty="0" err="1"/>
+              <a:t>etc</a:t>
+            </a:r>
+            <a:r>
+              <a:rPr lang="en-US" dirty="0"/>
+              <a:t>) will sell for more</a:t>
+            </a:r>
+          </a:p>
+          <a:p>
+            <a:pPr lvl="1"/>
+            <a:r>
+              <a:rPr lang="en-US" dirty="0"/>
+              <a:t>A house with a good view  will sell for more</a:t>
+            </a:r>
+          </a:p>
+          <a:p>
+            <a:pPr lvl="1"/>
+            <a:r>
+              <a:rPr lang="en-US" dirty="0"/>
+              <a:t>Sqftg_living15 – the bigger the houses around you, the price goes up</a:t>
+            </a:r>
+          </a:p>
+          <a:p>
+            <a:r>
+              <a:rPr lang="en-US" dirty="0"/>
+              <a:t>Grades count!</a:t>
+            </a:r>
+          </a:p>
+          <a:p>
+            <a:r>
+              <a:rPr lang="en-US" dirty="0"/>
+              <a:t>            Grade 9,10,11 – Better, Very Good. Excellent =&gt; increase in price if house in this cat</a:t>
+            </a:r>
+          </a:p>
+          <a:p>
+            <a:r>
+              <a:rPr lang="en-US" dirty="0"/>
+              <a:t>	Condition – Good, Very Good =&gt; Increase in price if house in this cat, </a:t>
+            </a:r>
+          </a:p>
+          <a:p>
             <a:endParaRPr lang="en-US" dirty="0"/>
           </a:p>
         </p:txBody>
@@ -6047,7 +5913,7 @@
           <a:p>
             <a:fld id="{7908473F-620A-46E7-939F-1AD0939B3342}" type="slidenum">
               <a:rPr lang="en-US" smtClean="0"/>
-              <a:t>4</a:t>
+              <a:t>3</a:t>
             </a:fld>
             <a:endParaRPr lang="en-US"/>
           </a:p>
@@ -6056,7 +5922,7 @@
     </p:spTree>
     <p:extLst>
       <p:ext uri="{BB962C8B-B14F-4D97-AF65-F5344CB8AC3E}">
-        <p14:creationId xmlns:p14="http://schemas.microsoft.com/office/powerpoint/2010/main" val="2293795253"/>
+        <p14:creationId xmlns:p14="http://schemas.microsoft.com/office/powerpoint/2010/main" val="1072579159"/>
       </p:ext>
     </p:extLst>
   </p:cSld>
@@ -6112,7 +5978,7 @@
           <a:p>
             <a:r>
               <a:rPr lang="en-US" dirty="0"/>
-              <a:t>Engineering the feature, confirming viability </a:t>
+              <a:t>Alex M/Alex D</a:t>
             </a:r>
           </a:p>
         </p:txBody>
@@ -6134,7 +6000,7 @@
           <a:p>
             <a:fld id="{7908473F-620A-46E7-939F-1AD0939B3342}" type="slidenum">
               <a:rPr lang="en-US" smtClean="0"/>
-              <a:t>7</a:t>
+              <a:t>4</a:t>
             </a:fld>
             <a:endParaRPr lang="en-US"/>
           </a:p>
@@ -6143,7 +6009,7 @@
     </p:spTree>
     <p:extLst>
       <p:ext uri="{BB962C8B-B14F-4D97-AF65-F5344CB8AC3E}">
-        <p14:creationId xmlns:p14="http://schemas.microsoft.com/office/powerpoint/2010/main" val="1747988218"/>
+        <p14:creationId xmlns:p14="http://schemas.microsoft.com/office/powerpoint/2010/main" val="2293795253"/>
       </p:ext>
     </p:extLst>
   </p:cSld>
@@ -6199,7 +6065,7 @@
           <a:p>
             <a:r>
               <a:rPr lang="en-US" dirty="0"/>
-              <a:t>Engineering the feature, confirming viability </a:t>
+              <a:t>Scott S</a:t>
             </a:r>
           </a:p>
         </p:txBody>
@@ -6221,7 +6087,7 @@
           <a:p>
             <a:fld id="{7908473F-620A-46E7-939F-1AD0939B3342}" type="slidenum">
               <a:rPr lang="en-US" smtClean="0"/>
-              <a:t>8</a:t>
+              <a:t>5</a:t>
             </a:fld>
             <a:endParaRPr lang="en-US"/>
           </a:p>
@@ -6230,7 +6096,7 @@
     </p:spTree>
     <p:extLst>
       <p:ext uri="{BB962C8B-B14F-4D97-AF65-F5344CB8AC3E}">
-        <p14:creationId xmlns:p14="http://schemas.microsoft.com/office/powerpoint/2010/main" val="750104532"/>
+        <p14:creationId xmlns:p14="http://schemas.microsoft.com/office/powerpoint/2010/main" val="214429018"/>
       </p:ext>
     </p:extLst>
   </p:cSld>
@@ -6284,7 +6150,10 @@
           <a:bodyPr/>
           <a:lstStyle/>
           <a:p>
-            <a:endParaRPr lang="en-US"/>
+            <a:r>
+              <a:rPr lang="en-US" dirty="0"/>
+              <a:t>Scott S</a:t>
+            </a:r>
           </a:p>
         </p:txBody>
       </p:sp>
@@ -6305,7 +6174,7 @@
           <a:p>
             <a:fld id="{7908473F-620A-46E7-939F-1AD0939B3342}" type="slidenum">
               <a:rPr lang="en-US" smtClean="0"/>
-              <a:t>12</a:t>
+              <a:t>6</a:t>
             </a:fld>
             <a:endParaRPr lang="en-US"/>
           </a:p>
@@ -6314,7 +6183,367 @@
     </p:spTree>
     <p:extLst>
       <p:ext uri="{BB962C8B-B14F-4D97-AF65-F5344CB8AC3E}">
-        <p14:creationId xmlns:p14="http://schemas.microsoft.com/office/powerpoint/2010/main" val="1044166909"/>
+        <p14:creationId xmlns:p14="http://schemas.microsoft.com/office/powerpoint/2010/main" val="4143536979"/>
+      </p:ext>
+    </p:extLst>
+  </p:cSld>
+  <p:clrMapOvr>
+    <a:masterClrMapping/>
+  </p:clrMapOvr>
+</p:notes>
+</file>
+
+<file path=ppt/notesSlides/notesSlide6.xml><?xml version="1.0" encoding="utf-8"?>
+<p:notes xmlns:a="http://schemas.openxmlformats.org/drawingml/2006/main" xmlns:r="http://schemas.openxmlformats.org/officeDocument/2006/relationships" xmlns:p="http://schemas.openxmlformats.org/presentationml/2006/main">
+  <p:cSld>
+    <p:spTree>
+      <p:nvGrpSpPr>
+        <p:cNvPr id="1" name=""/>
+        <p:cNvGrpSpPr/>
+        <p:nvPr/>
+      </p:nvGrpSpPr>
+      <p:grpSpPr>
+        <a:xfrm>
+          <a:off x="0" y="0"/>
+          <a:ext cx="0" cy="0"/>
+          <a:chOff x="0" y="0"/>
+          <a:chExt cx="0" cy="0"/>
+        </a:xfrm>
+      </p:grpSpPr>
+      <p:sp>
+        <p:nvSpPr>
+          <p:cNvPr id="2" name="Slide Image Placeholder 1"/>
+          <p:cNvSpPr>
+            <a:spLocks noGrp="1" noRot="1" noChangeAspect="1"/>
+          </p:cNvSpPr>
+          <p:nvPr>
+            <p:ph type="sldImg"/>
+          </p:nvPr>
+        </p:nvSpPr>
+        <p:spPr/>
+      </p:sp>
+      <p:sp>
+        <p:nvSpPr>
+          <p:cNvPr id="3" name="Notes Placeholder 2"/>
+          <p:cNvSpPr>
+            <a:spLocks noGrp="1"/>
+          </p:cNvSpPr>
+          <p:nvPr>
+            <p:ph type="body" idx="1"/>
+          </p:nvPr>
+        </p:nvSpPr>
+        <p:spPr/>
+        <p:txBody>
+          <a:bodyPr/>
+          <a:lstStyle/>
+          <a:p>
+            <a:r>
+              <a:rPr lang="en-US" dirty="0"/>
+              <a:t>Alex M</a:t>
+            </a:r>
+          </a:p>
+          <a:p>
+            <a:r>
+              <a:rPr lang="en-US" dirty="0"/>
+              <a:t>Engineering the feature, confirming viability </a:t>
+            </a:r>
+          </a:p>
+        </p:txBody>
+      </p:sp>
+      <p:sp>
+        <p:nvSpPr>
+          <p:cNvPr id="4" name="Slide Number Placeholder 3"/>
+          <p:cNvSpPr>
+            <a:spLocks noGrp="1"/>
+          </p:cNvSpPr>
+          <p:nvPr>
+            <p:ph type="sldNum" sz="quarter" idx="5"/>
+          </p:nvPr>
+        </p:nvSpPr>
+        <p:spPr/>
+        <p:txBody>
+          <a:bodyPr/>
+          <a:lstStyle/>
+          <a:p>
+            <a:fld id="{7908473F-620A-46E7-939F-1AD0939B3342}" type="slidenum">
+              <a:rPr lang="en-US" smtClean="0"/>
+              <a:t>7</a:t>
+            </a:fld>
+            <a:endParaRPr lang="en-US"/>
+          </a:p>
+        </p:txBody>
+      </p:sp>
+    </p:spTree>
+    <p:extLst>
+      <p:ext uri="{BB962C8B-B14F-4D97-AF65-F5344CB8AC3E}">
+        <p14:creationId xmlns:p14="http://schemas.microsoft.com/office/powerpoint/2010/main" val="1747988218"/>
+      </p:ext>
+    </p:extLst>
+  </p:cSld>
+  <p:clrMapOvr>
+    <a:masterClrMapping/>
+  </p:clrMapOvr>
+</p:notes>
+</file>
+
+<file path=ppt/notesSlides/notesSlide7.xml><?xml version="1.0" encoding="utf-8"?>
+<p:notes xmlns:a="http://schemas.openxmlformats.org/drawingml/2006/main" xmlns:r="http://schemas.openxmlformats.org/officeDocument/2006/relationships" xmlns:p="http://schemas.openxmlformats.org/presentationml/2006/main">
+  <p:cSld>
+    <p:spTree>
+      <p:nvGrpSpPr>
+        <p:cNvPr id="1" name=""/>
+        <p:cNvGrpSpPr/>
+        <p:nvPr/>
+      </p:nvGrpSpPr>
+      <p:grpSpPr>
+        <a:xfrm>
+          <a:off x="0" y="0"/>
+          <a:ext cx="0" cy="0"/>
+          <a:chOff x="0" y="0"/>
+          <a:chExt cx="0" cy="0"/>
+        </a:xfrm>
+      </p:grpSpPr>
+      <p:sp>
+        <p:nvSpPr>
+          <p:cNvPr id="2" name="Slide Image Placeholder 1"/>
+          <p:cNvSpPr>
+            <a:spLocks noGrp="1" noRot="1" noChangeAspect="1"/>
+          </p:cNvSpPr>
+          <p:nvPr>
+            <p:ph type="sldImg"/>
+          </p:nvPr>
+        </p:nvSpPr>
+        <p:spPr/>
+      </p:sp>
+      <p:sp>
+        <p:nvSpPr>
+          <p:cNvPr id="3" name="Notes Placeholder 2"/>
+          <p:cNvSpPr>
+            <a:spLocks noGrp="1"/>
+          </p:cNvSpPr>
+          <p:nvPr>
+            <p:ph type="body" idx="1"/>
+          </p:nvPr>
+        </p:nvSpPr>
+        <p:spPr/>
+        <p:txBody>
+          <a:bodyPr/>
+          <a:lstStyle/>
+          <a:p>
+            <a:r>
+              <a:rPr lang="en-US" dirty="0"/>
+              <a:t>Scott S</a:t>
+            </a:r>
+          </a:p>
+          <a:p>
+            <a:r>
+              <a:rPr lang="en-US" dirty="0"/>
+              <a:t>Engineering the feature, confirming viability </a:t>
+            </a:r>
+          </a:p>
+        </p:txBody>
+      </p:sp>
+      <p:sp>
+        <p:nvSpPr>
+          <p:cNvPr id="4" name="Slide Number Placeholder 3"/>
+          <p:cNvSpPr>
+            <a:spLocks noGrp="1"/>
+          </p:cNvSpPr>
+          <p:nvPr>
+            <p:ph type="sldNum" sz="quarter" idx="5"/>
+          </p:nvPr>
+        </p:nvSpPr>
+        <p:spPr/>
+        <p:txBody>
+          <a:bodyPr/>
+          <a:lstStyle/>
+          <a:p>
+            <a:fld id="{7908473F-620A-46E7-939F-1AD0939B3342}" type="slidenum">
+              <a:rPr lang="en-US" smtClean="0"/>
+              <a:t>8</a:t>
+            </a:fld>
+            <a:endParaRPr lang="en-US"/>
+          </a:p>
+        </p:txBody>
+      </p:sp>
+    </p:spTree>
+    <p:extLst>
+      <p:ext uri="{BB962C8B-B14F-4D97-AF65-F5344CB8AC3E}">
+        <p14:creationId xmlns:p14="http://schemas.microsoft.com/office/powerpoint/2010/main" val="750104532"/>
+      </p:ext>
+    </p:extLst>
+  </p:cSld>
+  <p:clrMapOvr>
+    <a:masterClrMapping/>
+  </p:clrMapOvr>
+</p:notes>
+</file>
+
+<file path=ppt/notesSlides/notesSlide8.xml><?xml version="1.0" encoding="utf-8"?>
+<p:notes xmlns:a="http://schemas.openxmlformats.org/drawingml/2006/main" xmlns:r="http://schemas.openxmlformats.org/officeDocument/2006/relationships" xmlns:p="http://schemas.openxmlformats.org/presentationml/2006/main">
+  <p:cSld>
+    <p:spTree>
+      <p:nvGrpSpPr>
+        <p:cNvPr id="1" name=""/>
+        <p:cNvGrpSpPr/>
+        <p:nvPr/>
+      </p:nvGrpSpPr>
+      <p:grpSpPr>
+        <a:xfrm>
+          <a:off x="0" y="0"/>
+          <a:ext cx="0" cy="0"/>
+          <a:chOff x="0" y="0"/>
+          <a:chExt cx="0" cy="0"/>
+        </a:xfrm>
+      </p:grpSpPr>
+      <p:sp>
+        <p:nvSpPr>
+          <p:cNvPr id="2" name="Slide Image Placeholder 1"/>
+          <p:cNvSpPr>
+            <a:spLocks noGrp="1" noRot="1" noChangeAspect="1"/>
+          </p:cNvSpPr>
+          <p:nvPr>
+            <p:ph type="sldImg"/>
+          </p:nvPr>
+        </p:nvSpPr>
+        <p:spPr/>
+      </p:sp>
+      <p:sp>
+        <p:nvSpPr>
+          <p:cNvPr id="3" name="Notes Placeholder 2"/>
+          <p:cNvSpPr>
+            <a:spLocks noGrp="1"/>
+          </p:cNvSpPr>
+          <p:nvPr>
+            <p:ph type="body" idx="1"/>
+          </p:nvPr>
+        </p:nvSpPr>
+        <p:spPr/>
+        <p:txBody>
+          <a:bodyPr/>
+          <a:lstStyle/>
+          <a:p>
+            <a:r>
+              <a:rPr lang="en-US" dirty="0"/>
+              <a:t>Scott S</a:t>
+            </a:r>
+          </a:p>
+        </p:txBody>
+      </p:sp>
+      <p:sp>
+        <p:nvSpPr>
+          <p:cNvPr id="4" name="Slide Number Placeholder 3"/>
+          <p:cNvSpPr>
+            <a:spLocks noGrp="1"/>
+          </p:cNvSpPr>
+          <p:nvPr>
+            <p:ph type="sldNum" sz="quarter" idx="5"/>
+          </p:nvPr>
+        </p:nvSpPr>
+        <p:spPr/>
+        <p:txBody>
+          <a:bodyPr/>
+          <a:lstStyle/>
+          <a:p>
+            <a:fld id="{7908473F-620A-46E7-939F-1AD0939B3342}" type="slidenum">
+              <a:rPr lang="en-US" smtClean="0"/>
+              <a:t>9</a:t>
+            </a:fld>
+            <a:endParaRPr lang="en-US"/>
+          </a:p>
+        </p:txBody>
+      </p:sp>
+    </p:spTree>
+    <p:extLst>
+      <p:ext uri="{BB962C8B-B14F-4D97-AF65-F5344CB8AC3E}">
+        <p14:creationId xmlns:p14="http://schemas.microsoft.com/office/powerpoint/2010/main" val="1273570546"/>
+      </p:ext>
+    </p:extLst>
+  </p:cSld>
+  <p:clrMapOvr>
+    <a:masterClrMapping/>
+  </p:clrMapOvr>
+</p:notes>
+</file>
+
+<file path=ppt/notesSlides/notesSlide9.xml><?xml version="1.0" encoding="utf-8"?>
+<p:notes xmlns:a="http://schemas.openxmlformats.org/drawingml/2006/main" xmlns:r="http://schemas.openxmlformats.org/officeDocument/2006/relationships" xmlns:p="http://schemas.openxmlformats.org/presentationml/2006/main">
+  <p:cSld>
+    <p:spTree>
+      <p:nvGrpSpPr>
+        <p:cNvPr id="1" name=""/>
+        <p:cNvGrpSpPr/>
+        <p:nvPr/>
+      </p:nvGrpSpPr>
+      <p:grpSpPr>
+        <a:xfrm>
+          <a:off x="0" y="0"/>
+          <a:ext cx="0" cy="0"/>
+          <a:chOff x="0" y="0"/>
+          <a:chExt cx="0" cy="0"/>
+        </a:xfrm>
+      </p:grpSpPr>
+      <p:sp>
+        <p:nvSpPr>
+          <p:cNvPr id="2" name="Slide Image Placeholder 1"/>
+          <p:cNvSpPr>
+            <a:spLocks noGrp="1" noRot="1" noChangeAspect="1"/>
+          </p:cNvSpPr>
+          <p:nvPr>
+            <p:ph type="sldImg"/>
+          </p:nvPr>
+        </p:nvSpPr>
+        <p:spPr/>
+      </p:sp>
+      <p:sp>
+        <p:nvSpPr>
+          <p:cNvPr id="3" name="Notes Placeholder 2"/>
+          <p:cNvSpPr>
+            <a:spLocks noGrp="1"/>
+          </p:cNvSpPr>
+          <p:nvPr>
+            <p:ph type="body" idx="1"/>
+          </p:nvPr>
+        </p:nvSpPr>
+        <p:spPr/>
+        <p:txBody>
+          <a:bodyPr/>
+          <a:lstStyle/>
+          <a:p>
+            <a:r>
+              <a:rPr lang="en-US" dirty="0"/>
+              <a:t>Scott S</a:t>
+            </a:r>
+          </a:p>
+        </p:txBody>
+      </p:sp>
+      <p:sp>
+        <p:nvSpPr>
+          <p:cNvPr id="4" name="Slide Number Placeholder 3"/>
+          <p:cNvSpPr>
+            <a:spLocks noGrp="1"/>
+          </p:cNvSpPr>
+          <p:nvPr>
+            <p:ph type="sldNum" sz="quarter" idx="5"/>
+          </p:nvPr>
+        </p:nvSpPr>
+        <p:spPr/>
+        <p:txBody>
+          <a:bodyPr/>
+          <a:lstStyle/>
+          <a:p>
+            <a:fld id="{7908473F-620A-46E7-939F-1AD0939B3342}" type="slidenum">
+              <a:rPr lang="en-US" smtClean="0"/>
+              <a:t>10</a:t>
+            </a:fld>
+            <a:endParaRPr lang="en-US"/>
+          </a:p>
+        </p:txBody>
+      </p:sp>
+    </p:spTree>
+    <p:extLst>
+      <p:ext uri="{BB962C8B-B14F-4D97-AF65-F5344CB8AC3E}">
+        <p14:creationId xmlns:p14="http://schemas.microsoft.com/office/powerpoint/2010/main" val="450208951"/>
       </p:ext>
     </p:extLst>
   </p:cSld>
@@ -10341,23 +10570,7 @@
                   <a:srgbClr val="FFFFFF"/>
                 </a:solidFill>
               </a:rPr>
-              <a:t>Kings County </a:t>
-            </a:r>
-            <a:r>
-              <a:rPr lang="en-US" dirty="0" err="1">
-                <a:solidFill>
-                  <a:srgbClr val="FFFFFF"/>
-                </a:solidFill>
-              </a:rPr>
-              <a:t>HousInG</a:t>
-            </a:r>
-            <a:r>
-              <a:rPr lang="en-US" dirty="0">
-                <a:solidFill>
-                  <a:srgbClr val="FFFFFF"/>
-                </a:solidFill>
-              </a:rPr>
-              <a:t> Price analysis</a:t>
+              <a:t>King County Housing Price analysis</a:t>
             </a:r>
           </a:p>
         </p:txBody>
@@ -10509,6 +10722,170 @@
           </a:fontRef>
         </p:style>
       </p:cxnSp>
+      <p:grpSp>
+        <p:nvGrpSpPr>
+          <p:cNvPr id="7" name="Group 6">
+            <a:extLst>
+              <a:ext uri="{FF2B5EF4-FFF2-40B4-BE49-F238E27FC236}">
+                <a16:creationId xmlns:a16="http://schemas.microsoft.com/office/drawing/2014/main" id="{A1218BB4-FD77-4EC7-A112-2A4AE8D7FA84}"/>
+              </a:ext>
+            </a:extLst>
+          </p:cNvPr>
+          <p:cNvGrpSpPr/>
+          <p:nvPr/>
+        </p:nvGrpSpPr>
+        <p:grpSpPr>
+          <a:xfrm>
+            <a:off x="9895787" y="4572594"/>
+            <a:ext cx="2072568" cy="2072568"/>
+            <a:chOff x="6096000" y="1599214"/>
+            <a:chExt cx="4762500" cy="4762500"/>
+          </a:xfrm>
+        </p:grpSpPr>
+        <p:pic>
+          <p:nvPicPr>
+            <p:cNvPr id="8" name="Picture 2" descr="Image of the Copper | Alchemy symbols, Symbols and meanings, Symbols">
+              <a:extLst>
+                <a:ext uri="{FF2B5EF4-FFF2-40B4-BE49-F238E27FC236}">
+                  <a16:creationId xmlns:a16="http://schemas.microsoft.com/office/drawing/2014/main" id="{22AD1569-6D03-4CF9-BC38-3504A0881A98}"/>
+                </a:ext>
+              </a:extLst>
+            </p:cNvPr>
+            <p:cNvPicPr>
+              <a:picLocks noChangeAspect="1" noChangeArrowheads="1"/>
+            </p:cNvPicPr>
+            <p:nvPr/>
+          </p:nvPicPr>
+          <p:blipFill>
+            <a:blip r:embed="rId3">
+              <a:extLst>
+                <a:ext uri="{28A0092B-C50C-407E-A947-70E740481C1C}">
+                  <a14:useLocalDpi xmlns:a14="http://schemas.microsoft.com/office/drawing/2010/main" val="0"/>
+                </a:ext>
+              </a:extLst>
+            </a:blip>
+            <a:srcRect/>
+            <a:stretch>
+              <a:fillRect/>
+            </a:stretch>
+          </p:blipFill>
+          <p:spPr bwMode="auto">
+            <a:xfrm>
+              <a:off x="6096000" y="1599214"/>
+              <a:ext cx="4762500" cy="4762500"/>
+            </a:xfrm>
+            <a:prstGeom prst="rect">
+              <a:avLst/>
+            </a:prstGeom>
+            <a:noFill/>
+            <a:extLst>
+              <a:ext uri="{909E8E84-426E-40DD-AFC4-6F175D3DCCD1}">
+                <a14:hiddenFill xmlns:a14="http://schemas.microsoft.com/office/drawing/2010/main">
+                  <a:solidFill>
+                    <a:srgbClr val="FFFFFF"/>
+                  </a:solidFill>
+                </a14:hiddenFill>
+              </a:ext>
+            </a:extLst>
+          </p:spPr>
+        </p:pic>
+        <p:sp>
+          <p:nvSpPr>
+            <p:cNvPr id="10" name="TextBox 9">
+              <a:extLst>
+                <a:ext uri="{FF2B5EF4-FFF2-40B4-BE49-F238E27FC236}">
+                  <a16:creationId xmlns:a16="http://schemas.microsoft.com/office/drawing/2014/main" id="{5C0EA25E-B367-434E-A19C-54B41CEFD51D}"/>
+                </a:ext>
+              </a:extLst>
+            </p:cNvPr>
+            <p:cNvSpPr txBox="1"/>
+            <p:nvPr/>
+          </p:nvSpPr>
+          <p:spPr>
+            <a:xfrm>
+              <a:off x="7416237" y="1984373"/>
+              <a:ext cx="2534855" cy="646331"/>
+            </a:xfrm>
+            <a:prstGeom prst="rect">
+              <a:avLst/>
+            </a:prstGeom>
+            <a:noFill/>
+          </p:spPr>
+          <p:txBody>
+            <a:bodyPr wrap="square" rtlCol="0">
+              <a:normAutofit fontScale="40000" lnSpcReduction="20000"/>
+            </a:bodyPr>
+            <a:lstStyle/>
+            <a:p>
+              <a:pPr>
+                <a:lnSpc>
+                  <a:spcPct val="90000"/>
+                </a:lnSpc>
+                <a:spcAft>
+                  <a:spcPts val="600"/>
+                </a:spcAft>
+              </a:pPr>
+              <a:r>
+                <a:rPr lang="en-US" sz="3500" dirty="0">
+                  <a:solidFill>
+                    <a:srgbClr val="EAA032"/>
+                  </a:solidFill>
+                  <a:latin typeface="Arial Black" panose="020B0A04020102020204" pitchFamily="34" charset="0"/>
+                </a:rPr>
+                <a:t>COPPER</a:t>
+              </a:r>
+            </a:p>
+          </p:txBody>
+        </p:sp>
+        <p:sp>
+          <p:nvSpPr>
+            <p:cNvPr id="12" name="TextBox 11">
+              <a:extLst>
+                <a:ext uri="{FF2B5EF4-FFF2-40B4-BE49-F238E27FC236}">
+                  <a16:creationId xmlns:a16="http://schemas.microsoft.com/office/drawing/2014/main" id="{E253F730-7028-45DE-AA52-630A0148D2E1}"/>
+                </a:ext>
+              </a:extLst>
+            </p:cNvPr>
+            <p:cNvSpPr txBox="1"/>
+            <p:nvPr/>
+          </p:nvSpPr>
+          <p:spPr>
+            <a:xfrm>
+              <a:off x="6997421" y="5610155"/>
+              <a:ext cx="3585258" cy="646330"/>
+            </a:xfrm>
+            <a:prstGeom prst="rect">
+              <a:avLst/>
+            </a:prstGeom>
+            <a:noFill/>
+          </p:spPr>
+          <p:txBody>
+            <a:bodyPr wrap="square">
+              <a:normAutofit fontScale="40000" lnSpcReduction="20000"/>
+            </a:bodyPr>
+            <a:lstStyle/>
+            <a:p>
+              <a:pPr>
+                <a:lnSpc>
+                  <a:spcPct val="90000"/>
+                </a:lnSpc>
+                <a:spcAft>
+                  <a:spcPts val="600"/>
+                </a:spcAft>
+              </a:pPr>
+              <a:r>
+                <a:rPr lang="en-US" sz="3100" dirty="0">
+                  <a:solidFill>
+                    <a:srgbClr val="EAA032"/>
+                  </a:solidFill>
+                  <a:latin typeface="Arial Black" panose="020B0A04020102020204" pitchFamily="34" charset="0"/>
+                </a:rPr>
+                <a:t>CONSULTING </a:t>
+              </a:r>
+            </a:p>
+          </p:txBody>
+        </p:sp>
+      </p:grpSp>
     </p:spTree>
     <p:extLst>
       <p:ext uri="{BB962C8B-B14F-4D97-AF65-F5344CB8AC3E}">
@@ -10676,7 +11053,7 @@
             <p:ph idx="1"/>
             <p:extLst>
               <p:ext uri="{D42A27DB-BD31-4B8C-83A1-F6EECF244321}">
-                <p14:modId xmlns:p14="http://schemas.microsoft.com/office/powerpoint/2010/main" val="2179743006"/>
+                <p14:modId xmlns:p14="http://schemas.microsoft.com/office/powerpoint/2010/main" val="189656726"/>
               </p:ext>
             </p:extLst>
           </p:nvPr>
@@ -10687,7 +11064,7 @@
         </p:xfrm>
         <a:graphic>
           <a:graphicData uri="http://schemas.openxmlformats.org/drawingml/2006/diagram">
-            <dgm:relIds xmlns:dgm="http://schemas.openxmlformats.org/drawingml/2006/diagram" xmlns:r="http://schemas.openxmlformats.org/officeDocument/2006/relationships" r:dm="rId2" r:lo="rId3" r:qs="rId4" r:cs="rId5"/>
+            <dgm:relIds xmlns:dgm="http://schemas.openxmlformats.org/drawingml/2006/diagram" xmlns:r="http://schemas.openxmlformats.org/officeDocument/2006/relationships" r:dm="rId3" r:lo="rId4" r:qs="rId5" r:cs="rId6"/>
           </a:graphicData>
         </a:graphic>
       </p:graphicFrame>
@@ -10707,6 +11084,14 @@
 <file path=ppt/slides/slide11.xml><?xml version="1.0" encoding="utf-8"?>
 <p:sld xmlns:a="http://schemas.openxmlformats.org/drawingml/2006/main" xmlns:r="http://schemas.openxmlformats.org/officeDocument/2006/relationships" xmlns:p="http://schemas.openxmlformats.org/presentationml/2006/main">
   <p:cSld>
+    <p:bg>
+      <p:bgPr>
+        <a:solidFill>
+          <a:schemeClr val="bg1"/>
+        </a:solidFill>
+        <a:effectLst/>
+      </p:bgPr>
+    </p:bg>
     <p:spTree>
       <p:nvGrpSpPr>
         <p:cNvPr id="1" name=""/>
@@ -10721,6 +11106,82 @@
           <a:chExt cx="0" cy="0"/>
         </a:xfrm>
       </p:grpSpPr>
+      <p:sp useBgFill="1">
+        <p:nvSpPr>
+          <p:cNvPr id="73" name="Rectangle 72">
+            <a:extLst>
+              <a:ext uri="{FF2B5EF4-FFF2-40B4-BE49-F238E27FC236}">
+                <a16:creationId xmlns:a16="http://schemas.microsoft.com/office/drawing/2014/main" id="{E7218290-08E7-4AB8-8549-F625B01F0DCB}"/>
+              </a:ext>
+              <a:ext uri="{C183D7F6-B498-43B3-948B-1728B52AA6E4}">
+                <adec:decorative xmlns:adec="http://schemas.microsoft.com/office/drawing/2017/decorative" val="1"/>
+              </a:ext>
+            </a:extLst>
+          </p:cNvPr>
+          <p:cNvSpPr>
+            <a:spLocks noGrp="1" noRot="1" noChangeAspect="1" noMove="1" noResize="1" noEditPoints="1" noAdjustHandles="1" noChangeArrowheads="1" noChangeShapeType="1" noTextEdit="1"/>
+          </p:cNvSpPr>
+          <p:nvPr>
+            <p:extLst>
+              <p:ext uri="{386F3935-93C4-4BCD-93E2-E3B085C9AB24}">
+                <p16:designElem xmlns:p16="http://schemas.microsoft.com/office/powerpoint/2015/main" val="1"/>
+              </p:ext>
+            </p:extLst>
+          </p:nvPr>
+        </p:nvSpPr>
+        <p:spPr>
+          <a:xfrm>
+            <a:off x="0" y="0"/>
+            <a:ext cx="12192000" cy="6858000"/>
+          </a:xfrm>
+          <a:prstGeom prst="rect">
+            <a:avLst/>
+          </a:prstGeom>
+          <a:ln w="12700" cap="flat" cmpd="sng" algn="ctr">
+            <a:noFill/>
+            <a:prstDash val="solid"/>
+            <a:miter lim="800000"/>
+          </a:ln>
+          <a:effectLst/>
+          <a:extLst>
+            <a:ext uri="{91240B29-F687-4F45-9708-019B960494DF}">
+              <a14:hiddenLine xmlns:a14="http://schemas.microsoft.com/office/drawing/2010/main" w="12700" cap="flat" cmpd="sng" algn="ctr">
+                <a:solidFill>
+                  <a:schemeClr val="accent1">
+                    <a:shade val="50000"/>
+                  </a:schemeClr>
+                </a:solidFill>
+                <a:prstDash val="solid"/>
+                <a:miter lim="800000"/>
+              </a14:hiddenLine>
+            </a:ext>
+          </a:extLst>
+        </p:spPr>
+        <p:style>
+          <a:lnRef idx="2">
+            <a:schemeClr val="accent1">
+              <a:shade val="50000"/>
+            </a:schemeClr>
+          </a:lnRef>
+          <a:fillRef idx="1">
+            <a:schemeClr val="accent1"/>
+          </a:fillRef>
+          <a:effectRef idx="0">
+            <a:schemeClr val="accent1"/>
+          </a:effectRef>
+          <a:fontRef idx="minor">
+            <a:schemeClr val="lt1"/>
+          </a:fontRef>
+        </p:style>
+        <p:txBody>
+          <a:bodyPr rtlCol="0" anchor="ctr"/>
+          <a:lstStyle/>
+          <a:p>
+            <a:pPr algn="ctr"/>
+            <a:endParaRPr lang="en-US"/>
+          </a:p>
+        </p:txBody>
+      </p:sp>
       <p:sp>
         <p:nvSpPr>
           <p:cNvPr id="2" name="Title 1">
@@ -10737,9 +11198,16 @@
             <p:ph type="title"/>
           </p:nvPr>
         </p:nvSpPr>
-        <p:spPr/>
+        <p:spPr>
+          <a:xfrm>
+            <a:off x="1429566" y="762001"/>
+            <a:ext cx="5008696" cy="1141004"/>
+          </a:xfrm>
+        </p:spPr>
         <p:txBody>
-          <a:bodyPr/>
+          <a:bodyPr>
+            <a:normAutofit/>
+          </a:bodyPr>
           <a:lstStyle/>
           <a:p>
             <a:r>
@@ -10765,63 +11233,184 @@
             <p:ph idx="1"/>
           </p:nvPr>
         </p:nvSpPr>
-        <p:spPr/>
+        <p:spPr>
+          <a:xfrm>
+            <a:off x="1429566" y="2259698"/>
+            <a:ext cx="4479398" cy="3836301"/>
+          </a:xfrm>
+        </p:spPr>
         <p:txBody>
-          <a:bodyPr/>
+          <a:bodyPr>
+            <a:normAutofit/>
+          </a:bodyPr>
           <a:lstStyle/>
           <a:p>
+            <a:pPr>
+              <a:lnSpc>
+                <a:spcPct val="120000"/>
+              </a:lnSpc>
+            </a:pPr>
             <a:r>
-              <a:rPr lang="en-US" dirty="0"/>
+              <a:rPr lang="en-US" sz="1500"/>
               <a:t>Add more location data</a:t>
             </a:r>
           </a:p>
           <a:p>
+            <a:pPr>
+              <a:lnSpc>
+                <a:spcPct val="120000"/>
+              </a:lnSpc>
+            </a:pPr>
             <a:r>
-              <a:rPr lang="en-US" dirty="0"/>
+              <a:rPr lang="en-US" sz="1500"/>
               <a:t>Feature engineering with Condition and Grade </a:t>
             </a:r>
           </a:p>
           <a:p>
-            <a:pPr lvl="1"/>
+            <a:pPr lvl="1">
+              <a:lnSpc>
+                <a:spcPct val="120000"/>
+              </a:lnSpc>
+            </a:pPr>
             <a:r>
-              <a:rPr lang="en-US" dirty="0"/>
+              <a:rPr lang="en-US" sz="1500"/>
               <a:t>	Identify relationships with Year Built and Year Renovated</a:t>
             </a:r>
           </a:p>
           <a:p>
+            <a:pPr>
+              <a:lnSpc>
+                <a:spcPct val="120000"/>
+              </a:lnSpc>
+            </a:pPr>
             <a:r>
-              <a:rPr lang="en-US" dirty="0"/>
+              <a:rPr lang="en-US" sz="1500"/>
               <a:t>Explore room number and type</a:t>
             </a:r>
           </a:p>
           <a:p>
+            <a:pPr>
+              <a:lnSpc>
+                <a:spcPct val="120000"/>
+              </a:lnSpc>
+            </a:pPr>
             <a:r>
-              <a:rPr lang="en-US" dirty="0"/>
+              <a:rPr lang="en-US" sz="1500"/>
               <a:t>Leverage zip code data </a:t>
             </a:r>
           </a:p>
           <a:p>
+            <a:pPr>
+              <a:lnSpc>
+                <a:spcPct val="120000"/>
+              </a:lnSpc>
+            </a:pPr>
             <a:r>
-              <a:rPr lang="en-US" dirty="0"/>
+              <a:rPr lang="en-US" sz="1500"/>
               <a:t>Examine properties with multiple sales records</a:t>
             </a:r>
           </a:p>
           <a:p>
-            <a:pPr lvl="1"/>
+            <a:pPr lvl="1">
+              <a:lnSpc>
+                <a:spcPct val="120000"/>
+              </a:lnSpc>
+            </a:pPr>
             <a:r>
-              <a:rPr lang="en-US" dirty="0"/>
+              <a:rPr lang="en-US" sz="1500"/>
               <a:t>	Price changes</a:t>
             </a:r>
           </a:p>
           <a:p>
-            <a:pPr lvl="1"/>
+            <a:pPr lvl="1">
+              <a:lnSpc>
+                <a:spcPct val="120000"/>
+              </a:lnSpc>
+            </a:pPr>
             <a:r>
-              <a:rPr lang="en-US" dirty="0"/>
+              <a:rPr lang="en-US" sz="1500"/>
               <a:t>	Feature changes</a:t>
             </a:r>
           </a:p>
         </p:txBody>
       </p:sp>
+      <p:pic>
+        <p:nvPicPr>
+          <p:cNvPr id="1028" name="Picture 4" descr="Mount Rainier National Park (U.S. National Park Service)">
+            <a:extLst>
+              <a:ext uri="{FF2B5EF4-FFF2-40B4-BE49-F238E27FC236}">
+                <a16:creationId xmlns:a16="http://schemas.microsoft.com/office/drawing/2014/main" id="{803AA8B8-7763-4F44-AF31-3B7820538956}"/>
+              </a:ext>
+            </a:extLst>
+          </p:cNvPr>
+          <p:cNvPicPr>
+            <a:picLocks noChangeAspect="1" noChangeArrowheads="1"/>
+          </p:cNvPicPr>
+          <p:nvPr/>
+        </p:nvPicPr>
+        <p:blipFill rotWithShape="1">
+          <a:blip r:embed="rId3">
+            <a:extLst>
+              <a:ext uri="{28A0092B-C50C-407E-A947-70E740481C1C}">
+                <a14:useLocalDpi xmlns:a14="http://schemas.microsoft.com/office/drawing/2010/main" val="0"/>
+              </a:ext>
+            </a:extLst>
+          </a:blip>
+          <a:srcRect l="17698" r="26052"/>
+          <a:stretch/>
+        </p:blipFill>
+        <p:spPr bwMode="auto">
+          <a:xfrm>
+            <a:off x="6639965" y="1114197"/>
+            <a:ext cx="4629606" cy="4629606"/>
+          </a:xfrm>
+          <a:custGeom>
+            <a:avLst/>
+            <a:gdLst/>
+            <a:ahLst/>
+            <a:cxnLst/>
+            <a:rect l="l" t="t" r="r" b="b"/>
+            <a:pathLst>
+              <a:path w="4629606" h="4629606">
+                <a:moveTo>
+                  <a:pt x="2314803" y="0"/>
+                </a:moveTo>
+                <a:cubicBezTo>
+                  <a:pt x="3593233" y="0"/>
+                  <a:pt x="4629606" y="1036373"/>
+                  <a:pt x="4629606" y="2314803"/>
+                </a:cubicBezTo>
+                <a:cubicBezTo>
+                  <a:pt x="4629606" y="3593233"/>
+                  <a:pt x="3593233" y="4629606"/>
+                  <a:pt x="2314803" y="4629606"/>
+                </a:cubicBezTo>
+                <a:cubicBezTo>
+                  <a:pt x="1036373" y="4629606"/>
+                  <a:pt x="0" y="3593233"/>
+                  <a:pt x="0" y="2314803"/>
+                </a:cubicBezTo>
+                <a:cubicBezTo>
+                  <a:pt x="0" y="1036373"/>
+                  <a:pt x="1036373" y="0"/>
+                  <a:pt x="2314803" y="0"/>
+                </a:cubicBezTo>
+                <a:close/>
+              </a:path>
+            </a:pathLst>
+          </a:custGeom>
+          <a:noFill/>
+          <a:extLst>
+            <a:ext uri="{909E8E84-426E-40DD-AFC4-6F175D3DCCD1}">
+              <a14:hiddenFill xmlns:a14="http://schemas.microsoft.com/office/drawing/2010/main">
+                <a:solidFill>
+                  <a:srgbClr val="FFFFFF"/>
+                </a:solidFill>
+              </a14:hiddenFill>
+            </a:ext>
+          </a:extLst>
+        </p:spPr>
+      </p:pic>
     </p:spTree>
     <p:extLst>
       <p:ext uri="{BB962C8B-B14F-4D97-AF65-F5344CB8AC3E}">
@@ -11276,89 +11865,6 @@
 </p:sld>
 </file>
 
-<file path=ppt/slides/slide13.xml><?xml version="1.0" encoding="utf-8"?>
-<p:sld xmlns:a="http://schemas.openxmlformats.org/drawingml/2006/main" xmlns:r="http://schemas.openxmlformats.org/officeDocument/2006/relationships" xmlns:p="http://schemas.openxmlformats.org/presentationml/2006/main">
-  <p:cSld>
-    <p:spTree>
-      <p:nvGrpSpPr>
-        <p:cNvPr id="1" name=""/>
-        <p:cNvGrpSpPr/>
-        <p:nvPr/>
-      </p:nvGrpSpPr>
-      <p:grpSpPr>
-        <a:xfrm>
-          <a:off x="0" y="0"/>
-          <a:ext cx="0" cy="0"/>
-          <a:chOff x="0" y="0"/>
-          <a:chExt cx="0" cy="0"/>
-        </a:xfrm>
-      </p:grpSpPr>
-      <p:sp>
-        <p:nvSpPr>
-          <p:cNvPr id="2" name="Title 1">
-            <a:extLst>
-              <a:ext uri="{FF2B5EF4-FFF2-40B4-BE49-F238E27FC236}">
-                <a16:creationId xmlns:a16="http://schemas.microsoft.com/office/drawing/2014/main" id="{46BFA17E-3119-4100-89AF-80122B22A9A6}"/>
-              </a:ext>
-            </a:extLst>
-          </p:cNvPr>
-          <p:cNvSpPr>
-            <a:spLocks noGrp="1"/>
-          </p:cNvSpPr>
-          <p:nvPr>
-            <p:ph type="title"/>
-          </p:nvPr>
-        </p:nvSpPr>
-        <p:spPr/>
-        <p:txBody>
-          <a:bodyPr/>
-          <a:lstStyle/>
-          <a:p>
-            <a:r>
-              <a:rPr lang="en-US" dirty="0"/>
-              <a:t>Appendix</a:t>
-            </a:r>
-          </a:p>
-        </p:txBody>
-      </p:sp>
-      <p:sp>
-        <p:nvSpPr>
-          <p:cNvPr id="3" name="Content Placeholder 2">
-            <a:extLst>
-              <a:ext uri="{FF2B5EF4-FFF2-40B4-BE49-F238E27FC236}">
-                <a16:creationId xmlns:a16="http://schemas.microsoft.com/office/drawing/2014/main" id="{2A1014A5-6B32-4A3E-AE75-C409A94CC0A1}"/>
-              </a:ext>
-            </a:extLst>
-          </p:cNvPr>
-          <p:cNvSpPr>
-            <a:spLocks noGrp="1"/>
-          </p:cNvSpPr>
-          <p:nvPr>
-            <p:ph idx="1"/>
-          </p:nvPr>
-        </p:nvSpPr>
-        <p:spPr/>
-        <p:txBody>
-          <a:bodyPr/>
-          <a:lstStyle/>
-          <a:p>
-            <a:endParaRPr lang="en-US"/>
-          </a:p>
-        </p:txBody>
-      </p:sp>
-    </p:spTree>
-    <p:extLst>
-      <p:ext uri="{BB962C8B-B14F-4D97-AF65-F5344CB8AC3E}">
-        <p14:creationId xmlns:p14="http://schemas.microsoft.com/office/powerpoint/2010/main" val="3030213467"/>
-      </p:ext>
-    </p:extLst>
-  </p:cSld>
-  <p:clrMapOvr>
-    <a:masterClrMapping/>
-  </p:clrMapOvr>
-</p:sld>
-</file>
-
 <file path=ppt/slides/slide2.xml><?xml version="1.0" encoding="utf-8"?>
 <p:sld xmlns:a="http://schemas.openxmlformats.org/drawingml/2006/main" xmlns:r="http://schemas.openxmlformats.org/officeDocument/2006/relationships" xmlns:p="http://schemas.openxmlformats.org/presentationml/2006/main">
   <p:cSld>
@@ -11579,7 +12085,7 @@
             <p:ph idx="1"/>
             <p:extLst>
               <p:ext uri="{D42A27DB-BD31-4B8C-83A1-F6EECF244321}">
-                <p14:modId xmlns:p14="http://schemas.microsoft.com/office/powerpoint/2010/main" val="3377738494"/>
+                <p14:modId xmlns:p14="http://schemas.microsoft.com/office/powerpoint/2010/main" val="1618335932"/>
               </p:ext>
             </p:extLst>
           </p:nvPr>
@@ -11590,7 +12096,7 @@
         </p:xfrm>
         <a:graphic>
           <a:graphicData uri="http://schemas.openxmlformats.org/drawingml/2006/diagram">
-            <dgm:relIds xmlns:dgm="http://schemas.openxmlformats.org/drawingml/2006/diagram" xmlns:r="http://schemas.openxmlformats.org/officeDocument/2006/relationships" r:dm="rId2" r:lo="rId3" r:qs="rId4" r:cs="rId5"/>
+            <dgm:relIds xmlns:dgm="http://schemas.openxmlformats.org/drawingml/2006/diagram" xmlns:r="http://schemas.openxmlformats.org/officeDocument/2006/relationships" r:dm="rId3" r:lo="rId4" r:qs="rId5" r:cs="rId6"/>
           </a:graphicData>
         </a:graphic>
       </p:graphicFrame>
@@ -11772,31 +12278,39 @@
           <a:lstStyle/>
           <a:p>
             <a:r>
-              <a:rPr lang="en-US"/>
+              <a:rPr lang="en-US" sz="2400" dirty="0"/>
               <a:t>Bigger is better! </a:t>
             </a:r>
           </a:p>
           <a:p>
             <a:r>
-              <a:rPr lang="en-US"/>
-              <a:t>… but More isn’t necessarily</a:t>
+              <a:rPr lang="en-US" sz="2400" dirty="0"/>
+              <a:t>… but </a:t>
             </a:r>
-          </a:p>
-          <a:p>
             <a:r>
-              <a:rPr lang="en-US"/>
+              <a:rPr lang="en-US" sz="2400" b="1" dirty="0"/>
+              <a:t>more</a:t>
+            </a:r>
+            <a:r>
+              <a:rPr lang="en-US" sz="2400" dirty="0"/>
+              <a:t> isn’t necessarily better!</a:t>
+            </a:r>
+          </a:p>
+          <a:p>
+            <a:r>
+              <a:rPr lang="en-US" sz="2400" dirty="0"/>
               <a:t>Location! Location! Location! </a:t>
             </a:r>
           </a:p>
           <a:p>
             <a:r>
-              <a:rPr lang="en-US"/>
+              <a:rPr lang="en-US" sz="2400" dirty="0"/>
               <a:t>Grades count!</a:t>
             </a:r>
           </a:p>
           <a:p>
             <a:pPr lvl="1"/>
-            <a:endParaRPr lang="en-US"/>
+            <a:endParaRPr lang="en-US" dirty="0"/>
           </a:p>
           <a:p>
             <a:pPr lvl="1"/>
@@ -11962,13 +12476,13 @@
           <a:p>
             <a:r>
               <a:rPr lang="en-US" dirty="0"/>
-              <a:t>Over 21,500  sales records from  Kings County for 2014 &amp; 2015</a:t>
+              <a:t>&gt; 21,500  sales records from  Kings County for 2014 &amp; 2015</a:t>
             </a:r>
           </a:p>
           <a:p>
             <a:r>
               <a:rPr lang="en-US" dirty="0"/>
-              <a:t>21 separate property features recorded for each sale</a:t>
+              <a:t>20 separate property features recorded for each sale</a:t>
             </a:r>
           </a:p>
           <a:p>
@@ -11981,7 +12495,7 @@
           <a:p>
             <a:r>
               <a:rPr lang="en-US" dirty="0"/>
-              <a:t>Additional data from </a:t>
+              <a:t>Additional location data from </a:t>
             </a:r>
             <a:r>
               <a:rPr lang="en-US" dirty="0">
@@ -12207,49 +12721,8 @@
               <a:t>Examined correlation between price and other features</a:t>
             </a:r>
           </a:p>
-          <a:p>
-            <a:r>
-              <a:rPr lang="en-US" dirty="0"/>
-              <a:t>Mapped location data  </a:t>
-            </a:r>
-          </a:p>
-          <a:p>
-            <a:r>
-              <a:rPr lang="en-US" dirty="0"/>
-              <a:t>Determined outliers to “single family home” </a:t>
-            </a:r>
-          </a:p>
         </p:txBody>
       </p:sp>
-      <p:pic>
-        <p:nvPicPr>
-          <p:cNvPr id="5" name="Picture 4">
-            <a:extLst>
-              <a:ext uri="{FF2B5EF4-FFF2-40B4-BE49-F238E27FC236}">
-                <a16:creationId xmlns:a16="http://schemas.microsoft.com/office/drawing/2014/main" id="{1B77F04C-CEE1-4C9A-BB5B-82FEBF567C01}"/>
-              </a:ext>
-            </a:extLst>
-          </p:cNvPr>
-          <p:cNvPicPr>
-            <a:picLocks noChangeAspect="1"/>
-          </p:cNvPicPr>
-          <p:nvPr/>
-        </p:nvPicPr>
-        <p:blipFill rotWithShape="1">
-          <a:blip r:embed="rId2"/>
-          <a:srcRect t="2104" b="6866"/>
-          <a:stretch/>
-        </p:blipFill>
-        <p:spPr>
-          <a:xfrm>
-            <a:off x="6096000" y="10"/>
-            <a:ext cx="6096000" cy="3440526"/>
-          </a:xfrm>
-          <a:prstGeom prst="rect">
-            <a:avLst/>
-          </a:prstGeom>
-        </p:spPr>
-      </p:pic>
       <p:pic>
         <p:nvPicPr>
           <p:cNvPr id="11" name="Picture 10" descr="A picture containing table&#10;&#10;Description automatically generated">
@@ -12278,8 +12751,8 @@
         </p:blipFill>
         <p:spPr>
           <a:xfrm>
-            <a:off x="7479115" y="3452150"/>
-            <a:ext cx="3607985" cy="3417464"/>
+            <a:off x="5823935" y="571500"/>
+            <a:ext cx="6033606" cy="5714999"/>
           </a:xfrm>
           <a:prstGeom prst="rect">
             <a:avLst/>
@@ -12289,7 +12762,7 @@
     </p:spTree>
     <p:extLst>
       <p:ext uri="{BB962C8B-B14F-4D97-AF65-F5344CB8AC3E}">
-        <p14:creationId xmlns:p14="http://schemas.microsoft.com/office/powerpoint/2010/main" val="1310384882"/>
+        <p14:creationId xmlns:p14="http://schemas.microsoft.com/office/powerpoint/2010/main" val="2578843159"/>
       </p:ext>
     </p:extLst>
   </p:cSld>
@@ -12620,8 +13093,8 @@
           <a:lstStyle/>
           <a:p>
             <a:r>
-              <a:rPr lang="en-US"/>
-              <a:t>Data Analysis – Numeric Features</a:t>
+              <a:rPr lang="en-US" dirty="0"/>
+              <a:t>Data Analysis – Square Footage</a:t>
             </a:r>
           </a:p>
         </p:txBody>
@@ -12664,42 +13137,6 @@
           </a:p>
         </p:txBody>
       </p:sp>
-      <p:pic>
-        <p:nvPicPr>
-          <p:cNvPr id="5" name="Picture 4" descr="Chart, scatter chart&#10;&#10;Description automatically generated">
-            <a:extLst>
-              <a:ext uri="{FF2B5EF4-FFF2-40B4-BE49-F238E27FC236}">
-                <a16:creationId xmlns:a16="http://schemas.microsoft.com/office/drawing/2014/main" id="{AF95CFB0-1006-48BE-93D5-9959D847DD22}"/>
-              </a:ext>
-            </a:extLst>
-          </p:cNvPr>
-          <p:cNvPicPr>
-            <a:picLocks noChangeAspect="1"/>
-          </p:cNvPicPr>
-          <p:nvPr/>
-        </p:nvPicPr>
-        <p:blipFill>
-          <a:blip r:embed="rId2">
-            <a:extLst>
-              <a:ext uri="{28A0092B-C50C-407E-A947-70E740481C1C}">
-                <a14:useLocalDpi xmlns:a14="http://schemas.microsoft.com/office/drawing/2010/main" val="0"/>
-              </a:ext>
-            </a:extLst>
-          </a:blip>
-          <a:stretch>
-            <a:fillRect/>
-          </a:stretch>
-        </p:blipFill>
-        <p:spPr>
-          <a:xfrm>
-            <a:off x="6858001" y="1531876"/>
-            <a:ext cx="3822920" cy="3794248"/>
-          </a:xfrm>
-          <a:prstGeom prst="rect">
-            <a:avLst/>
-          </a:prstGeom>
-        </p:spPr>
-      </p:pic>
       <p:cxnSp>
         <p:nvCxnSpPr>
           <p:cNvPr id="29" name="Straight Connector 28">
@@ -12752,6 +13189,42 @@
           </a:fontRef>
         </p:style>
       </p:cxnSp>
+      <p:pic>
+        <p:nvPicPr>
+          <p:cNvPr id="6" name="Picture 5" descr="Chart, scatter chart&#10;&#10;Description automatically generated">
+            <a:extLst>
+              <a:ext uri="{FF2B5EF4-FFF2-40B4-BE49-F238E27FC236}">
+                <a16:creationId xmlns:a16="http://schemas.microsoft.com/office/drawing/2014/main" id="{DC3A087B-7C7C-4BEB-95CA-121F1373B012}"/>
+              </a:ext>
+            </a:extLst>
+          </p:cNvPr>
+          <p:cNvPicPr>
+            <a:picLocks noChangeAspect="1"/>
+          </p:cNvPicPr>
+          <p:nvPr/>
+        </p:nvPicPr>
+        <p:blipFill>
+          <a:blip r:embed="rId3">
+            <a:extLst>
+              <a:ext uri="{28A0092B-C50C-407E-A947-70E740481C1C}">
+                <a14:useLocalDpi xmlns:a14="http://schemas.microsoft.com/office/drawing/2010/main" val="0"/>
+              </a:ext>
+            </a:extLst>
+          </a:blip>
+          <a:stretch>
+            <a:fillRect/>
+          </a:stretch>
+        </p:blipFill>
+        <p:spPr>
+          <a:xfrm>
+            <a:off x="6203206" y="923019"/>
+            <a:ext cx="5096964" cy="4999569"/>
+          </a:xfrm>
+          <a:prstGeom prst="rect">
+            <a:avLst/>
+          </a:prstGeom>
+        </p:spPr>
+      </p:pic>
     </p:spTree>
     <p:extLst>
       <p:ext uri="{BB962C8B-B14F-4D97-AF65-F5344CB8AC3E}">
@@ -13042,9 +13515,10 @@
           <a:lstStyle/>
           <a:p>
             <a:r>
-              <a:rPr lang="en-US" dirty="0"/>
-              <a:t>Data Analysis – Categorical Features</a:t>
+              <a:rPr lang="en-US"/>
+              <a:t>Data Analysis – Feature Engineering</a:t>
             </a:r>
+            <a:endParaRPr lang="en-US" dirty="0"/>
           </a:p>
         </p:txBody>
       </p:sp>
@@ -13071,11 +13545,20 @@
           <a:p>
             <a:r>
               <a:rPr lang="en-US" dirty="0"/>
-              <a:t>GRAPHIC TO COME</a:t>
+              <a:t>View Data – Moved from unclear value analysis to simple Yes/No values</a:t>
             </a:r>
           </a:p>
           <a:p>
-            <a:endParaRPr lang="en-US" dirty="0"/>
+            <a:r>
+              <a:rPr lang="en-US" dirty="0"/>
+              <a:t>Grade &amp; Condition – Consolidated into above and below Average Grades and Conditions</a:t>
+            </a:r>
+          </a:p>
+          <a:p>
+            <a:r>
+              <a:rPr lang="en-US" dirty="0"/>
+              <a:t>Bedrooms – remove outliers (&gt;5 bedrooms)</a:t>
+            </a:r>
           </a:p>
         </p:txBody>
       </p:sp>
@@ -13313,7 +13796,7 @@
           <p:nvPr/>
         </p:nvPicPr>
         <p:blipFill>
-          <a:blip r:embed="rId2">
+          <a:blip r:embed="rId3">
             <a:extLst>
               <a:ext uri="{28A0092B-C50C-407E-A947-70E740481C1C}">
                 <a14:useLocalDpi xmlns:a14="http://schemas.microsoft.com/office/drawing/2010/main" val="0"/>

</xml_diff>

<commit_message>
Update data files and powerpoint
</commit_message>
<xml_diff>
--- a/Kings County HousIng Price Analysis.pptx
+++ b/Kings County HousIng Price Analysis.pptx
@@ -5,7 +5,7 @@
     <p:sldMasterId id="2147483738" r:id="rId1"/>
   </p:sldMasterIdLst>
   <p:notesMasterIdLst>
-    <p:notesMasterId r:id="rId14"/>
+    <p:notesMasterId r:id="rId13"/>
   </p:notesMasterIdLst>
   <p:sldIdLst>
     <p:sldId id="256" r:id="rId2"/>
@@ -13,13 +13,12 @@
     <p:sldId id="258" r:id="rId4"/>
     <p:sldId id="259" r:id="rId5"/>
     <p:sldId id="269" r:id="rId6"/>
-    <p:sldId id="260" r:id="rId7"/>
-    <p:sldId id="261" r:id="rId8"/>
-    <p:sldId id="265" r:id="rId9"/>
-    <p:sldId id="266" r:id="rId10"/>
-    <p:sldId id="267" r:id="rId11"/>
-    <p:sldId id="262" r:id="rId12"/>
-    <p:sldId id="268" r:id="rId13"/>
+    <p:sldId id="261" r:id="rId7"/>
+    <p:sldId id="265" r:id="rId8"/>
+    <p:sldId id="270" r:id="rId9"/>
+    <p:sldId id="267" r:id="rId10"/>
+    <p:sldId id="262" r:id="rId11"/>
+    <p:sldId id="268" r:id="rId12"/>
   </p:sldIdLst>
   <p:sldSz cx="12192000" cy="6858000"/>
   <p:notesSz cx="6858000" cy="9144000"/>
@@ -5632,10 +5631,7 @@
           <a:bodyPr/>
           <a:lstStyle/>
           <a:p>
-            <a:r>
-              <a:rPr lang="en-US" dirty="0"/>
-              <a:t>Alex M</a:t>
-            </a:r>
+            <a:endParaRPr lang="en-US"/>
           </a:p>
         </p:txBody>
       </p:sp>
@@ -5657,90 +5653,6 @@
             <a:fld id="{7908473F-620A-46E7-939F-1AD0939B3342}" type="slidenum">
               <a:rPr lang="en-US" smtClean="0"/>
               <a:t>11</a:t>
-            </a:fld>
-            <a:endParaRPr lang="en-US"/>
-          </a:p>
-        </p:txBody>
-      </p:sp>
-    </p:spTree>
-    <p:extLst>
-      <p:ext uri="{BB962C8B-B14F-4D97-AF65-F5344CB8AC3E}">
-        <p14:creationId xmlns:p14="http://schemas.microsoft.com/office/powerpoint/2010/main" val="1949708796"/>
-      </p:ext>
-    </p:extLst>
-  </p:cSld>
-  <p:clrMapOvr>
-    <a:masterClrMapping/>
-  </p:clrMapOvr>
-</p:notes>
-</file>
-
-<file path=ppt/notesSlides/notesSlide11.xml><?xml version="1.0" encoding="utf-8"?>
-<p:notes xmlns:a="http://schemas.openxmlformats.org/drawingml/2006/main" xmlns:r="http://schemas.openxmlformats.org/officeDocument/2006/relationships" xmlns:p="http://schemas.openxmlformats.org/presentationml/2006/main">
-  <p:cSld>
-    <p:spTree>
-      <p:nvGrpSpPr>
-        <p:cNvPr id="1" name=""/>
-        <p:cNvGrpSpPr/>
-        <p:nvPr/>
-      </p:nvGrpSpPr>
-      <p:grpSpPr>
-        <a:xfrm>
-          <a:off x="0" y="0"/>
-          <a:ext cx="0" cy="0"/>
-          <a:chOff x="0" y="0"/>
-          <a:chExt cx="0" cy="0"/>
-        </a:xfrm>
-      </p:grpSpPr>
-      <p:sp>
-        <p:nvSpPr>
-          <p:cNvPr id="2" name="Slide Image Placeholder 1"/>
-          <p:cNvSpPr>
-            <a:spLocks noGrp="1" noRot="1" noChangeAspect="1"/>
-          </p:cNvSpPr>
-          <p:nvPr>
-            <p:ph type="sldImg"/>
-          </p:nvPr>
-        </p:nvSpPr>
-        <p:spPr/>
-      </p:sp>
-      <p:sp>
-        <p:nvSpPr>
-          <p:cNvPr id="3" name="Notes Placeholder 2"/>
-          <p:cNvSpPr>
-            <a:spLocks noGrp="1"/>
-          </p:cNvSpPr>
-          <p:nvPr>
-            <p:ph type="body" idx="1"/>
-          </p:nvPr>
-        </p:nvSpPr>
-        <p:spPr/>
-        <p:txBody>
-          <a:bodyPr/>
-          <a:lstStyle/>
-          <a:p>
-            <a:endParaRPr lang="en-US"/>
-          </a:p>
-        </p:txBody>
-      </p:sp>
-      <p:sp>
-        <p:nvSpPr>
-          <p:cNvPr id="4" name="Slide Number Placeholder 3"/>
-          <p:cNvSpPr>
-            <a:spLocks noGrp="1"/>
-          </p:cNvSpPr>
-          <p:nvPr>
-            <p:ph type="sldNum" sz="quarter" idx="5"/>
-          </p:nvPr>
-        </p:nvSpPr>
-        <p:spPr/>
-        <p:txBody>
-          <a:bodyPr/>
-          <a:lstStyle/>
-          <a:p>
-            <a:fld id="{7908473F-620A-46E7-939F-1AD0939B3342}" type="slidenum">
-              <a:rPr lang="en-US" smtClean="0"/>
-              <a:t>12</a:t>
             </a:fld>
             <a:endParaRPr lang="en-US"/>
           </a:p>
@@ -6152,7 +6064,13 @@
           <a:p>
             <a:r>
               <a:rPr lang="en-US" dirty="0"/>
-              <a:t>Scott S</a:t>
+              <a:t>Alex M</a:t>
+            </a:r>
+          </a:p>
+          <a:p>
+            <a:r>
+              <a:rPr lang="en-US" dirty="0"/>
+              <a:t>Engineering the feature, confirming viability </a:t>
             </a:r>
           </a:p>
         </p:txBody>
@@ -6183,7 +6101,7 @@
     </p:spTree>
     <p:extLst>
       <p:ext uri="{BB962C8B-B14F-4D97-AF65-F5344CB8AC3E}">
-        <p14:creationId xmlns:p14="http://schemas.microsoft.com/office/powerpoint/2010/main" val="4143536979"/>
+        <p14:creationId xmlns:p14="http://schemas.microsoft.com/office/powerpoint/2010/main" val="1747988218"/>
       </p:ext>
     </p:extLst>
   </p:cSld>
@@ -6239,7 +6157,7 @@
           <a:p>
             <a:r>
               <a:rPr lang="en-US" dirty="0"/>
-              <a:t>Alex M</a:t>
+              <a:t>Scott S</a:t>
             </a:r>
           </a:p>
           <a:p>
@@ -6276,7 +6194,7 @@
     </p:spTree>
     <p:extLst>
       <p:ext uri="{BB962C8B-B14F-4D97-AF65-F5344CB8AC3E}">
-        <p14:creationId xmlns:p14="http://schemas.microsoft.com/office/powerpoint/2010/main" val="1747988218"/>
+        <p14:creationId xmlns:p14="http://schemas.microsoft.com/office/powerpoint/2010/main" val="750104532"/>
       </p:ext>
     </p:extLst>
   </p:cSld>
@@ -6335,12 +6253,6 @@
               <a:t>Scott S</a:t>
             </a:r>
           </a:p>
-          <a:p>
-            <a:r>
-              <a:rPr lang="en-US" dirty="0"/>
-              <a:t>Engineering the feature, confirming viability </a:t>
-            </a:r>
-          </a:p>
         </p:txBody>
       </p:sp>
       <p:sp>
@@ -6369,7 +6281,7 @@
     </p:spTree>
     <p:extLst>
       <p:ext uri="{BB962C8B-B14F-4D97-AF65-F5344CB8AC3E}">
-        <p14:creationId xmlns:p14="http://schemas.microsoft.com/office/powerpoint/2010/main" val="750104532"/>
+        <p14:creationId xmlns:p14="http://schemas.microsoft.com/office/powerpoint/2010/main" val="1355775321"/>
       </p:ext>
     </p:extLst>
   </p:cSld>
@@ -6456,7 +6368,7 @@
     </p:spTree>
     <p:extLst>
       <p:ext uri="{BB962C8B-B14F-4D97-AF65-F5344CB8AC3E}">
-        <p14:creationId xmlns:p14="http://schemas.microsoft.com/office/powerpoint/2010/main" val="1273570546"/>
+        <p14:creationId xmlns:p14="http://schemas.microsoft.com/office/powerpoint/2010/main" val="450208951"/>
       </p:ext>
     </p:extLst>
   </p:cSld>
@@ -6512,7 +6424,7 @@
           <a:p>
             <a:r>
               <a:rPr lang="en-US" dirty="0"/>
-              <a:t>Scott S</a:t>
+              <a:t>Alex M</a:t>
             </a:r>
           </a:p>
         </p:txBody>
@@ -6543,7 +6455,7 @@
     </p:spTree>
     <p:extLst>
       <p:ext uri="{BB962C8B-B14F-4D97-AF65-F5344CB8AC3E}">
-        <p14:creationId xmlns:p14="http://schemas.microsoft.com/office/powerpoint/2010/main" val="450208951"/>
+        <p14:creationId xmlns:p14="http://schemas.microsoft.com/office/powerpoint/2010/main" val="1949708796"/>
       </p:ext>
     </p:extLst>
   </p:cSld>
@@ -10926,10 +10838,10 @@
       </p:grpSpPr>
       <p:sp useBgFill="1">
         <p:nvSpPr>
-          <p:cNvPr id="9" name="Rectangle 8">
+          <p:cNvPr id="73" name="Rectangle 72">
             <a:extLst>
               <a:ext uri="{FF2B5EF4-FFF2-40B4-BE49-F238E27FC236}">
-                <a16:creationId xmlns:a16="http://schemas.microsoft.com/office/drawing/2014/main" id="{1C8B38D4-9D92-4608-A16B-260E8CC21335}"/>
+                <a16:creationId xmlns:a16="http://schemas.microsoft.com/office/drawing/2014/main" id="{E7218290-08E7-4AB8-8549-F625B01F0DCB}"/>
               </a:ext>
               <a:ext uri="{C183D7F6-B498-43B3-948B-1728B52AA6E4}">
                 <adec:decorative xmlns:adec="http://schemas.microsoft.com/office/drawing/2017/decorative" val="1"/>
@@ -11005,188 +10917,6 @@
           <p:cNvPr id="2" name="Title 1">
             <a:extLst>
               <a:ext uri="{FF2B5EF4-FFF2-40B4-BE49-F238E27FC236}">
-                <a16:creationId xmlns:a16="http://schemas.microsoft.com/office/drawing/2014/main" id="{C9BEEC52-39E9-4BA9-A81C-9027A39E20AA}"/>
-              </a:ext>
-            </a:extLst>
-          </p:cNvPr>
-          <p:cNvSpPr>
-            <a:spLocks noGrp="1"/>
-          </p:cNvSpPr>
-          <p:nvPr>
-            <p:ph type="title"/>
-          </p:nvPr>
-        </p:nvSpPr>
-        <p:spPr>
-          <a:xfrm>
-            <a:off x="1524000" y="762001"/>
-            <a:ext cx="9144000" cy="869092"/>
-          </a:xfrm>
-        </p:spPr>
-        <p:txBody>
-          <a:bodyPr>
-            <a:normAutofit/>
-          </a:bodyPr>
-          <a:lstStyle/>
-          <a:p>
-            <a:pPr algn="ctr"/>
-            <a:r>
-              <a:rPr lang="en-US" dirty="0"/>
-              <a:t>Results</a:t>
-            </a:r>
-            <a:endParaRPr lang="en-US"/>
-          </a:p>
-        </p:txBody>
-      </p:sp>
-      <p:graphicFrame>
-        <p:nvGraphicFramePr>
-          <p:cNvPr id="5" name="Content Placeholder 2">
-            <a:extLst>
-              <a:ext uri="{FF2B5EF4-FFF2-40B4-BE49-F238E27FC236}">
-                <a16:creationId xmlns:a16="http://schemas.microsoft.com/office/drawing/2014/main" id="{3B681F15-1270-4BB6-AD52-D13B52832619}"/>
-              </a:ext>
-            </a:extLst>
-          </p:cNvPr>
-          <p:cNvGraphicFramePr>
-            <a:graphicFrameLocks noGrp="1"/>
-          </p:cNvGraphicFramePr>
-          <p:nvPr>
-            <p:ph idx="1"/>
-            <p:extLst>
-              <p:ext uri="{D42A27DB-BD31-4B8C-83A1-F6EECF244321}">
-                <p14:modId xmlns:p14="http://schemas.microsoft.com/office/powerpoint/2010/main" val="189656726"/>
-              </p:ext>
-            </p:extLst>
-          </p:nvPr>
-        </p:nvGraphicFramePr>
-        <p:xfrm>
-          <a:off x="1430338" y="2286000"/>
-          <a:ext cx="9237662" cy="3810000"/>
-        </p:xfrm>
-        <a:graphic>
-          <a:graphicData uri="http://schemas.openxmlformats.org/drawingml/2006/diagram">
-            <dgm:relIds xmlns:dgm="http://schemas.openxmlformats.org/drawingml/2006/diagram" xmlns:r="http://schemas.openxmlformats.org/officeDocument/2006/relationships" r:dm="rId3" r:lo="rId4" r:qs="rId5" r:cs="rId6"/>
-          </a:graphicData>
-        </a:graphic>
-      </p:graphicFrame>
-    </p:spTree>
-    <p:extLst>
-      <p:ext uri="{BB962C8B-B14F-4D97-AF65-F5344CB8AC3E}">
-        <p14:creationId xmlns:p14="http://schemas.microsoft.com/office/powerpoint/2010/main" val="2920240880"/>
-      </p:ext>
-    </p:extLst>
-  </p:cSld>
-  <p:clrMapOvr>
-    <a:masterClrMapping/>
-  </p:clrMapOvr>
-</p:sld>
-</file>
-
-<file path=ppt/slides/slide11.xml><?xml version="1.0" encoding="utf-8"?>
-<p:sld xmlns:a="http://schemas.openxmlformats.org/drawingml/2006/main" xmlns:r="http://schemas.openxmlformats.org/officeDocument/2006/relationships" xmlns:p="http://schemas.openxmlformats.org/presentationml/2006/main">
-  <p:cSld>
-    <p:bg>
-      <p:bgPr>
-        <a:solidFill>
-          <a:schemeClr val="bg1"/>
-        </a:solidFill>
-        <a:effectLst/>
-      </p:bgPr>
-    </p:bg>
-    <p:spTree>
-      <p:nvGrpSpPr>
-        <p:cNvPr id="1" name=""/>
-        <p:cNvGrpSpPr/>
-        <p:nvPr/>
-      </p:nvGrpSpPr>
-      <p:grpSpPr>
-        <a:xfrm>
-          <a:off x="0" y="0"/>
-          <a:ext cx="0" cy="0"/>
-          <a:chOff x="0" y="0"/>
-          <a:chExt cx="0" cy="0"/>
-        </a:xfrm>
-      </p:grpSpPr>
-      <p:sp useBgFill="1">
-        <p:nvSpPr>
-          <p:cNvPr id="73" name="Rectangle 72">
-            <a:extLst>
-              <a:ext uri="{FF2B5EF4-FFF2-40B4-BE49-F238E27FC236}">
-                <a16:creationId xmlns:a16="http://schemas.microsoft.com/office/drawing/2014/main" id="{E7218290-08E7-4AB8-8549-F625B01F0DCB}"/>
-              </a:ext>
-              <a:ext uri="{C183D7F6-B498-43B3-948B-1728B52AA6E4}">
-                <adec:decorative xmlns:adec="http://schemas.microsoft.com/office/drawing/2017/decorative" val="1"/>
-              </a:ext>
-            </a:extLst>
-          </p:cNvPr>
-          <p:cNvSpPr>
-            <a:spLocks noGrp="1" noRot="1" noChangeAspect="1" noMove="1" noResize="1" noEditPoints="1" noAdjustHandles="1" noChangeArrowheads="1" noChangeShapeType="1" noTextEdit="1"/>
-          </p:cNvSpPr>
-          <p:nvPr>
-            <p:extLst>
-              <p:ext uri="{386F3935-93C4-4BCD-93E2-E3B085C9AB24}">
-                <p16:designElem xmlns:p16="http://schemas.microsoft.com/office/powerpoint/2015/main" val="1"/>
-              </p:ext>
-            </p:extLst>
-          </p:nvPr>
-        </p:nvSpPr>
-        <p:spPr>
-          <a:xfrm>
-            <a:off x="0" y="0"/>
-            <a:ext cx="12192000" cy="6858000"/>
-          </a:xfrm>
-          <a:prstGeom prst="rect">
-            <a:avLst/>
-          </a:prstGeom>
-          <a:ln w="12700" cap="flat" cmpd="sng" algn="ctr">
-            <a:noFill/>
-            <a:prstDash val="solid"/>
-            <a:miter lim="800000"/>
-          </a:ln>
-          <a:effectLst/>
-          <a:extLst>
-            <a:ext uri="{91240B29-F687-4F45-9708-019B960494DF}">
-              <a14:hiddenLine xmlns:a14="http://schemas.microsoft.com/office/drawing/2010/main" w="12700" cap="flat" cmpd="sng" algn="ctr">
-                <a:solidFill>
-                  <a:schemeClr val="accent1">
-                    <a:shade val="50000"/>
-                  </a:schemeClr>
-                </a:solidFill>
-                <a:prstDash val="solid"/>
-                <a:miter lim="800000"/>
-              </a14:hiddenLine>
-            </a:ext>
-          </a:extLst>
-        </p:spPr>
-        <p:style>
-          <a:lnRef idx="2">
-            <a:schemeClr val="accent1">
-              <a:shade val="50000"/>
-            </a:schemeClr>
-          </a:lnRef>
-          <a:fillRef idx="1">
-            <a:schemeClr val="accent1"/>
-          </a:fillRef>
-          <a:effectRef idx="0">
-            <a:schemeClr val="accent1"/>
-          </a:effectRef>
-          <a:fontRef idx="minor">
-            <a:schemeClr val="lt1"/>
-          </a:fontRef>
-        </p:style>
-        <p:txBody>
-          <a:bodyPr rtlCol="0" anchor="ctr"/>
-          <a:lstStyle/>
-          <a:p>
-            <a:pPr algn="ctr"/>
-            <a:endParaRPr lang="en-US"/>
-          </a:p>
-        </p:txBody>
-      </p:sp>
-      <p:sp>
-        <p:nvSpPr>
-          <p:cNvPr id="2" name="Title 1">
-            <a:extLst>
-              <a:ext uri="{FF2B5EF4-FFF2-40B4-BE49-F238E27FC236}">
                 <a16:creationId xmlns:a16="http://schemas.microsoft.com/office/drawing/2014/main" id="{615843F1-DF3D-4457-8065-C4865AF22F8D}"/>
               </a:ext>
             </a:extLst>
@@ -11251,8 +10981,8 @@
               </a:lnSpc>
             </a:pPr>
             <a:r>
-              <a:rPr lang="en-US" sz="1500"/>
-              <a:t>Add more location data</a:t>
+              <a:rPr lang="en-US" sz="2000" dirty="0"/>
+              <a:t>Add location data</a:t>
             </a:r>
           </a:p>
           <a:p>
@@ -11262,19 +10992,8 @@
               </a:lnSpc>
             </a:pPr>
             <a:r>
-              <a:rPr lang="en-US" sz="1500"/>
-              <a:t>Feature engineering with Condition and Grade </a:t>
-            </a:r>
-          </a:p>
-          <a:p>
-            <a:pPr lvl="1">
-              <a:lnSpc>
-                <a:spcPct val="120000"/>
-              </a:lnSpc>
-            </a:pPr>
-            <a:r>
-              <a:rPr lang="en-US" sz="1500"/>
-              <a:t>	Identify relationships with Year Built and Year Renovated</a:t>
+              <a:rPr lang="en-US" sz="2000" dirty="0"/>
+              <a:t>Further feature engineering with Condition and Grade </a:t>
             </a:r>
           </a:p>
           <a:p>
@@ -11284,8 +11003,8 @@
               </a:lnSpc>
             </a:pPr>
             <a:r>
-              <a:rPr lang="en-US" sz="1500"/>
-              <a:t>Explore room number and type</a:t>
+              <a:rPr lang="en-US" sz="2000" dirty="0"/>
+              <a:t>Leverage zip code data </a:t>
             </a:r>
           </a:p>
           <a:p>
@@ -11295,41 +11014,8 @@
               </a:lnSpc>
             </a:pPr>
             <a:r>
-              <a:rPr lang="en-US" sz="1500"/>
-              <a:t>Leverage zip code data </a:t>
-            </a:r>
-          </a:p>
-          <a:p>
-            <a:pPr>
-              <a:lnSpc>
-                <a:spcPct val="120000"/>
-              </a:lnSpc>
-            </a:pPr>
-            <a:r>
-              <a:rPr lang="en-US" sz="1500"/>
+              <a:rPr lang="en-US" sz="2000" dirty="0"/>
               <a:t>Examine properties with multiple sales records</a:t>
-            </a:r>
-          </a:p>
-          <a:p>
-            <a:pPr lvl="1">
-              <a:lnSpc>
-                <a:spcPct val="120000"/>
-              </a:lnSpc>
-            </a:pPr>
-            <a:r>
-              <a:rPr lang="en-US" sz="1500"/>
-              <a:t>	Price changes</a:t>
-            </a:r>
-          </a:p>
-          <a:p>
-            <a:pPr lvl="1">
-              <a:lnSpc>
-                <a:spcPct val="120000"/>
-              </a:lnSpc>
-            </a:pPr>
-            <a:r>
-              <a:rPr lang="en-US" sz="1500"/>
-              <a:t>	Feature changes</a:t>
             </a:r>
           </a:p>
         </p:txBody>
@@ -11424,7 +11110,7 @@
 </p:sld>
 </file>
 
-<file path=ppt/slides/slide12.xml><?xml version="1.0" encoding="utf-8"?>
+<file path=ppt/slides/slide11.xml><?xml version="1.0" encoding="utf-8"?>
 <p:sld xmlns:a="http://schemas.openxmlformats.org/drawingml/2006/main" xmlns:r="http://schemas.openxmlformats.org/officeDocument/2006/relationships" xmlns:p="http://schemas.openxmlformats.org/presentationml/2006/main">
   <p:cSld>
     <p:bg>
@@ -11852,6 +11538,45 @@
           </p:txBody>
         </p:sp>
       </p:grpSp>
+      <p:sp>
+        <p:nvSpPr>
+          <p:cNvPr id="4" name="TextBox 3">
+            <a:extLst>
+              <a:ext uri="{FF2B5EF4-FFF2-40B4-BE49-F238E27FC236}">
+                <a16:creationId xmlns:a16="http://schemas.microsoft.com/office/drawing/2014/main" id="{99E6BDFE-DA8B-4BCD-A188-B2073282F8F4}"/>
+              </a:ext>
+            </a:extLst>
+          </p:cNvPr>
+          <p:cNvSpPr txBox="1"/>
+          <p:nvPr/>
+        </p:nvSpPr>
+        <p:spPr>
+          <a:xfrm>
+            <a:off x="6222110" y="6058069"/>
+            <a:ext cx="5843779" cy="338554"/>
+          </a:xfrm>
+          <a:prstGeom prst="rect">
+            <a:avLst/>
+          </a:prstGeom>
+          <a:noFill/>
+        </p:spPr>
+        <p:txBody>
+          <a:bodyPr wrap="none" rtlCol="0">
+            <a:spAutoFit/>
+          </a:bodyPr>
+          <a:lstStyle/>
+          <a:p>
+            <a:r>
+              <a:rPr lang="en-US" sz="1600" dirty="0">
+                <a:solidFill>
+                  <a:srgbClr val="EAA032"/>
+                </a:solidFill>
+              </a:rPr>
+              <a:t>https://github.com/Shoemaker703/home_sales_analysis_project</a:t>
+            </a:r>
+          </a:p>
+        </p:txBody>
+      </p:sp>
     </p:spTree>
     <p:extLst>
       <p:ext uri="{BB962C8B-B14F-4D97-AF65-F5344CB8AC3E}">
@@ -12411,150 +12136,6 @@
 <file path=ppt/slides/slide4.xml><?xml version="1.0" encoding="utf-8"?>
 <p:sld xmlns:a="http://schemas.openxmlformats.org/drawingml/2006/main" xmlns:r="http://schemas.openxmlformats.org/officeDocument/2006/relationships" xmlns:p="http://schemas.openxmlformats.org/presentationml/2006/main">
   <p:cSld>
-    <p:spTree>
-      <p:nvGrpSpPr>
-        <p:cNvPr id="1" name=""/>
-        <p:cNvGrpSpPr/>
-        <p:nvPr/>
-      </p:nvGrpSpPr>
-      <p:grpSpPr>
-        <a:xfrm>
-          <a:off x="0" y="0"/>
-          <a:ext cx="0" cy="0"/>
-          <a:chOff x="0" y="0"/>
-          <a:chExt cx="0" cy="0"/>
-        </a:xfrm>
-      </p:grpSpPr>
-      <p:sp>
-        <p:nvSpPr>
-          <p:cNvPr id="2" name="Title 1">
-            <a:extLst>
-              <a:ext uri="{FF2B5EF4-FFF2-40B4-BE49-F238E27FC236}">
-                <a16:creationId xmlns:a16="http://schemas.microsoft.com/office/drawing/2014/main" id="{517847ED-00AB-4A3F-9EAD-FBCD1FFEB233}"/>
-              </a:ext>
-            </a:extLst>
-          </p:cNvPr>
-          <p:cNvSpPr>
-            <a:spLocks noGrp="1"/>
-          </p:cNvSpPr>
-          <p:nvPr>
-            <p:ph type="title"/>
-          </p:nvPr>
-        </p:nvSpPr>
-        <p:spPr/>
-        <p:txBody>
-          <a:bodyPr/>
-          <a:lstStyle/>
-          <a:p>
-            <a:r>
-              <a:rPr lang="en-US" dirty="0"/>
-              <a:t>Data Characteristics</a:t>
-            </a:r>
-          </a:p>
-        </p:txBody>
-      </p:sp>
-      <p:sp>
-        <p:nvSpPr>
-          <p:cNvPr id="3" name="Content Placeholder 2">
-            <a:extLst>
-              <a:ext uri="{FF2B5EF4-FFF2-40B4-BE49-F238E27FC236}">
-                <a16:creationId xmlns:a16="http://schemas.microsoft.com/office/drawing/2014/main" id="{495C69C2-8FA7-464A-9A6E-A95718F6200D}"/>
-              </a:ext>
-            </a:extLst>
-          </p:cNvPr>
-          <p:cNvSpPr>
-            <a:spLocks noGrp="1"/>
-          </p:cNvSpPr>
-          <p:nvPr>
-            <p:ph idx="1"/>
-          </p:nvPr>
-        </p:nvSpPr>
-        <p:spPr/>
-        <p:txBody>
-          <a:bodyPr/>
-          <a:lstStyle/>
-          <a:p>
-            <a:r>
-              <a:rPr lang="en-US" dirty="0"/>
-              <a:t>&gt; 21,500  sales records from  Kings County for 2014 &amp; 2015</a:t>
-            </a:r>
-          </a:p>
-          <a:p>
-            <a:r>
-              <a:rPr lang="en-US" dirty="0"/>
-              <a:t>20 separate property features recorded for each sale</a:t>
-            </a:r>
-          </a:p>
-          <a:p>
-            <a:pPr lvl="1"/>
-            <a:r>
-              <a:rPr lang="en-US" dirty="0"/>
-              <a:t>	Additional features engineered  by Copper Consulting</a:t>
-            </a:r>
-          </a:p>
-          <a:p>
-            <a:r>
-              <a:rPr lang="en-US" dirty="0"/>
-              <a:t>Additional location data from </a:t>
-            </a:r>
-            <a:r>
-              <a:rPr lang="en-US" dirty="0">
-                <a:hlinkClick r:id="rId3"/>
-              </a:rPr>
-              <a:t>King County GIS Open Data</a:t>
-            </a:r>
-            <a:endParaRPr lang="en-US" dirty="0"/>
-          </a:p>
-          <a:p>
-            <a:pPr lvl="1"/>
-            <a:r>
-              <a:rPr lang="en-US" dirty="0"/>
-              <a:t>	Police stations</a:t>
-            </a:r>
-          </a:p>
-          <a:p>
-            <a:pPr lvl="1"/>
-            <a:r>
-              <a:rPr lang="en-US" dirty="0"/>
-              <a:t>	Medical centers</a:t>
-            </a:r>
-          </a:p>
-          <a:p>
-            <a:pPr lvl="1"/>
-            <a:r>
-              <a:rPr lang="en-US" dirty="0"/>
-              <a:t>	Schools</a:t>
-            </a:r>
-          </a:p>
-          <a:p>
-            <a:pPr lvl="1"/>
-            <a:r>
-              <a:rPr lang="en-US" dirty="0"/>
-              <a:t>	Farmers Markets</a:t>
-            </a:r>
-          </a:p>
-          <a:p>
-            <a:pPr lvl="1"/>
-            <a:endParaRPr lang="en-US" dirty="0"/>
-          </a:p>
-        </p:txBody>
-      </p:sp>
-    </p:spTree>
-    <p:extLst>
-      <p:ext uri="{BB962C8B-B14F-4D97-AF65-F5344CB8AC3E}">
-        <p14:creationId xmlns:p14="http://schemas.microsoft.com/office/powerpoint/2010/main" val="2098201640"/>
-      </p:ext>
-    </p:extLst>
-  </p:cSld>
-  <p:clrMapOvr>
-    <a:masterClrMapping/>
-  </p:clrMapOvr>
-</p:sld>
-</file>
-
-<file path=ppt/slides/slide5.xml><?xml version="1.0" encoding="utf-8"?>
-<p:sld xmlns:a="http://schemas.openxmlformats.org/drawingml/2006/main" xmlns:r="http://schemas.openxmlformats.org/officeDocument/2006/relationships" xmlns:p="http://schemas.openxmlformats.org/presentationml/2006/main">
-  <p:cSld>
     <p:bg>
       <p:bgPr>
         <a:solidFill>
@@ -12579,10 +12160,10 @@
       </p:grpSpPr>
       <p:sp useBgFill="1">
         <p:nvSpPr>
-          <p:cNvPr id="12" name="Rectangle 11">
+          <p:cNvPr id="73" name="Rectangle 72">
             <a:extLst>
               <a:ext uri="{FF2B5EF4-FFF2-40B4-BE49-F238E27FC236}">
-                <a16:creationId xmlns:a16="http://schemas.microsoft.com/office/drawing/2014/main" id="{9184DF83-39E6-4BDC-9E23-17F25AB44C55}"/>
+                <a16:creationId xmlns:a16="http://schemas.microsoft.com/office/drawing/2014/main" id="{E7218290-08E7-4AB8-8549-F625B01F0DCB}"/>
               </a:ext>
               <a:ext uri="{C183D7F6-B498-43B3-948B-1728B52AA6E4}">
                 <adec:decorative xmlns:adec="http://schemas.microsoft.com/office/drawing/2017/decorative" val="1"/>
@@ -12658,7 +12239,7 @@
           <p:cNvPr id="2" name="Title 1">
             <a:extLst>
               <a:ext uri="{FF2B5EF4-FFF2-40B4-BE49-F238E27FC236}">
-                <a16:creationId xmlns:a16="http://schemas.microsoft.com/office/drawing/2014/main" id="{80A9CAF6-973D-469B-A434-619CDB3E00CE}"/>
+                <a16:creationId xmlns:a16="http://schemas.microsoft.com/office/drawing/2014/main" id="{517847ED-00AB-4A3F-9EAD-FBCD1FFEB233}"/>
               </a:ext>
             </a:extLst>
           </p:cNvPr>
@@ -12671,8 +12252,8 @@
         </p:nvSpPr>
         <p:spPr>
           <a:xfrm>
-            <a:off x="1104900" y="762001"/>
-            <a:ext cx="4229100" cy="1141004"/>
+            <a:off x="1104897" y="762001"/>
+            <a:ext cx="5333365" cy="1141004"/>
           </a:xfrm>
         </p:spPr>
         <p:txBody>
@@ -12683,7 +12264,7 @@
           <a:p>
             <a:r>
               <a:rPr lang="en-US" dirty="0"/>
-              <a:t>EDA</a:t>
+              <a:t>Data Characteristics</a:t>
             </a:r>
           </a:p>
         </p:txBody>
@@ -12693,7 +12274,7 @@
           <p:cNvPr id="3" name="Content Placeholder 2">
             <a:extLst>
               <a:ext uri="{FF2B5EF4-FFF2-40B4-BE49-F238E27FC236}">
-                <a16:creationId xmlns:a16="http://schemas.microsoft.com/office/drawing/2014/main" id="{46C68E2A-C157-44BD-B01B-690251A30E77}"/>
+                <a16:creationId xmlns:a16="http://schemas.microsoft.com/office/drawing/2014/main" id="{495C69C2-8FA7-464A-9A6E-A95718F6200D}"/>
               </a:ext>
             </a:extLst>
           </p:cNvPr>
@@ -12706,8 +12287,8 @@
         </p:nvSpPr>
         <p:spPr>
           <a:xfrm>
-            <a:off x="1104900" y="2286000"/>
-            <a:ext cx="4229100" cy="3810000"/>
+            <a:off x="1104897" y="2259698"/>
+            <a:ext cx="4991103" cy="3836301"/>
           </a:xfrm>
         </p:spPr>
         <p:txBody>
@@ -12716,29 +12297,200 @@
           </a:bodyPr>
           <a:lstStyle/>
           <a:p>
-            <a:r>
-              <a:rPr lang="en-US" dirty="0"/>
-              <a:t>Examined correlation between price and other features</a:t>
-            </a:r>
+            <a:pPr>
+              <a:lnSpc>
+                <a:spcPct val="120000"/>
+              </a:lnSpc>
+            </a:pPr>
+            <a:r>
+              <a:rPr lang="en-US" sz="1500"/>
+              <a:t>&gt; 21,500  sales records from  Kings County </a:t>
+            </a:r>
+          </a:p>
+          <a:p>
+            <a:pPr>
+              <a:lnSpc>
+                <a:spcPct val="120000"/>
+              </a:lnSpc>
+            </a:pPr>
+            <a:r>
+              <a:rPr lang="en-US" sz="1500"/>
+              <a:t>2014 &amp; 2015 house sales</a:t>
+            </a:r>
+          </a:p>
+          <a:p>
+            <a:pPr>
+              <a:lnSpc>
+                <a:spcPct val="120000"/>
+              </a:lnSpc>
+            </a:pPr>
+            <a:r>
+              <a:rPr lang="en-US" sz="1500"/>
+              <a:t>20 separate property features recorded for each sale</a:t>
+            </a:r>
+          </a:p>
+          <a:p>
+            <a:pPr lvl="1">
+              <a:lnSpc>
+                <a:spcPct val="120000"/>
+              </a:lnSpc>
+            </a:pPr>
+            <a:r>
+              <a:rPr lang="en-US" sz="1500"/>
+              <a:t>	Additional features engineered  by Copper Consulting</a:t>
+            </a:r>
+          </a:p>
+          <a:p>
+            <a:pPr>
+              <a:lnSpc>
+                <a:spcPct val="120000"/>
+              </a:lnSpc>
+            </a:pPr>
+            <a:r>
+              <a:rPr lang="en-US" sz="1500"/>
+              <a:t>Additional location data from </a:t>
+            </a:r>
+            <a:r>
+              <a:rPr lang="en-US" sz="1500">
+                <a:hlinkClick r:id="rId3"/>
+              </a:rPr>
+              <a:t>King County GIS Open Data</a:t>
+            </a:r>
+            <a:endParaRPr lang="en-US" sz="1500"/>
+          </a:p>
+          <a:p>
+            <a:pPr lvl="1">
+              <a:lnSpc>
+                <a:spcPct val="120000"/>
+              </a:lnSpc>
+            </a:pPr>
+            <a:r>
+              <a:rPr lang="en-US" sz="1500"/>
+              <a:t>	Police stations</a:t>
+            </a:r>
+          </a:p>
+          <a:p>
+            <a:pPr lvl="1">
+              <a:lnSpc>
+                <a:spcPct val="120000"/>
+              </a:lnSpc>
+            </a:pPr>
+            <a:r>
+              <a:rPr lang="en-US" sz="1500"/>
+              <a:t>	Medical centers</a:t>
+            </a:r>
+          </a:p>
+          <a:p>
+            <a:pPr lvl="1">
+              <a:lnSpc>
+                <a:spcPct val="120000"/>
+              </a:lnSpc>
+            </a:pPr>
+            <a:r>
+              <a:rPr lang="en-US" sz="1500"/>
+              <a:t>	Schools</a:t>
+            </a:r>
+          </a:p>
+          <a:p>
+            <a:pPr lvl="1">
+              <a:lnSpc>
+                <a:spcPct val="120000"/>
+              </a:lnSpc>
+            </a:pPr>
+            <a:r>
+              <a:rPr lang="en-US" sz="1500"/>
+              <a:t>	Farmers Markets</a:t>
+            </a:r>
+          </a:p>
+          <a:p>
+            <a:pPr lvl="1">
+              <a:lnSpc>
+                <a:spcPct val="120000"/>
+              </a:lnSpc>
+            </a:pPr>
+            <a:endParaRPr lang="en-US" sz="1500"/>
+          </a:p>
+        </p:txBody>
+      </p:sp>
+      <p:sp>
+        <p:nvSpPr>
+          <p:cNvPr id="75" name="Oval 74">
+            <a:extLst>
+              <a:ext uri="{FF2B5EF4-FFF2-40B4-BE49-F238E27FC236}">
+                <a16:creationId xmlns:a16="http://schemas.microsoft.com/office/drawing/2014/main" id="{CE9A9457-874F-4EEB-BF07-9CEA561C1196}"/>
+              </a:ext>
+              <a:ext uri="{C183D7F6-B498-43B3-948B-1728B52AA6E4}">
+                <adec:decorative xmlns:adec="http://schemas.microsoft.com/office/drawing/2017/decorative" val="1"/>
+              </a:ext>
+            </a:extLst>
+          </p:cNvPr>
+          <p:cNvSpPr>
+            <a:spLocks noGrp="1" noRot="1" noChangeAspect="1" noMove="1" noResize="1" noEditPoints="1" noAdjustHandles="1" noChangeArrowheads="1" noChangeShapeType="1" noTextEdit="1"/>
+          </p:cNvSpPr>
+          <p:nvPr>
+            <p:extLst>
+              <p:ext uri="{386F3935-93C4-4BCD-93E2-E3B085C9AB24}">
+                <p16:designElem xmlns:p16="http://schemas.microsoft.com/office/powerpoint/2015/main" val="1"/>
+              </p:ext>
+            </p:extLst>
+          </p:nvPr>
+        </p:nvSpPr>
+        <p:spPr>
+          <a:xfrm>
+            <a:off x="6639965" y="1114197"/>
+            <a:ext cx="4629606" cy="4629606"/>
+          </a:xfrm>
+          <a:prstGeom prst="ellipse">
+            <a:avLst/>
+          </a:prstGeom>
+          <a:solidFill>
+            <a:schemeClr val="tx1"/>
+          </a:solidFill>
+          <a:ln>
+            <a:noFill/>
+          </a:ln>
+        </p:spPr>
+        <p:style>
+          <a:lnRef idx="2">
+            <a:schemeClr val="accent1">
+              <a:shade val="50000"/>
+            </a:schemeClr>
+          </a:lnRef>
+          <a:fillRef idx="1">
+            <a:schemeClr val="accent1"/>
+          </a:fillRef>
+          <a:effectRef idx="0">
+            <a:schemeClr val="accent1"/>
+          </a:effectRef>
+          <a:fontRef idx="minor">
+            <a:schemeClr val="lt1"/>
+          </a:fontRef>
+        </p:style>
+        <p:txBody>
+          <a:bodyPr rtlCol="0" anchor="ctr"/>
+          <a:lstStyle/>
+          <a:p>
+            <a:pPr algn="ctr"/>
+            <a:endParaRPr lang="en-US"/>
           </a:p>
         </p:txBody>
       </p:sp>
       <p:pic>
         <p:nvPicPr>
-          <p:cNvPr id="11" name="Picture 10" descr="A picture containing table&#10;&#10;Description automatically generated">
+          <p:cNvPr id="1028" name="Picture 4" descr="King County updates logo to reflect namesake - King County">
             <a:extLst>
               <a:ext uri="{FF2B5EF4-FFF2-40B4-BE49-F238E27FC236}">
-                <a16:creationId xmlns:a16="http://schemas.microsoft.com/office/drawing/2014/main" id="{784EDFBE-BB19-4AD6-9656-C32017CAD1CF}"/>
+                <a16:creationId xmlns:a16="http://schemas.microsoft.com/office/drawing/2014/main" id="{175FFC22-2B16-4146-87CB-A51441A47CA6}"/>
               </a:ext>
             </a:extLst>
           </p:cNvPr>
           <p:cNvPicPr>
-            <a:picLocks noChangeAspect="1"/>
+            <a:picLocks noChangeAspect="1" noChangeArrowheads="1"/>
           </p:cNvPicPr>
           <p:nvPr/>
         </p:nvPicPr>
         <p:blipFill>
-          <a:blip r:embed="rId3">
+          <a:blip r:embed="rId4">
             <a:extLst>
               <a:ext uri="{28A0092B-C50C-407E-A947-70E740481C1C}">
                 <a14:useLocalDpi xmlns:a14="http://schemas.microsoft.com/office/drawing/2010/main" val="0"/>
@@ -12749,30 +12501,40 @@
             <a:fillRect/>
           </a:stretch>
         </p:blipFill>
-        <p:spPr>
+        <p:spPr bwMode="auto">
           <a:xfrm>
-            <a:off x="5823935" y="571500"/>
-            <a:ext cx="6033606" cy="5714999"/>
+            <a:off x="7341630" y="2283015"/>
+            <a:ext cx="3226275" cy="2291969"/>
           </a:xfrm>
           <a:prstGeom prst="rect">
             <a:avLst/>
           </a:prstGeom>
+          <a:noFill/>
+          <a:extLst>
+            <a:ext uri="{909E8E84-426E-40DD-AFC4-6F175D3DCCD1}">
+              <a14:hiddenFill xmlns:a14="http://schemas.microsoft.com/office/drawing/2010/main">
+                <a:solidFill>
+                  <a:srgbClr val="FFFFFF"/>
+                </a:solidFill>
+              </a14:hiddenFill>
+            </a:ext>
+          </a:extLst>
         </p:spPr>
       </p:pic>
     </p:spTree>
     <p:extLst>
       <p:ext uri="{BB962C8B-B14F-4D97-AF65-F5344CB8AC3E}">
-        <p14:creationId xmlns:p14="http://schemas.microsoft.com/office/powerpoint/2010/main" val="2578843159"/>
+        <p14:creationId xmlns:p14="http://schemas.microsoft.com/office/powerpoint/2010/main" val="2098201640"/>
       </p:ext>
     </p:extLst>
   </p:cSld>
   <p:clrMapOvr>
-    <a:overrideClrMapping bg1="lt1" tx1="dk1" bg2="lt2" tx2="dk2" accent1="accent1" accent2="accent2" accent3="accent3" accent4="accent4" accent5="accent5" accent6="accent6" hlink="hlink" folHlink="folHlink"/>
+    <a:masterClrMapping/>
   </p:clrMapOvr>
 </p:sld>
 </file>
 
-<file path=ppt/slides/slide6.xml><?xml version="1.0" encoding="utf-8"?>
+<file path=ppt/slides/slide5.xml><?xml version="1.0" encoding="utf-8"?>
 <p:sld xmlns:a="http://schemas.openxmlformats.org/drawingml/2006/main" xmlns:r="http://schemas.openxmlformats.org/officeDocument/2006/relationships" xmlns:p="http://schemas.openxmlformats.org/presentationml/2006/main">
   <p:cSld>
     <p:bg>
@@ -12797,64 +12559,12 @@
           <a:chExt cx="0" cy="0"/>
         </a:xfrm>
       </p:grpSpPr>
-      <p:cxnSp>
-        <p:nvCxnSpPr>
-          <p:cNvPr id="21" name="Straight Connector 20">
+      <p:sp useBgFill="1">
+        <p:nvSpPr>
+          <p:cNvPr id="12" name="Rectangle 11">
             <a:extLst>
               <a:ext uri="{FF2B5EF4-FFF2-40B4-BE49-F238E27FC236}">
-                <a16:creationId xmlns:a16="http://schemas.microsoft.com/office/drawing/2014/main" id="{AEED5540-64E5-4258-ABA4-753F07B71B38}"/>
-              </a:ext>
-              <a:ext uri="{C183D7F6-B498-43B3-948B-1728B52AA6E4}">
-                <adec:decorative xmlns:adec="http://schemas.microsoft.com/office/drawing/2017/decorative" val="1"/>
-              </a:ext>
-            </a:extLst>
-          </p:cNvPr>
-          <p:cNvCxnSpPr>
-            <a:cxnSpLocks noGrp="1" noRot="1" noChangeAspect="1" noMove="1" noResize="1" noEditPoints="1" noAdjustHandles="1" noChangeArrowheads="1" noChangeShapeType="1"/>
-          </p:cNvCxnSpPr>
-          <p:nvPr>
-            <p:extLst>
-              <p:ext uri="{386F3935-93C4-4BCD-93E2-E3B085C9AB24}">
-                <p16:designElem xmlns:p16="http://schemas.microsoft.com/office/powerpoint/2015/main" val="1"/>
-              </p:ext>
-            </p:extLst>
-          </p:nvPr>
-        </p:nvCxnSpPr>
-        <p:spPr>
-          <a:xfrm>
-            <a:off x="1524000" y="4571506"/>
-            <a:ext cx="971155" cy="0"/>
-          </a:xfrm>
-          <a:prstGeom prst="line">
-            <a:avLst/>
-          </a:prstGeom>
-          <a:ln w="31750">
-            <a:solidFill>
-              <a:schemeClr val="tx1"/>
-            </a:solidFill>
-          </a:ln>
-        </p:spPr>
-        <p:style>
-          <a:lnRef idx="1">
-            <a:schemeClr val="accent1"/>
-          </a:lnRef>
-          <a:fillRef idx="0">
-            <a:schemeClr val="accent1"/>
-          </a:fillRef>
-          <a:effectRef idx="0">
-            <a:schemeClr val="accent1"/>
-          </a:effectRef>
-          <a:fontRef idx="minor">
-            <a:schemeClr val="tx1"/>
-          </a:fontRef>
-        </p:style>
-      </p:cxnSp>
-      <p:sp useBgFill="1">
-        <p:nvSpPr>
-          <p:cNvPr id="23" name="Rectangle 22">
-            <a:extLst>
-              <a:ext uri="{FF2B5EF4-FFF2-40B4-BE49-F238E27FC236}">
-                <a16:creationId xmlns:a16="http://schemas.microsoft.com/office/drawing/2014/main" id="{E906F54D-04EF-4345-A564-7A7B57B6CEB3}"/>
+                <a16:creationId xmlns:a16="http://schemas.microsoft.com/office/drawing/2014/main" id="{9184DF83-39E6-4BDC-9E23-17F25AB44C55}"/>
               </a:ext>
               <a:ext uri="{C183D7F6-B498-43B3-948B-1728B52AA6E4}">
                 <adec:decorative xmlns:adec="http://schemas.microsoft.com/office/drawing/2017/decorative" val="1"/>
@@ -12927,116 +12637,137 @@
       </p:sp>
       <p:sp>
         <p:nvSpPr>
-          <p:cNvPr id="25" name="Rectangle 24">
+          <p:cNvPr id="2" name="Title 1">
             <a:extLst>
               <a:ext uri="{FF2B5EF4-FFF2-40B4-BE49-F238E27FC236}">
-                <a16:creationId xmlns:a16="http://schemas.microsoft.com/office/drawing/2014/main" id="{EA5F6DAB-03BF-4557-B78A-2B71C16E1BD1}"/>
-              </a:ext>
-              <a:ext uri="{C183D7F6-B498-43B3-948B-1728B52AA6E4}">
-                <adec:decorative xmlns:adec="http://schemas.microsoft.com/office/drawing/2017/decorative" val="1"/>
+                <a16:creationId xmlns:a16="http://schemas.microsoft.com/office/drawing/2014/main" id="{80A9CAF6-973D-469B-A434-619CDB3E00CE}"/>
               </a:ext>
             </a:extLst>
           </p:cNvPr>
           <p:cNvSpPr>
-            <a:spLocks noGrp="1" noRot="1" noChangeAspect="1" noMove="1" noResize="1" noEditPoints="1" noAdjustHandles="1" noChangeArrowheads="1" noChangeShapeType="1" noTextEdit="1"/>
+            <a:spLocks noGrp="1"/>
           </p:cNvSpPr>
           <p:nvPr>
-            <p:extLst>
-              <p:ext uri="{386F3935-93C4-4BCD-93E2-E3B085C9AB24}">
-                <p16:designElem xmlns:p16="http://schemas.microsoft.com/office/powerpoint/2015/main" val="1"/>
-              </p:ext>
-            </p:extLst>
+            <p:ph type="title"/>
           </p:nvPr>
         </p:nvSpPr>
         <p:spPr>
           <a:xfrm>
-            <a:off x="0" y="0"/>
-            <a:ext cx="12192000" cy="6858000"/>
+            <a:off x="929833" y="43119"/>
+            <a:ext cx="4229100" cy="1141004"/>
+          </a:xfrm>
+        </p:spPr>
+        <p:txBody>
+          <a:bodyPr>
+            <a:normAutofit/>
+          </a:bodyPr>
+          <a:lstStyle/>
+          <a:p>
+            <a:r>
+              <a:rPr lang="en-US" dirty="0"/>
+              <a:t>EDA</a:t>
+            </a:r>
+          </a:p>
+        </p:txBody>
+      </p:sp>
+      <p:pic>
+        <p:nvPicPr>
+          <p:cNvPr id="7" name="Picture 6" descr="Funnel chart&#10;&#10;Description automatically generated with medium confidence">
+            <a:extLst>
+              <a:ext uri="{FF2B5EF4-FFF2-40B4-BE49-F238E27FC236}">
+                <a16:creationId xmlns:a16="http://schemas.microsoft.com/office/drawing/2014/main" id="{DA32F8D3-B4A5-47B2-BD57-0B51218809BB}"/>
+              </a:ext>
+            </a:extLst>
+          </p:cNvPr>
+          <p:cNvPicPr>
+            <a:picLocks noChangeAspect="1"/>
+          </p:cNvPicPr>
+          <p:nvPr/>
+        </p:nvPicPr>
+        <p:blipFill>
+          <a:blip r:embed="rId3">
+            <a:extLst>
+              <a:ext uri="{28A0092B-C50C-407E-A947-70E740481C1C}">
+                <a14:useLocalDpi xmlns:a14="http://schemas.microsoft.com/office/drawing/2010/main" val="0"/>
+              </a:ext>
+            </a:extLst>
+          </a:blip>
+          <a:stretch>
+            <a:fillRect/>
+          </a:stretch>
+        </p:blipFill>
+        <p:spPr>
+          <a:xfrm>
+            <a:off x="281958" y="1464283"/>
+            <a:ext cx="11910042" cy="4433018"/>
+          </a:xfrm>
+          <a:prstGeom prst="rect">
+            <a:avLst/>
+          </a:prstGeom>
+        </p:spPr>
+      </p:pic>
+      <p:sp>
+        <p:nvSpPr>
+          <p:cNvPr id="3" name="Content Placeholder 2">
+            <a:extLst>
+              <a:ext uri="{FF2B5EF4-FFF2-40B4-BE49-F238E27FC236}">
+                <a16:creationId xmlns:a16="http://schemas.microsoft.com/office/drawing/2014/main" id="{46C68E2A-C157-44BD-B01B-690251A30E77}"/>
+              </a:ext>
+            </a:extLst>
+          </p:cNvPr>
+          <p:cNvSpPr>
+            <a:spLocks noGrp="1"/>
+          </p:cNvSpPr>
+          <p:nvPr>
+            <p:ph idx="1"/>
+          </p:nvPr>
+        </p:nvSpPr>
+        <p:spPr>
+          <a:xfrm>
+            <a:off x="2720117" y="699441"/>
+            <a:ext cx="6215537" cy="484682"/>
+          </a:xfrm>
+        </p:spPr>
+        <p:txBody>
+          <a:bodyPr>
+            <a:normAutofit/>
+          </a:bodyPr>
+          <a:lstStyle/>
+          <a:p>
+            <a:r>
+              <a:rPr lang="en-US" dirty="0"/>
+              <a:t>Examined correlation between price and other features</a:t>
+            </a:r>
+          </a:p>
+        </p:txBody>
+      </p:sp>
+      <p:sp>
+        <p:nvSpPr>
+          <p:cNvPr id="8" name="Rectangle 7">
+            <a:extLst>
+              <a:ext uri="{FF2B5EF4-FFF2-40B4-BE49-F238E27FC236}">
+                <a16:creationId xmlns:a16="http://schemas.microsoft.com/office/drawing/2014/main" id="{A5DEABC8-F6B6-49DB-9590-704B1DAAB09A}"/>
+              </a:ext>
+            </a:extLst>
+          </p:cNvPr>
+          <p:cNvSpPr/>
+          <p:nvPr/>
+        </p:nvSpPr>
+        <p:spPr>
+          <a:xfrm>
+            <a:off x="281958" y="1464283"/>
+            <a:ext cx="1442670" cy="4499325"/>
           </a:xfrm>
           <a:prstGeom prst="rect">
             <a:avLst/>
           </a:prstGeom>
           <a:solidFill>
-            <a:srgbClr val="000000"/>
+            <a:schemeClr val="bg1"/>
           </a:solidFill>
-          <a:ln w="12700" cap="flat" cmpd="sng" algn="ctr">
-            <a:noFill/>
-            <a:prstDash val="solid"/>
-            <a:miter lim="800000"/>
-          </a:ln>
-          <a:effectLst/>
-          <a:extLst>
-            <a:ext uri="{91240B29-F687-4F45-9708-019B960494DF}">
-              <a14:hiddenLine xmlns:a14="http://schemas.microsoft.com/office/drawing/2010/main" w="12700" cap="flat" cmpd="sng" algn="ctr">
-                <a:solidFill>
-                  <a:schemeClr val="accent1">
-                    <a:shade val="50000"/>
-                  </a:schemeClr>
-                </a:solidFill>
-                <a:prstDash val="solid"/>
-                <a:miter lim="800000"/>
-              </a14:hiddenLine>
-            </a:ext>
-          </a:extLst>
-        </p:spPr>
-        <p:style>
-          <a:lnRef idx="2">
-            <a:schemeClr val="accent1">
-              <a:shade val="50000"/>
-            </a:schemeClr>
-          </a:lnRef>
-          <a:fillRef idx="1">
-            <a:schemeClr val="accent1"/>
-          </a:fillRef>
-          <a:effectRef idx="0">
-            <a:schemeClr val="accent1"/>
-          </a:effectRef>
-          <a:fontRef idx="minor">
-            <a:schemeClr val="lt1"/>
-          </a:fontRef>
-        </p:style>
-        <p:txBody>
-          <a:bodyPr rtlCol="0" anchor="ctr"/>
-          <a:lstStyle/>
-          <a:p>
-            <a:pPr algn="ctr"/>
-            <a:endParaRPr lang="en-US"/>
-          </a:p>
-        </p:txBody>
-      </p:sp>
-      <p:sp useBgFill="1">
-        <p:nvSpPr>
-          <p:cNvPr id="27" name="Rectangle 26">
-            <a:extLst>
-              <a:ext uri="{FF2B5EF4-FFF2-40B4-BE49-F238E27FC236}">
-                <a16:creationId xmlns:a16="http://schemas.microsoft.com/office/drawing/2014/main" id="{4A63FA5D-402E-473D-AF05-018BE28B22FD}"/>
-              </a:ext>
-              <a:ext uri="{C183D7F6-B498-43B3-948B-1728B52AA6E4}">
-                <adec:decorative xmlns:adec="http://schemas.microsoft.com/office/drawing/2017/decorative" val="1"/>
-              </a:ext>
-            </a:extLst>
-          </p:cNvPr>
-          <p:cNvSpPr>
-            <a:spLocks noGrp="1" noRot="1" noChangeAspect="1" noMove="1" noResize="1" noEditPoints="1" noAdjustHandles="1" noChangeArrowheads="1" noChangeShapeType="1" noTextEdit="1"/>
-          </p:cNvSpPr>
-          <p:nvPr>
-            <p:extLst>
-              <p:ext uri="{386F3935-93C4-4BCD-93E2-E3B085C9AB24}">
-                <p16:designElem xmlns:p16="http://schemas.microsoft.com/office/powerpoint/2015/main" val="1"/>
-              </p:ext>
-            </p:extLst>
-          </p:nvPr>
-        </p:nvSpPr>
-        <p:spPr>
-          <a:xfrm>
-            <a:off x="762000" y="762003"/>
-            <a:ext cx="10667999" cy="5333994"/>
-          </a:xfrm>
-          <a:prstGeom prst="rect">
-            <a:avLst/>
-          </a:prstGeom>
           <a:ln>
-            <a:noFill/>
+            <a:solidFill>
+              <a:schemeClr val="bg1"/>
+            </a:solidFill>
           </a:ln>
         </p:spPr>
         <p:style>
@@ -13060,185 +12791,455 @@
           <a:lstStyle/>
           <a:p>
             <a:pPr algn="ctr"/>
-            <a:endParaRPr lang="en-US"/>
+            <a:endParaRPr lang="en-US" dirty="0">
+              <a:solidFill>
+                <a:schemeClr val="tx1"/>
+              </a:solidFill>
+            </a:endParaRPr>
           </a:p>
         </p:txBody>
       </p:sp>
       <p:sp>
         <p:nvSpPr>
-          <p:cNvPr id="2" name="Title 1">
+          <p:cNvPr id="4" name="Rectangle 3">
             <a:extLst>
               <a:ext uri="{FF2B5EF4-FFF2-40B4-BE49-F238E27FC236}">
-                <a16:creationId xmlns:a16="http://schemas.microsoft.com/office/drawing/2014/main" id="{DA91229A-F866-443C-98E5-88F9977A76E0}"/>
+                <a16:creationId xmlns:a16="http://schemas.microsoft.com/office/drawing/2014/main" id="{122B5A97-60D6-4CC2-B697-7E69886C2DCB}"/>
               </a:ext>
             </a:extLst>
           </p:cNvPr>
-          <p:cNvSpPr>
-            <a:spLocks noGrp="1"/>
-          </p:cNvSpPr>
-          <p:nvPr>
-            <p:ph type="title"/>
-          </p:nvPr>
+          <p:cNvSpPr/>
+          <p:nvPr/>
         </p:nvSpPr>
         <p:spPr>
           <a:xfrm>
-            <a:off x="1524000" y="1524000"/>
-            <a:ext cx="4572000" cy="2581369"/>
+            <a:off x="325267" y="2387975"/>
+            <a:ext cx="10230844" cy="737189"/>
           </a:xfrm>
-        </p:spPr>
-        <p:txBody>
-          <a:bodyPr vert="horz" lIns="91440" tIns="45720" rIns="91440" bIns="45720" rtlCol="0" anchor="t">
-            <a:normAutofit/>
-          </a:bodyPr>
-          <a:lstStyle/>
-          <a:p>
-            <a:r>
-              <a:rPr lang="en-US" dirty="0"/>
-              <a:t>Data Analysis – Square Footage</a:t>
-            </a:r>
-          </a:p>
-        </p:txBody>
-      </p:sp>
-      <p:sp>
-        <p:nvSpPr>
-          <p:cNvPr id="3" name="Content Placeholder 2">
-            <a:extLst>
-              <a:ext uri="{FF2B5EF4-FFF2-40B4-BE49-F238E27FC236}">
-                <a16:creationId xmlns:a16="http://schemas.microsoft.com/office/drawing/2014/main" id="{2754E8DF-161D-4EAF-8640-D5ED563A23BA}"/>
-              </a:ext>
-            </a:extLst>
-          </p:cNvPr>
-          <p:cNvSpPr>
-            <a:spLocks noGrp="1"/>
-          </p:cNvSpPr>
-          <p:nvPr>
-            <p:ph idx="1"/>
-          </p:nvPr>
-        </p:nvSpPr>
-        <p:spPr>
-          <a:xfrm>
-            <a:off x="1524000" y="4867369"/>
-            <a:ext cx="4572000" cy="789300"/>
-          </a:xfrm>
-        </p:spPr>
-        <p:txBody>
-          <a:bodyPr vert="horz" lIns="91440" tIns="45720" rIns="91440" bIns="45720" rtlCol="0">
-            <a:normAutofit/>
-          </a:bodyPr>
-          <a:lstStyle/>
-          <a:p>
-            <a:pPr marL="0" indent="0">
-              <a:buNone/>
-            </a:pPr>
-            <a:r>
-              <a:rPr lang="en-US" dirty="0"/>
-              <a:t>As housing square footage increases so does price</a:t>
-            </a:r>
-          </a:p>
-        </p:txBody>
-      </p:sp>
-      <p:cxnSp>
-        <p:nvCxnSpPr>
-          <p:cNvPr id="29" name="Straight Connector 28">
-            <a:extLst>
-              <a:ext uri="{FF2B5EF4-FFF2-40B4-BE49-F238E27FC236}">
-                <a16:creationId xmlns:a16="http://schemas.microsoft.com/office/drawing/2014/main" id="{B20D3D82-8B25-4DD9-9924-4CEAD450CD21}"/>
-              </a:ext>
-              <a:ext uri="{C183D7F6-B498-43B3-948B-1728B52AA6E4}">
-                <adec:decorative xmlns:adec="http://schemas.microsoft.com/office/drawing/2017/decorative" val="1"/>
-              </a:ext>
-            </a:extLst>
-          </p:cNvPr>
-          <p:cNvCxnSpPr>
-            <a:cxnSpLocks noGrp="1" noRot="1" noChangeAspect="1" noMove="1" noResize="1" noEditPoints="1" noAdjustHandles="1" noChangeArrowheads="1" noChangeShapeType="1"/>
-          </p:cNvCxnSpPr>
-          <p:nvPr>
-            <p:extLst>
-              <p:ext uri="{386F3935-93C4-4BCD-93E2-E3B085C9AB24}">
-                <p16:designElem xmlns:p16="http://schemas.microsoft.com/office/powerpoint/2015/main" val="1"/>
-              </p:ext>
-            </p:extLst>
-          </p:nvPr>
-        </p:nvCxnSpPr>
-        <p:spPr>
-          <a:xfrm>
-            <a:off x="1631206" y="4572000"/>
-            <a:ext cx="971155" cy="0"/>
-          </a:xfrm>
-          <a:prstGeom prst="line">
+          <a:prstGeom prst="rect">
             <a:avLst/>
           </a:prstGeom>
-          <a:ln w="31750">
+          <a:noFill/>
+          <a:ln w="57150">
             <a:solidFill>
-              <a:schemeClr val="tx1"/>
+              <a:srgbClr val="FF0000"/>
             </a:solidFill>
           </a:ln>
         </p:spPr>
         <p:style>
-          <a:lnRef idx="1">
-            <a:schemeClr val="accent1"/>
+          <a:lnRef idx="2">
+            <a:schemeClr val="accent1">
+              <a:shade val="50000"/>
+            </a:schemeClr>
           </a:lnRef>
-          <a:fillRef idx="0">
+          <a:fillRef idx="1">
             <a:schemeClr val="accent1"/>
           </a:fillRef>
           <a:effectRef idx="0">
             <a:schemeClr val="accent1"/>
           </a:effectRef>
           <a:fontRef idx="minor">
-            <a:schemeClr val="tx1"/>
+            <a:schemeClr val="lt1"/>
           </a:fontRef>
         </p:style>
-      </p:cxnSp>
-      <p:pic>
-        <p:nvPicPr>
-          <p:cNvPr id="6" name="Picture 5" descr="Chart, scatter chart&#10;&#10;Description automatically generated">
+        <p:txBody>
+          <a:bodyPr rtlCol="0" anchor="ctr"/>
+          <a:lstStyle/>
+          <a:p>
+            <a:pPr algn="ctr"/>
+            <a:endParaRPr lang="en-US"/>
+          </a:p>
+        </p:txBody>
+      </p:sp>
+      <p:sp>
+        <p:nvSpPr>
+          <p:cNvPr id="9" name="TextBox 8">
             <a:extLst>
               <a:ext uri="{FF2B5EF4-FFF2-40B4-BE49-F238E27FC236}">
-                <a16:creationId xmlns:a16="http://schemas.microsoft.com/office/drawing/2014/main" id="{DC3A087B-7C7C-4BEB-95CA-121F1373B012}"/>
+                <a16:creationId xmlns:a16="http://schemas.microsoft.com/office/drawing/2014/main" id="{C8406060-6E8A-4460-ACA9-C0DCD731C882}"/>
               </a:ext>
             </a:extLst>
           </p:cNvPr>
-          <p:cNvPicPr>
-            <a:picLocks noChangeAspect="1"/>
-          </p:cNvPicPr>
+          <p:cNvSpPr txBox="1"/>
           <p:nvPr/>
-        </p:nvPicPr>
-        <p:blipFill>
-          <a:blip r:embed="rId3">
-            <a:extLst>
-              <a:ext uri="{28A0092B-C50C-407E-A947-70E740481C1C}">
-                <a14:useLocalDpi xmlns:a14="http://schemas.microsoft.com/office/drawing/2010/main" val="0"/>
-              </a:ext>
-            </a:extLst>
-          </a:blip>
-          <a:stretch>
-            <a:fillRect/>
-          </a:stretch>
-        </p:blipFill>
+        </p:nvSpPr>
         <p:spPr>
-          <a:xfrm>
-            <a:off x="6203206" y="923019"/>
-            <a:ext cx="5096964" cy="4999569"/>
+          <a:xfrm flipH="1">
+            <a:off x="514391" y="1857211"/>
+            <a:ext cx="1019151" cy="923330"/>
           </a:xfrm>
           <a:prstGeom prst="rect">
             <a:avLst/>
           </a:prstGeom>
+          <a:noFill/>
         </p:spPr>
-      </p:pic>
+        <p:txBody>
+          <a:bodyPr wrap="square" rtlCol="0">
+            <a:spAutoFit/>
+          </a:bodyPr>
+          <a:lstStyle/>
+          <a:p>
+            <a:pPr algn="ctr"/>
+            <a:r>
+              <a:rPr lang="en-US" dirty="0"/>
+              <a:t>Price</a:t>
+            </a:r>
+          </a:p>
+          <a:p>
+            <a:pPr algn="ctr"/>
+            <a:endParaRPr lang="en-US" dirty="0"/>
+          </a:p>
+          <a:p>
+            <a:pPr algn="ctr"/>
+            <a:endParaRPr lang="en-US" dirty="0"/>
+          </a:p>
+        </p:txBody>
+      </p:sp>
+      <p:sp>
+        <p:nvSpPr>
+          <p:cNvPr id="10" name="TextBox 9">
+            <a:extLst>
+              <a:ext uri="{FF2B5EF4-FFF2-40B4-BE49-F238E27FC236}">
+                <a16:creationId xmlns:a16="http://schemas.microsoft.com/office/drawing/2014/main" id="{8B0CE0C4-3B64-4207-AC71-1EB39D4B6C71}"/>
+              </a:ext>
+            </a:extLst>
+          </p:cNvPr>
+          <p:cNvSpPr txBox="1"/>
+          <p:nvPr/>
+        </p:nvSpPr>
+        <p:spPr>
+          <a:xfrm>
+            <a:off x="598075" y="2414370"/>
+            <a:ext cx="851782" cy="646331"/>
+          </a:xfrm>
+          <a:prstGeom prst="rect">
+            <a:avLst/>
+          </a:prstGeom>
+          <a:noFill/>
+        </p:spPr>
+        <p:txBody>
+          <a:bodyPr wrap="square" rtlCol="0">
+            <a:spAutoFit/>
+          </a:bodyPr>
+          <a:lstStyle/>
+          <a:p>
+            <a:r>
+              <a:rPr lang="en-US" dirty="0" err="1"/>
+              <a:t>Sqft</a:t>
+            </a:r>
+            <a:r>
+              <a:rPr lang="en-US" dirty="0"/>
+              <a:t> Living</a:t>
+            </a:r>
+          </a:p>
+        </p:txBody>
+      </p:sp>
+      <p:sp>
+        <p:nvSpPr>
+          <p:cNvPr id="13" name="TextBox 12">
+            <a:extLst>
+              <a:ext uri="{FF2B5EF4-FFF2-40B4-BE49-F238E27FC236}">
+                <a16:creationId xmlns:a16="http://schemas.microsoft.com/office/drawing/2014/main" id="{D11F03DA-81A4-42BE-841E-2FF6E69F94F1}"/>
+              </a:ext>
+            </a:extLst>
+          </p:cNvPr>
+          <p:cNvSpPr txBox="1"/>
+          <p:nvPr/>
+        </p:nvSpPr>
+        <p:spPr>
+          <a:xfrm>
+            <a:off x="373660" y="3183160"/>
+            <a:ext cx="1300612" cy="646331"/>
+          </a:xfrm>
+          <a:prstGeom prst="rect">
+            <a:avLst/>
+          </a:prstGeom>
+          <a:noFill/>
+        </p:spPr>
+        <p:txBody>
+          <a:bodyPr wrap="none" rtlCol="0">
+            <a:spAutoFit/>
+          </a:bodyPr>
+          <a:lstStyle/>
+          <a:p>
+            <a:r>
+              <a:rPr lang="en-US" dirty="0" err="1"/>
+              <a:t>Sqft</a:t>
+            </a:r>
+            <a:r>
+              <a:rPr lang="en-US" dirty="0"/>
+              <a:t> Above </a:t>
+            </a:r>
+          </a:p>
+          <a:p>
+            <a:r>
+              <a:rPr lang="en-US" dirty="0"/>
+              <a:t>Basement</a:t>
+            </a:r>
+          </a:p>
+        </p:txBody>
+      </p:sp>
+      <p:sp>
+        <p:nvSpPr>
+          <p:cNvPr id="14" name="TextBox 13">
+            <a:extLst>
+              <a:ext uri="{FF2B5EF4-FFF2-40B4-BE49-F238E27FC236}">
+                <a16:creationId xmlns:a16="http://schemas.microsoft.com/office/drawing/2014/main" id="{EDAD2688-4EB6-461A-A27B-7DCA9781109E}"/>
+              </a:ext>
+            </a:extLst>
+          </p:cNvPr>
+          <p:cNvSpPr txBox="1"/>
+          <p:nvPr/>
+        </p:nvSpPr>
+        <p:spPr>
+          <a:xfrm>
+            <a:off x="385009" y="3864216"/>
+            <a:ext cx="1277914" cy="646331"/>
+          </a:xfrm>
+          <a:prstGeom prst="rect">
+            <a:avLst/>
+          </a:prstGeom>
+          <a:noFill/>
+        </p:spPr>
+        <p:txBody>
+          <a:bodyPr wrap="none" rtlCol="0">
+            <a:spAutoFit/>
+          </a:bodyPr>
+          <a:lstStyle/>
+          <a:p>
+            <a:r>
+              <a:rPr lang="en-US" dirty="0" err="1"/>
+              <a:t>Sqft</a:t>
+            </a:r>
+            <a:r>
+              <a:rPr lang="en-US" dirty="0"/>
+              <a:t> Living </a:t>
+            </a:r>
+          </a:p>
+          <a:p>
+            <a:r>
+              <a:rPr lang="en-US" dirty="0"/>
+              <a:t>Neighbors</a:t>
+            </a:r>
+          </a:p>
+        </p:txBody>
+      </p:sp>
+      <p:sp>
+        <p:nvSpPr>
+          <p:cNvPr id="15" name="TextBox 14">
+            <a:extLst>
+              <a:ext uri="{FF2B5EF4-FFF2-40B4-BE49-F238E27FC236}">
+                <a16:creationId xmlns:a16="http://schemas.microsoft.com/office/drawing/2014/main" id="{D12802B6-5341-4F40-9A1E-5A98AFA88C35}"/>
+              </a:ext>
+            </a:extLst>
+          </p:cNvPr>
+          <p:cNvSpPr txBox="1"/>
+          <p:nvPr/>
+        </p:nvSpPr>
+        <p:spPr>
+          <a:xfrm>
+            <a:off x="299248" y="4696092"/>
+            <a:ext cx="1449436" cy="369332"/>
+          </a:xfrm>
+          <a:prstGeom prst="rect">
+            <a:avLst/>
+          </a:prstGeom>
+          <a:noFill/>
+        </p:spPr>
+        <p:txBody>
+          <a:bodyPr wrap="none" rtlCol="0">
+            <a:spAutoFit/>
+          </a:bodyPr>
+          <a:lstStyle/>
+          <a:p>
+            <a:r>
+              <a:rPr lang="en-US" dirty="0"/>
+              <a:t># Bathrooms</a:t>
+            </a:r>
+          </a:p>
+        </p:txBody>
+      </p:sp>
+      <p:sp>
+        <p:nvSpPr>
+          <p:cNvPr id="16" name="TextBox 15">
+            <a:extLst>
+              <a:ext uri="{FF2B5EF4-FFF2-40B4-BE49-F238E27FC236}">
+                <a16:creationId xmlns:a16="http://schemas.microsoft.com/office/drawing/2014/main" id="{0782A1B1-D62C-4C7A-A7FA-CC8C0E6D2086}"/>
+              </a:ext>
+            </a:extLst>
+          </p:cNvPr>
+          <p:cNvSpPr txBox="1"/>
+          <p:nvPr/>
+        </p:nvSpPr>
+        <p:spPr>
+          <a:xfrm>
+            <a:off x="334835" y="5378253"/>
+            <a:ext cx="1378262" cy="369332"/>
+          </a:xfrm>
+          <a:prstGeom prst="rect">
+            <a:avLst/>
+          </a:prstGeom>
+          <a:noFill/>
+        </p:spPr>
+        <p:txBody>
+          <a:bodyPr wrap="none" rtlCol="0">
+            <a:spAutoFit/>
+          </a:bodyPr>
+          <a:lstStyle/>
+          <a:p>
+            <a:r>
+              <a:rPr lang="en-US" dirty="0"/>
+              <a:t># Bedrooms</a:t>
+            </a:r>
+          </a:p>
+        </p:txBody>
+      </p:sp>
     </p:spTree>
     <p:extLst>
       <p:ext uri="{BB962C8B-B14F-4D97-AF65-F5344CB8AC3E}">
-        <p14:creationId xmlns:p14="http://schemas.microsoft.com/office/powerpoint/2010/main" val="728595412"/>
+        <p14:creationId xmlns:p14="http://schemas.microsoft.com/office/powerpoint/2010/main" val="2578843159"/>
       </p:ext>
     </p:extLst>
   </p:cSld>
   <p:clrMapOvr>
     <a:overrideClrMapping bg1="lt1" tx1="dk1" bg2="lt2" tx2="dk2" accent1="accent1" accent2="accent2" accent3="accent3" accent4="accent4" accent5="accent5" accent6="accent6" hlink="hlink" folHlink="folHlink"/>
   </p:clrMapOvr>
+  <p:timing>
+    <p:tnLst>
+      <p:par>
+        <p:cTn id="1" dur="indefinite" restart="never" nodeType="tmRoot">
+          <p:childTnLst>
+            <p:seq concurrent="1" nextAc="seek">
+              <p:cTn id="2" dur="indefinite" nodeType="mainSeq">
+                <p:childTnLst>
+                  <p:par>
+                    <p:cTn id="3" fill="hold">
+                      <p:stCondLst>
+                        <p:cond delay="indefinite"/>
+                      </p:stCondLst>
+                      <p:childTnLst>
+                        <p:par>
+                          <p:cTn id="4" fill="hold">
+                            <p:stCondLst>
+                              <p:cond delay="0"/>
+                            </p:stCondLst>
+                            <p:childTnLst>
+                              <p:par>
+                                <p:cTn id="5" presetID="42" presetClass="entr" presetSubtype="0" fill="hold" grpId="0" nodeType="clickEffect">
+                                  <p:stCondLst>
+                                    <p:cond delay="0"/>
+                                  </p:stCondLst>
+                                  <p:childTnLst>
+                                    <p:set>
+                                      <p:cBhvr>
+                                        <p:cTn id="6" dur="1" fill="hold">
+                                          <p:stCondLst>
+                                            <p:cond delay="0"/>
+                                          </p:stCondLst>
+                                        </p:cTn>
+                                        <p:tgtEl>
+                                          <p:spTgt spid="4"/>
+                                        </p:tgtEl>
+                                        <p:attrNameLst>
+                                          <p:attrName>style.visibility</p:attrName>
+                                        </p:attrNameLst>
+                                      </p:cBhvr>
+                                      <p:to>
+                                        <p:strVal val="visible"/>
+                                      </p:to>
+                                    </p:set>
+                                    <p:animEffect transition="in" filter="fade">
+                                      <p:cBhvr>
+                                        <p:cTn id="7" dur="1000"/>
+                                        <p:tgtEl>
+                                          <p:spTgt spid="4"/>
+                                        </p:tgtEl>
+                                      </p:cBhvr>
+                                    </p:animEffect>
+                                    <p:anim calcmode="lin" valueType="num">
+                                      <p:cBhvr>
+                                        <p:cTn id="8" dur="1000" fill="hold"/>
+                                        <p:tgtEl>
+                                          <p:spTgt spid="4"/>
+                                        </p:tgtEl>
+                                        <p:attrNameLst>
+                                          <p:attrName>ppt_x</p:attrName>
+                                        </p:attrNameLst>
+                                      </p:cBhvr>
+                                      <p:tavLst>
+                                        <p:tav tm="0">
+                                          <p:val>
+                                            <p:strVal val="#ppt_x"/>
+                                          </p:val>
+                                        </p:tav>
+                                        <p:tav tm="100000">
+                                          <p:val>
+                                            <p:strVal val="#ppt_x"/>
+                                          </p:val>
+                                        </p:tav>
+                                      </p:tavLst>
+                                    </p:anim>
+                                    <p:anim calcmode="lin" valueType="num">
+                                      <p:cBhvr>
+                                        <p:cTn id="9" dur="1000" fill="hold"/>
+                                        <p:tgtEl>
+                                          <p:spTgt spid="4"/>
+                                        </p:tgtEl>
+                                        <p:attrNameLst>
+                                          <p:attrName>ppt_y</p:attrName>
+                                        </p:attrNameLst>
+                                      </p:cBhvr>
+                                      <p:tavLst>
+                                        <p:tav tm="0">
+                                          <p:val>
+                                            <p:strVal val="#ppt_y+.1"/>
+                                          </p:val>
+                                        </p:tav>
+                                        <p:tav tm="100000">
+                                          <p:val>
+                                            <p:strVal val="#ppt_y"/>
+                                          </p:val>
+                                        </p:tav>
+                                      </p:tavLst>
+                                    </p:anim>
+                                  </p:childTnLst>
+                                </p:cTn>
+                              </p:par>
+                            </p:childTnLst>
+                          </p:cTn>
+                        </p:par>
+                      </p:childTnLst>
+                    </p:cTn>
+                  </p:par>
+                </p:childTnLst>
+              </p:cTn>
+              <p:prevCondLst>
+                <p:cond evt="onPrev" delay="0">
+                  <p:tgtEl>
+                    <p:sldTgt/>
+                  </p:tgtEl>
+                </p:cond>
+              </p:prevCondLst>
+              <p:nextCondLst>
+                <p:cond evt="onNext" delay="0">
+                  <p:tgtEl>
+                    <p:sldTgt/>
+                  </p:tgtEl>
+                </p:cond>
+              </p:nextCondLst>
+            </p:seq>
+          </p:childTnLst>
+        </p:cTn>
+      </p:par>
+    </p:tnLst>
+    <p:bldLst>
+      <p:bldP spid="4" grpId="0" animBg="1"/>
+    </p:bldLst>
+  </p:timing>
 </p:sld>
 </file>
 
-<file path=ppt/slides/slide7.xml><?xml version="1.0" encoding="utf-8"?>
+<file path=ppt/slides/slide6.xml><?xml version="1.0" encoding="utf-8"?>
 <p:sld xmlns:a="http://schemas.openxmlformats.org/drawingml/2006/main" xmlns:r="http://schemas.openxmlformats.org/officeDocument/2006/relationships" xmlns:p="http://schemas.openxmlformats.org/presentationml/2006/main">
   <p:cSld>
     <p:spTree>
@@ -13288,43 +13289,12 @@
           </a:p>
         </p:txBody>
       </p:sp>
-      <p:sp>
-        <p:nvSpPr>
-          <p:cNvPr id="3" name="Content Placeholder 2">
+      <p:pic>
+        <p:nvPicPr>
+          <p:cNvPr id="7" name="Picture 6" descr="Graphical user interface, application&#10;&#10;Description automatically generated">
             <a:extLst>
               <a:ext uri="{FF2B5EF4-FFF2-40B4-BE49-F238E27FC236}">
-                <a16:creationId xmlns:a16="http://schemas.microsoft.com/office/drawing/2014/main" id="{6C76972B-9EBD-4D8B-B001-07E2B5DA1A19}"/>
-              </a:ext>
-            </a:extLst>
-          </p:cNvPr>
-          <p:cNvSpPr>
-            <a:spLocks noGrp="1"/>
-          </p:cNvSpPr>
-          <p:nvPr>
-            <p:ph idx="1"/>
-          </p:nvPr>
-        </p:nvSpPr>
-        <p:spPr/>
-        <p:txBody>
-          <a:bodyPr/>
-          <a:lstStyle/>
-          <a:p>
-            <a:r>
-              <a:rPr lang="en-US" dirty="0"/>
-              <a:t>GRAPHIC TO COME</a:t>
-            </a:r>
-          </a:p>
-          <a:p>
-            <a:endParaRPr lang="en-US" dirty="0"/>
-          </a:p>
-        </p:txBody>
-      </p:sp>
-      <p:pic>
-        <p:nvPicPr>
-          <p:cNvPr id="5" name="Picture 4" descr="Graphical user interface&#10;&#10;Description automatically generated with low confidence">
-            <a:extLst>
-              <a:ext uri="{FF2B5EF4-FFF2-40B4-BE49-F238E27FC236}">
-                <a16:creationId xmlns:a16="http://schemas.microsoft.com/office/drawing/2014/main" id="{CE32639F-50BC-471B-94F1-AB9C9CAB4CC7}"/>
+                <a16:creationId xmlns:a16="http://schemas.microsoft.com/office/drawing/2014/main" id="{5FC6E5AD-D822-4710-A475-19F9D2328E09}"/>
               </a:ext>
             </a:extLst>
           </p:cNvPr>
@@ -13347,44 +13317,8 @@
         </p:blipFill>
         <p:spPr>
           <a:xfrm>
-            <a:off x="-110924" y="-439838"/>
-            <a:ext cx="6858000" cy="6858000"/>
-          </a:xfrm>
-          <a:prstGeom prst="rect">
-            <a:avLst/>
-          </a:prstGeom>
-        </p:spPr>
-      </p:pic>
-      <p:pic>
-        <p:nvPicPr>
-          <p:cNvPr id="7" name="Picture 6" descr="Graphical user interface, application&#10;&#10;Description automatically generated">
-            <a:extLst>
-              <a:ext uri="{FF2B5EF4-FFF2-40B4-BE49-F238E27FC236}">
-                <a16:creationId xmlns:a16="http://schemas.microsoft.com/office/drawing/2014/main" id="{5FC6E5AD-D822-4710-A475-19F9D2328E09}"/>
-              </a:ext>
-            </a:extLst>
-          </p:cNvPr>
-          <p:cNvPicPr>
-            <a:picLocks noChangeAspect="1"/>
-          </p:cNvPicPr>
-          <p:nvPr/>
-        </p:nvPicPr>
-        <p:blipFill>
-          <a:blip r:embed="rId4">
-            <a:extLst>
-              <a:ext uri="{28A0092B-C50C-407E-A947-70E740481C1C}">
-                <a14:useLocalDpi xmlns:a14="http://schemas.microsoft.com/office/drawing/2010/main" val="0"/>
-              </a:ext>
-            </a:extLst>
-          </a:blip>
-          <a:stretch>
-            <a:fillRect/>
-          </a:stretch>
-        </p:blipFill>
-        <p:spPr>
-          <a:xfrm>
-            <a:off x="5334000" y="1549147"/>
-            <a:ext cx="6858000" cy="6858000"/>
+            <a:off x="-94527" y="-2046399"/>
+            <a:ext cx="11970153" cy="11970153"/>
           </a:xfrm>
           <a:prstGeom prst="rect">
             <a:avLst/>
@@ -13405,7 +13339,7 @@
         </p:nvSpPr>
         <p:spPr>
           <a:xfrm>
-            <a:off x="6928365" y="3275111"/>
+            <a:off x="6142299" y="6418670"/>
             <a:ext cx="4675254" cy="307777"/>
           </a:xfrm>
           <a:prstGeom prst="rect">
@@ -13423,42 +13357,6 @@
             <a:r>
               <a:rPr lang="en-US" sz="1400" dirty="0"/>
               <a:t>Total Distance in Degrees from Points of Interest per House</a:t>
-            </a:r>
-          </a:p>
-        </p:txBody>
-      </p:sp>
-      <p:sp>
-        <p:nvSpPr>
-          <p:cNvPr id="9" name="TextBox 8">
-            <a:extLst>
-              <a:ext uri="{FF2B5EF4-FFF2-40B4-BE49-F238E27FC236}">
-                <a16:creationId xmlns:a16="http://schemas.microsoft.com/office/drawing/2014/main" id="{57BC9B02-ACB1-4DAE-8DE3-89DEDCED2A83}"/>
-              </a:ext>
-            </a:extLst>
-          </p:cNvPr>
-          <p:cNvSpPr txBox="1"/>
-          <p:nvPr/>
-        </p:nvSpPr>
-        <p:spPr>
-          <a:xfrm>
-            <a:off x="646152" y="4365060"/>
-            <a:ext cx="2164567" cy="307777"/>
-          </a:xfrm>
-          <a:prstGeom prst="rect">
-            <a:avLst/>
-          </a:prstGeom>
-          <a:noFill/>
-        </p:spPr>
-        <p:txBody>
-          <a:bodyPr wrap="none" rtlCol="0">
-            <a:spAutoFit/>
-          </a:bodyPr>
-          <a:lstStyle/>
-          <a:p>
-            <a:pPr algn="r"/>
-            <a:r>
-              <a:rPr lang="en-US" sz="1400" dirty="0"/>
-              <a:t>Price in Dollars per House</a:t>
             </a:r>
           </a:p>
         </p:txBody>
@@ -13476,106 +13374,7 @@
 </p:sld>
 </file>
 
-<file path=ppt/slides/slide8.xml><?xml version="1.0" encoding="utf-8"?>
-<p:sld xmlns:a="http://schemas.openxmlformats.org/drawingml/2006/main" xmlns:r="http://schemas.openxmlformats.org/officeDocument/2006/relationships" xmlns:p="http://schemas.openxmlformats.org/presentationml/2006/main">
-  <p:cSld>
-    <p:spTree>
-      <p:nvGrpSpPr>
-        <p:cNvPr id="1" name=""/>
-        <p:cNvGrpSpPr/>
-        <p:nvPr/>
-      </p:nvGrpSpPr>
-      <p:grpSpPr>
-        <a:xfrm>
-          <a:off x="0" y="0"/>
-          <a:ext cx="0" cy="0"/>
-          <a:chOff x="0" y="0"/>
-          <a:chExt cx="0" cy="0"/>
-        </a:xfrm>
-      </p:grpSpPr>
-      <p:sp>
-        <p:nvSpPr>
-          <p:cNvPr id="2" name="Title 1">
-            <a:extLst>
-              <a:ext uri="{FF2B5EF4-FFF2-40B4-BE49-F238E27FC236}">
-                <a16:creationId xmlns:a16="http://schemas.microsoft.com/office/drawing/2014/main" id="{11A8D3C5-38AC-44BA-A2E3-519D9C036234}"/>
-              </a:ext>
-            </a:extLst>
-          </p:cNvPr>
-          <p:cNvSpPr>
-            <a:spLocks noGrp="1"/>
-          </p:cNvSpPr>
-          <p:nvPr>
-            <p:ph type="title"/>
-          </p:nvPr>
-        </p:nvSpPr>
-        <p:spPr/>
-        <p:txBody>
-          <a:bodyPr/>
-          <a:lstStyle/>
-          <a:p>
-            <a:r>
-              <a:rPr lang="en-US"/>
-              <a:t>Data Analysis – Feature Engineering</a:t>
-            </a:r>
-            <a:endParaRPr lang="en-US" dirty="0"/>
-          </a:p>
-        </p:txBody>
-      </p:sp>
-      <p:sp>
-        <p:nvSpPr>
-          <p:cNvPr id="3" name="Content Placeholder 2">
-            <a:extLst>
-              <a:ext uri="{FF2B5EF4-FFF2-40B4-BE49-F238E27FC236}">
-                <a16:creationId xmlns:a16="http://schemas.microsoft.com/office/drawing/2014/main" id="{6C76972B-9EBD-4D8B-B001-07E2B5DA1A19}"/>
-              </a:ext>
-            </a:extLst>
-          </p:cNvPr>
-          <p:cNvSpPr>
-            <a:spLocks noGrp="1"/>
-          </p:cNvSpPr>
-          <p:nvPr>
-            <p:ph idx="1"/>
-          </p:nvPr>
-        </p:nvSpPr>
-        <p:spPr/>
-        <p:txBody>
-          <a:bodyPr/>
-          <a:lstStyle/>
-          <a:p>
-            <a:r>
-              <a:rPr lang="en-US" dirty="0"/>
-              <a:t>View Data – Moved from unclear value analysis to simple Yes/No values</a:t>
-            </a:r>
-          </a:p>
-          <a:p>
-            <a:r>
-              <a:rPr lang="en-US" dirty="0"/>
-              <a:t>Grade &amp; Condition – Consolidated into above and below Average Grades and Conditions</a:t>
-            </a:r>
-          </a:p>
-          <a:p>
-            <a:r>
-              <a:rPr lang="en-US" dirty="0"/>
-              <a:t>Bedrooms – remove outliers (&gt;5 bedrooms)</a:t>
-            </a:r>
-          </a:p>
-        </p:txBody>
-      </p:sp>
-    </p:spTree>
-    <p:extLst>
-      <p:ext uri="{BB962C8B-B14F-4D97-AF65-F5344CB8AC3E}">
-        <p14:creationId xmlns:p14="http://schemas.microsoft.com/office/powerpoint/2010/main" val="1166052253"/>
-      </p:ext>
-    </p:extLst>
-  </p:cSld>
-  <p:clrMapOvr>
-    <a:masterClrMapping/>
-  </p:clrMapOvr>
-</p:sld>
-</file>
-
-<file path=ppt/slides/slide9.xml><?xml version="1.0" encoding="utf-8"?>
+<file path=ppt/slides/slide7.xml><?xml version="1.0" encoding="utf-8"?>
 <p:sld xmlns:a="http://schemas.openxmlformats.org/drawingml/2006/main" xmlns:r="http://schemas.openxmlformats.org/officeDocument/2006/relationships" xmlns:p="http://schemas.openxmlformats.org/presentationml/2006/main">
   <p:cSld>
     <p:bg>
@@ -13602,10 +13401,10 @@
       </p:grpSpPr>
       <p:sp useBgFill="1">
         <p:nvSpPr>
-          <p:cNvPr id="12" name="Rectangle 11">
+          <p:cNvPr id="71" name="Rectangle 70">
             <a:extLst>
               <a:ext uri="{FF2B5EF4-FFF2-40B4-BE49-F238E27FC236}">
-                <a16:creationId xmlns:a16="http://schemas.microsoft.com/office/drawing/2014/main" id="{6A027DD1-A31E-4BED-83B8-ED31F386F011}"/>
+                <a16:creationId xmlns:a16="http://schemas.microsoft.com/office/drawing/2014/main" id="{E7218290-08E7-4AB8-8549-F625B01F0DCB}"/>
               </a:ext>
               <a:ext uri="{C183D7F6-B498-43B3-948B-1728B52AA6E4}">
                 <adec:decorative xmlns:adec="http://schemas.microsoft.com/office/drawing/2017/decorative" val="1"/>
@@ -13678,10 +13477,208 @@
       </p:sp>
       <p:sp>
         <p:nvSpPr>
-          <p:cNvPr id="14" name="Rectangle 13">
+          <p:cNvPr id="2" name="Title 1">
             <a:extLst>
               <a:ext uri="{FF2B5EF4-FFF2-40B4-BE49-F238E27FC236}">
-                <a16:creationId xmlns:a16="http://schemas.microsoft.com/office/drawing/2014/main" id="{961C2FB6-1414-4D9D-BE7A-1FF2A7AAECC6}"/>
+                <a16:creationId xmlns:a16="http://schemas.microsoft.com/office/drawing/2014/main" id="{11A8D3C5-38AC-44BA-A2E3-519D9C036234}"/>
+              </a:ext>
+            </a:extLst>
+          </p:cNvPr>
+          <p:cNvSpPr>
+            <a:spLocks noGrp="1"/>
+          </p:cNvSpPr>
+          <p:nvPr>
+            <p:ph type="title"/>
+          </p:nvPr>
+        </p:nvSpPr>
+        <p:spPr>
+          <a:xfrm>
+            <a:off x="1429566" y="762001"/>
+            <a:ext cx="5008696" cy="1141004"/>
+          </a:xfrm>
+        </p:spPr>
+        <p:txBody>
+          <a:bodyPr>
+            <a:normAutofit/>
+          </a:bodyPr>
+          <a:lstStyle/>
+          <a:p>
+            <a:r>
+              <a:rPr lang="en-US"/>
+              <a:t>Data Analysis – Feature Engineering</a:t>
+            </a:r>
+            <a:endParaRPr lang="en-US" dirty="0"/>
+          </a:p>
+        </p:txBody>
+      </p:sp>
+      <p:sp>
+        <p:nvSpPr>
+          <p:cNvPr id="3" name="Content Placeholder 2">
+            <a:extLst>
+              <a:ext uri="{FF2B5EF4-FFF2-40B4-BE49-F238E27FC236}">
+                <a16:creationId xmlns:a16="http://schemas.microsoft.com/office/drawing/2014/main" id="{6C76972B-9EBD-4D8B-B001-07E2B5DA1A19}"/>
+              </a:ext>
+            </a:extLst>
+          </p:cNvPr>
+          <p:cNvSpPr>
+            <a:spLocks noGrp="1"/>
+          </p:cNvSpPr>
+          <p:nvPr>
+            <p:ph idx="1"/>
+          </p:nvPr>
+        </p:nvSpPr>
+        <p:spPr>
+          <a:xfrm>
+            <a:off x="1429566" y="2259698"/>
+            <a:ext cx="4479398" cy="3836301"/>
+          </a:xfrm>
+        </p:spPr>
+        <p:txBody>
+          <a:bodyPr>
+            <a:normAutofit/>
+          </a:bodyPr>
+          <a:lstStyle/>
+          <a:p>
+            <a:r>
+              <a:rPr lang="en-US" sz="2400" dirty="0"/>
+              <a:t>View Data</a:t>
+            </a:r>
+          </a:p>
+          <a:p>
+            <a:r>
+              <a:rPr lang="en-US" sz="2400" dirty="0"/>
+              <a:t>Grade &amp; Condition</a:t>
+            </a:r>
+          </a:p>
+          <a:p>
+            <a:r>
+              <a:rPr lang="en-US" sz="2400" dirty="0"/>
+              <a:t>Bedrooms</a:t>
+            </a:r>
+          </a:p>
+        </p:txBody>
+      </p:sp>
+      <p:pic>
+        <p:nvPicPr>
+          <p:cNvPr id="3074" name="Picture 2" descr="Space Needle">
+            <a:extLst>
+              <a:ext uri="{FF2B5EF4-FFF2-40B4-BE49-F238E27FC236}">
+                <a16:creationId xmlns:a16="http://schemas.microsoft.com/office/drawing/2014/main" id="{A4236FE1-5DED-4464-BC21-705ED40947AB}"/>
+              </a:ext>
+            </a:extLst>
+          </p:cNvPr>
+          <p:cNvPicPr>
+            <a:picLocks noChangeAspect="1" noChangeArrowheads="1"/>
+          </p:cNvPicPr>
+          <p:nvPr/>
+        </p:nvPicPr>
+        <p:blipFill rotWithShape="1">
+          <a:blip r:embed="rId3">
+            <a:extLst>
+              <a:ext uri="{28A0092B-C50C-407E-A947-70E740481C1C}">
+                <a14:useLocalDpi xmlns:a14="http://schemas.microsoft.com/office/drawing/2010/main" val="0"/>
+              </a:ext>
+            </a:extLst>
+          </a:blip>
+          <a:srcRect t="19141" b="20859"/>
+          <a:stretch/>
+        </p:blipFill>
+        <p:spPr bwMode="auto">
+          <a:xfrm>
+            <a:off x="6639965" y="1114197"/>
+            <a:ext cx="4629606" cy="4629606"/>
+          </a:xfrm>
+          <a:custGeom>
+            <a:avLst/>
+            <a:gdLst/>
+            <a:ahLst/>
+            <a:cxnLst/>
+            <a:rect l="l" t="t" r="r" b="b"/>
+            <a:pathLst>
+              <a:path w="4629606" h="4629606">
+                <a:moveTo>
+                  <a:pt x="2314803" y="0"/>
+                </a:moveTo>
+                <a:cubicBezTo>
+                  <a:pt x="3593233" y="0"/>
+                  <a:pt x="4629606" y="1036373"/>
+                  <a:pt x="4629606" y="2314803"/>
+                </a:cubicBezTo>
+                <a:cubicBezTo>
+                  <a:pt x="4629606" y="3593233"/>
+                  <a:pt x="3593233" y="4629606"/>
+                  <a:pt x="2314803" y="4629606"/>
+                </a:cubicBezTo>
+                <a:cubicBezTo>
+                  <a:pt x="1036373" y="4629606"/>
+                  <a:pt x="0" y="3593233"/>
+                  <a:pt x="0" y="2314803"/>
+                </a:cubicBezTo>
+                <a:cubicBezTo>
+                  <a:pt x="0" y="1036373"/>
+                  <a:pt x="1036373" y="0"/>
+                  <a:pt x="2314803" y="0"/>
+                </a:cubicBezTo>
+                <a:close/>
+              </a:path>
+            </a:pathLst>
+          </a:custGeom>
+          <a:noFill/>
+          <a:extLst>
+            <a:ext uri="{909E8E84-426E-40DD-AFC4-6F175D3DCCD1}">
+              <a14:hiddenFill xmlns:a14="http://schemas.microsoft.com/office/drawing/2010/main">
+                <a:solidFill>
+                  <a:srgbClr val="FFFFFF"/>
+                </a:solidFill>
+              </a14:hiddenFill>
+            </a:ext>
+          </a:extLst>
+        </p:spPr>
+      </p:pic>
+    </p:spTree>
+    <p:extLst>
+      <p:ext uri="{BB962C8B-B14F-4D97-AF65-F5344CB8AC3E}">
+        <p14:creationId xmlns:p14="http://schemas.microsoft.com/office/powerpoint/2010/main" val="1166052253"/>
+      </p:ext>
+    </p:extLst>
+  </p:cSld>
+  <p:clrMapOvr>
+    <a:masterClrMapping/>
+  </p:clrMapOvr>
+</p:sld>
+</file>
+
+<file path=ppt/slides/slide8.xml><?xml version="1.0" encoding="utf-8"?>
+<p:sld xmlns:a="http://schemas.openxmlformats.org/drawingml/2006/main" xmlns:r="http://schemas.openxmlformats.org/officeDocument/2006/relationships" xmlns:p="http://schemas.openxmlformats.org/presentationml/2006/main">
+  <p:cSld>
+    <p:bg>
+      <p:bgPr>
+        <a:solidFill>
+          <a:schemeClr val="bg1"/>
+        </a:solidFill>
+        <a:effectLst/>
+      </p:bgPr>
+    </p:bg>
+    <p:spTree>
+      <p:nvGrpSpPr>
+        <p:cNvPr id="1" name=""/>
+        <p:cNvGrpSpPr/>
+        <p:nvPr/>
+      </p:nvGrpSpPr>
+      <p:grpSpPr>
+        <a:xfrm>
+          <a:off x="0" y="0"/>
+          <a:ext cx="0" cy="0"/>
+          <a:chOff x="0" y="0"/>
+          <a:chExt cx="0" cy="0"/>
+        </a:xfrm>
+      </p:grpSpPr>
+      <p:sp useBgFill="1">
+        <p:nvSpPr>
+          <p:cNvPr id="12" name="Rectangle 11">
+            <a:extLst>
+              <a:ext uri="{FF2B5EF4-FFF2-40B4-BE49-F238E27FC236}">
+                <a16:creationId xmlns:a16="http://schemas.microsoft.com/office/drawing/2014/main" id="{9184DF83-39E6-4BDC-9E23-17F25AB44C55}"/>
               </a:ext>
               <a:ext uri="{C183D7F6-B498-43B3-948B-1728B52AA6E4}">
                 <adec:decorative xmlns:adec="http://schemas.microsoft.com/office/drawing/2017/decorative" val="1"/>
@@ -13701,21 +13698,31 @@
         </p:nvSpPr>
         <p:spPr>
           <a:xfrm>
-            <a:off x="761999" y="762000"/>
-            <a:ext cx="10664151" cy="5334000"/>
+            <a:off x="0" y="0"/>
+            <a:ext cx="12192000" cy="6858000"/>
           </a:xfrm>
           <a:prstGeom prst="rect">
             <a:avLst/>
           </a:prstGeom>
-          <a:solidFill>
-            <a:schemeClr val="tx1"/>
-          </a:solidFill>
           <a:ln w="12700" cap="flat" cmpd="sng" algn="ctr">
             <a:noFill/>
             <a:prstDash val="solid"/>
             <a:miter lim="800000"/>
           </a:ln>
           <a:effectLst/>
+          <a:extLst>
+            <a:ext uri="{91240B29-F687-4F45-9708-019B960494DF}">
+              <a14:hiddenLine xmlns:a14="http://schemas.microsoft.com/office/drawing/2010/main" w="12700" cap="flat" cmpd="sng" algn="ctr">
+                <a:solidFill>
+                  <a:schemeClr val="accent1">
+                    <a:shade val="50000"/>
+                  </a:schemeClr>
+                </a:solidFill>
+                <a:prstDash val="solid"/>
+                <a:miter lim="800000"/>
+              </a14:hiddenLine>
+            </a:ext>
+          </a:extLst>
         </p:spPr>
         <p:style>
           <a:lnRef idx="2">
@@ -13747,7 +13754,7 @@
           <p:cNvPr id="2" name="Title 1">
             <a:extLst>
               <a:ext uri="{FF2B5EF4-FFF2-40B4-BE49-F238E27FC236}">
-                <a16:creationId xmlns:a16="http://schemas.microsoft.com/office/drawing/2014/main" id="{88025BFD-24AE-4660-AF79-C2B4725A9FB5}"/>
+                <a16:creationId xmlns:a16="http://schemas.microsoft.com/office/drawing/2014/main" id="{80A9CAF6-973D-469B-A434-619CDB3E00CE}"/>
               </a:ext>
             </a:extLst>
           </p:cNvPr>
@@ -13760,8 +13767,8 @@
         </p:nvSpPr>
         <p:spPr>
           <a:xfrm>
-            <a:off x="1396100" y="678025"/>
-            <a:ext cx="4827799" cy="1034217"/>
+            <a:off x="825661" y="-19970"/>
+            <a:ext cx="4229100" cy="1141004"/>
           </a:xfrm>
         </p:spPr>
         <p:txBody>
@@ -13771,22 +13778,18 @@
           <a:lstStyle/>
           <a:p>
             <a:r>
-              <a:rPr lang="en-US" dirty="0">
-                <a:solidFill>
-                  <a:schemeClr val="bg1"/>
-                </a:solidFill>
-              </a:rPr>
-              <a:t>Results</a:t>
+              <a:rPr lang="en-US" dirty="0"/>
+              <a:t>RESULTS</a:t>
             </a:r>
           </a:p>
         </p:txBody>
       </p:sp>
       <p:pic>
         <p:nvPicPr>
-          <p:cNvPr id="5" name="Content Placeholder 4" descr="Chart, waterfall chart&#10;&#10;Description automatically generated">
+          <p:cNvPr id="18" name="Picture 17" descr="Chart&#10;&#10;Description automatically generated">
             <a:extLst>
               <a:ext uri="{FF2B5EF4-FFF2-40B4-BE49-F238E27FC236}">
-                <a16:creationId xmlns:a16="http://schemas.microsoft.com/office/drawing/2014/main" id="{CF499CA8-2A2F-451B-8274-0268724CEE1A}"/>
+                <a16:creationId xmlns:a16="http://schemas.microsoft.com/office/drawing/2014/main" id="{3A763DDC-9EAD-4AE4-8268-D61E8C339DA1}"/>
               </a:ext>
             </a:extLst>
           </p:cNvPr>
@@ -13809,8 +13812,8 @@
         </p:blipFill>
         <p:spPr>
           <a:xfrm>
-            <a:off x="3517705" y="775705"/>
-            <a:ext cx="5527580" cy="5320295"/>
+            <a:off x="2648914" y="-79290"/>
+            <a:ext cx="6894171" cy="6894171"/>
           </a:xfrm>
           <a:prstGeom prst="rect">
             <a:avLst/>
@@ -13820,7 +13823,189 @@
     </p:spTree>
     <p:extLst>
       <p:ext uri="{BB962C8B-B14F-4D97-AF65-F5344CB8AC3E}">
-        <p14:creationId xmlns:p14="http://schemas.microsoft.com/office/powerpoint/2010/main" val="1552799789"/>
+        <p14:creationId xmlns:p14="http://schemas.microsoft.com/office/powerpoint/2010/main" val="1479128161"/>
+      </p:ext>
+    </p:extLst>
+  </p:cSld>
+  <p:clrMapOvr>
+    <a:overrideClrMapping bg1="lt1" tx1="dk1" bg2="lt2" tx2="dk2" accent1="accent1" accent2="accent2" accent3="accent3" accent4="accent4" accent5="accent5" accent6="accent6" hlink="hlink" folHlink="folHlink"/>
+  </p:clrMapOvr>
+</p:sld>
+</file>
+
+<file path=ppt/slides/slide9.xml><?xml version="1.0" encoding="utf-8"?>
+<p:sld xmlns:a="http://schemas.openxmlformats.org/drawingml/2006/main" xmlns:r="http://schemas.openxmlformats.org/officeDocument/2006/relationships" xmlns:p="http://schemas.openxmlformats.org/presentationml/2006/main">
+  <p:cSld>
+    <p:bg>
+      <p:bgPr>
+        <a:solidFill>
+          <a:schemeClr val="bg1"/>
+        </a:solidFill>
+        <a:effectLst/>
+      </p:bgPr>
+    </p:bg>
+    <p:spTree>
+      <p:nvGrpSpPr>
+        <p:cNvPr id="1" name=""/>
+        <p:cNvGrpSpPr/>
+        <p:nvPr/>
+      </p:nvGrpSpPr>
+      <p:grpSpPr>
+        <a:xfrm>
+          <a:off x="0" y="0"/>
+          <a:ext cx="0" cy="0"/>
+          <a:chOff x="0" y="0"/>
+          <a:chExt cx="0" cy="0"/>
+        </a:xfrm>
+      </p:grpSpPr>
+      <p:sp useBgFill="1">
+        <p:nvSpPr>
+          <p:cNvPr id="9" name="Rectangle 8">
+            <a:extLst>
+              <a:ext uri="{FF2B5EF4-FFF2-40B4-BE49-F238E27FC236}">
+                <a16:creationId xmlns:a16="http://schemas.microsoft.com/office/drawing/2014/main" id="{1C8B38D4-9D92-4608-A16B-260E8CC21335}"/>
+              </a:ext>
+              <a:ext uri="{C183D7F6-B498-43B3-948B-1728B52AA6E4}">
+                <adec:decorative xmlns:adec="http://schemas.microsoft.com/office/drawing/2017/decorative" val="1"/>
+              </a:ext>
+            </a:extLst>
+          </p:cNvPr>
+          <p:cNvSpPr>
+            <a:spLocks noGrp="1" noRot="1" noChangeAspect="1" noMove="1" noResize="1" noEditPoints="1" noAdjustHandles="1" noChangeArrowheads="1" noChangeShapeType="1" noTextEdit="1"/>
+          </p:cNvSpPr>
+          <p:nvPr>
+            <p:extLst>
+              <p:ext uri="{386F3935-93C4-4BCD-93E2-E3B085C9AB24}">
+                <p16:designElem xmlns:p16="http://schemas.microsoft.com/office/powerpoint/2015/main" val="1"/>
+              </p:ext>
+            </p:extLst>
+          </p:nvPr>
+        </p:nvSpPr>
+        <p:spPr>
+          <a:xfrm>
+            <a:off x="0" y="0"/>
+            <a:ext cx="12192000" cy="6858000"/>
+          </a:xfrm>
+          <a:prstGeom prst="rect">
+            <a:avLst/>
+          </a:prstGeom>
+          <a:ln w="12700" cap="flat" cmpd="sng" algn="ctr">
+            <a:noFill/>
+            <a:prstDash val="solid"/>
+            <a:miter lim="800000"/>
+          </a:ln>
+          <a:effectLst/>
+          <a:extLst>
+            <a:ext uri="{91240B29-F687-4F45-9708-019B960494DF}">
+              <a14:hiddenLine xmlns:a14="http://schemas.microsoft.com/office/drawing/2010/main" w="12700" cap="flat" cmpd="sng" algn="ctr">
+                <a:solidFill>
+                  <a:schemeClr val="accent1">
+                    <a:shade val="50000"/>
+                  </a:schemeClr>
+                </a:solidFill>
+                <a:prstDash val="solid"/>
+                <a:miter lim="800000"/>
+              </a14:hiddenLine>
+            </a:ext>
+          </a:extLst>
+        </p:spPr>
+        <p:style>
+          <a:lnRef idx="2">
+            <a:schemeClr val="accent1">
+              <a:shade val="50000"/>
+            </a:schemeClr>
+          </a:lnRef>
+          <a:fillRef idx="1">
+            <a:schemeClr val="accent1"/>
+          </a:fillRef>
+          <a:effectRef idx="0">
+            <a:schemeClr val="accent1"/>
+          </a:effectRef>
+          <a:fontRef idx="minor">
+            <a:schemeClr val="lt1"/>
+          </a:fontRef>
+        </p:style>
+        <p:txBody>
+          <a:bodyPr rtlCol="0" anchor="ctr"/>
+          <a:lstStyle/>
+          <a:p>
+            <a:pPr algn="ctr"/>
+            <a:endParaRPr lang="en-US"/>
+          </a:p>
+        </p:txBody>
+      </p:sp>
+      <p:sp>
+        <p:nvSpPr>
+          <p:cNvPr id="2" name="Title 1">
+            <a:extLst>
+              <a:ext uri="{FF2B5EF4-FFF2-40B4-BE49-F238E27FC236}">
+                <a16:creationId xmlns:a16="http://schemas.microsoft.com/office/drawing/2014/main" id="{C9BEEC52-39E9-4BA9-A81C-9027A39E20AA}"/>
+              </a:ext>
+            </a:extLst>
+          </p:cNvPr>
+          <p:cNvSpPr>
+            <a:spLocks noGrp="1"/>
+          </p:cNvSpPr>
+          <p:nvPr>
+            <p:ph type="title"/>
+          </p:nvPr>
+        </p:nvSpPr>
+        <p:spPr>
+          <a:xfrm>
+            <a:off x="1524000" y="762001"/>
+            <a:ext cx="9144000" cy="869092"/>
+          </a:xfrm>
+        </p:spPr>
+        <p:txBody>
+          <a:bodyPr>
+            <a:normAutofit/>
+          </a:bodyPr>
+          <a:lstStyle/>
+          <a:p>
+            <a:pPr algn="ctr"/>
+            <a:r>
+              <a:rPr lang="en-US" dirty="0"/>
+              <a:t>Results</a:t>
+            </a:r>
+            <a:endParaRPr lang="en-US"/>
+          </a:p>
+        </p:txBody>
+      </p:sp>
+      <p:graphicFrame>
+        <p:nvGraphicFramePr>
+          <p:cNvPr id="5" name="Content Placeholder 2">
+            <a:extLst>
+              <a:ext uri="{FF2B5EF4-FFF2-40B4-BE49-F238E27FC236}">
+                <a16:creationId xmlns:a16="http://schemas.microsoft.com/office/drawing/2014/main" id="{3B681F15-1270-4BB6-AD52-D13B52832619}"/>
+              </a:ext>
+            </a:extLst>
+          </p:cNvPr>
+          <p:cNvGraphicFramePr>
+            <a:graphicFrameLocks noGrp="1"/>
+          </p:cNvGraphicFramePr>
+          <p:nvPr>
+            <p:ph idx="1"/>
+            <p:extLst>
+              <p:ext uri="{D42A27DB-BD31-4B8C-83A1-F6EECF244321}">
+                <p14:modId xmlns:p14="http://schemas.microsoft.com/office/powerpoint/2010/main" val="189656726"/>
+              </p:ext>
+            </p:extLst>
+          </p:nvPr>
+        </p:nvGraphicFramePr>
+        <p:xfrm>
+          <a:off x="1430338" y="2286000"/>
+          <a:ext cx="9237662" cy="3810000"/>
+        </p:xfrm>
+        <a:graphic>
+          <a:graphicData uri="http://schemas.openxmlformats.org/drawingml/2006/diagram">
+            <dgm:relIds xmlns:dgm="http://schemas.openxmlformats.org/drawingml/2006/diagram" xmlns:r="http://schemas.openxmlformats.org/officeDocument/2006/relationships" r:dm="rId3" r:lo="rId4" r:qs="rId5" r:cs="rId6"/>
+          </a:graphicData>
+        </a:graphic>
+      </p:graphicFrame>
+    </p:spTree>
+    <p:extLst>
+      <p:ext uri="{BB962C8B-B14F-4D97-AF65-F5344CB8AC3E}">
+        <p14:creationId xmlns:p14="http://schemas.microsoft.com/office/powerpoint/2010/main" val="2920240880"/>
       </p:ext>
     </p:extLst>
   </p:cSld>

</xml_diff>

<commit_message>
Update final presentation materials
</commit_message>
<xml_diff>
--- a/Kings County HousIng Price Analysis.pptx
+++ b/Kings County HousIng Price Analysis.pptx
@@ -5224,7 +5224,7 @@
           <a:p>
             <a:fld id="{C5850486-1B67-40D8-891E-F4AAEC67F6CD}" type="datetimeFigureOut">
               <a:rPr lang="en-US" smtClean="0"/>
-              <a:t>10/7/2021</a:t>
+              <a:t>10/8/2021</a:t>
             </a:fld>
             <a:endParaRPr lang="en-US"/>
           </a:p>
@@ -5535,19 +5535,7 @@
           <a:bodyPr/>
           <a:lstStyle/>
           <a:p>
-            <a:r>
-              <a:rPr lang="en-US" dirty="0"/>
-              <a:t>Alex M</a:t>
-            </a:r>
-          </a:p>
-          <a:p>
             <a:endParaRPr lang="en-US" dirty="0"/>
-          </a:p>
-          <a:p>
-            <a:r>
-              <a:rPr lang="en-US" dirty="0"/>
-              <a:t>Alex D</a:t>
-            </a:r>
           </a:p>
         </p:txBody>
       </p:sp>
@@ -5568,7 +5556,7 @@
           <a:p>
             <a:fld id="{7908473F-620A-46E7-939F-1AD0939B3342}" type="slidenum">
               <a:rPr lang="en-US" smtClean="0"/>
-              <a:t>2</a:t>
+              <a:t>1</a:t>
             </a:fld>
             <a:endParaRPr lang="en-US"/>
           </a:p>
@@ -5577,7 +5565,7 @@
     </p:spTree>
     <p:extLst>
       <p:ext uri="{BB962C8B-B14F-4D97-AF65-F5344CB8AC3E}">
-        <p14:creationId xmlns:p14="http://schemas.microsoft.com/office/powerpoint/2010/main" val="2952180285"/>
+        <p14:creationId xmlns:p14="http://schemas.microsoft.com/office/powerpoint/2010/main" val="4001242494"/>
       </p:ext>
     </p:extLst>
   </p:cSld>
@@ -5588,6 +5576,93 @@
 </file>
 
 <file path=ppt/notesSlides/notesSlide10.xml><?xml version="1.0" encoding="utf-8"?>
+<p:notes xmlns:a="http://schemas.openxmlformats.org/drawingml/2006/main" xmlns:r="http://schemas.openxmlformats.org/officeDocument/2006/relationships" xmlns:p="http://schemas.openxmlformats.org/presentationml/2006/main">
+  <p:cSld>
+    <p:spTree>
+      <p:nvGrpSpPr>
+        <p:cNvPr id="1" name=""/>
+        <p:cNvGrpSpPr/>
+        <p:nvPr/>
+      </p:nvGrpSpPr>
+      <p:grpSpPr>
+        <a:xfrm>
+          <a:off x="0" y="0"/>
+          <a:ext cx="0" cy="0"/>
+          <a:chOff x="0" y="0"/>
+          <a:chExt cx="0" cy="0"/>
+        </a:xfrm>
+      </p:grpSpPr>
+      <p:sp>
+        <p:nvSpPr>
+          <p:cNvPr id="2" name="Slide Image Placeholder 1"/>
+          <p:cNvSpPr>
+            <a:spLocks noGrp="1" noRot="1" noChangeAspect="1"/>
+          </p:cNvSpPr>
+          <p:nvPr>
+            <p:ph type="sldImg"/>
+          </p:nvPr>
+        </p:nvSpPr>
+        <p:spPr/>
+      </p:sp>
+      <p:sp>
+        <p:nvSpPr>
+          <p:cNvPr id="3" name="Notes Placeholder 2"/>
+          <p:cNvSpPr>
+            <a:spLocks noGrp="1"/>
+          </p:cNvSpPr>
+          <p:nvPr>
+            <p:ph type="body" idx="1"/>
+          </p:nvPr>
+        </p:nvSpPr>
+        <p:spPr/>
+        <p:txBody>
+          <a:bodyPr/>
+          <a:lstStyle/>
+          <a:p>
+            <a:r>
+              <a:rPr lang="en-US" dirty="0"/>
+              <a:t>Alex M</a:t>
+            </a:r>
+          </a:p>
+        </p:txBody>
+      </p:sp>
+      <p:sp>
+        <p:nvSpPr>
+          <p:cNvPr id="4" name="Slide Number Placeholder 3"/>
+          <p:cNvSpPr>
+            <a:spLocks noGrp="1"/>
+          </p:cNvSpPr>
+          <p:nvPr>
+            <p:ph type="sldNum" sz="quarter" idx="5"/>
+          </p:nvPr>
+        </p:nvSpPr>
+        <p:spPr/>
+        <p:txBody>
+          <a:bodyPr/>
+          <a:lstStyle/>
+          <a:p>
+            <a:fld id="{7908473F-620A-46E7-939F-1AD0939B3342}" type="slidenum">
+              <a:rPr lang="en-US" smtClean="0"/>
+              <a:t>10</a:t>
+            </a:fld>
+            <a:endParaRPr lang="en-US"/>
+          </a:p>
+        </p:txBody>
+      </p:sp>
+    </p:spTree>
+    <p:extLst>
+      <p:ext uri="{BB962C8B-B14F-4D97-AF65-F5344CB8AC3E}">
+        <p14:creationId xmlns:p14="http://schemas.microsoft.com/office/powerpoint/2010/main" val="1949708796"/>
+      </p:ext>
+    </p:extLst>
+  </p:cSld>
+  <p:clrMapOvr>
+    <a:masterClrMapping/>
+  </p:clrMapOvr>
+</p:notes>
+</file>
+
+<file path=ppt/notesSlides/notesSlide11.xml><?xml version="1.0" encoding="utf-8"?>
 <p:notes xmlns:a="http://schemas.openxmlformats.org/drawingml/2006/main" xmlns:r="http://schemas.openxmlformats.org/officeDocument/2006/relationships" xmlns:p="http://schemas.openxmlformats.org/presentationml/2006/main">
   <p:cSld>
     <p:spTree>
@@ -5716,95 +5791,18 @@
           <a:lstStyle/>
           <a:p>
             <a:r>
-              <a:rPr lang="en-US" dirty="0" err="1"/>
-              <a:t>AlexM</a:t>
-            </a:r>
-            <a:r>
               <a:rPr lang="en-US" dirty="0"/>
-              <a:t>/ Alex D</a:t>
-            </a:r>
+              <a:t>Alex M</a:t>
+            </a:r>
+          </a:p>
+          <a:p>
+            <a:endParaRPr lang="en-US" dirty="0"/>
           </a:p>
           <a:p>
             <a:r>
               <a:rPr lang="en-US" dirty="0"/>
-              <a:t>Bigger is better! </a:t>
-            </a:r>
-          </a:p>
-          <a:p>
-            <a:pPr lvl="1"/>
-            <a:r>
-              <a:rPr lang="en-US" dirty="0"/>
-              <a:t>The larger a property’s square footage, the more a house will sell for</a:t>
-            </a:r>
-          </a:p>
-          <a:p>
-            <a:r>
-              <a:rPr lang="en-US" dirty="0"/>
-              <a:t>… but More isn’t necessarily</a:t>
-            </a:r>
-          </a:p>
-          <a:p>
-            <a:pPr lvl="1"/>
-            <a:r>
-              <a:rPr lang="en-US" dirty="0"/>
-              <a:t>More bedrooms will bring down the price of a house</a:t>
-            </a:r>
-          </a:p>
-          <a:p>
-            <a:r>
-              <a:rPr lang="en-US" dirty="0"/>
-              <a:t>Location! Location! Location! </a:t>
-            </a:r>
-          </a:p>
-          <a:p>
-            <a:pPr lvl="1"/>
-            <a:r>
-              <a:rPr lang="en-US" dirty="0"/>
-              <a:t>A house located close to points of interest (schools, hospitals, </a:t>
-            </a:r>
-            <a:r>
-              <a:rPr lang="en-US" dirty="0" err="1"/>
-              <a:t>etc</a:t>
-            </a:r>
-            <a:r>
-              <a:rPr lang="en-US" dirty="0"/>
-              <a:t>) will sell for more</a:t>
-            </a:r>
-          </a:p>
-          <a:p>
-            <a:pPr lvl="1"/>
-            <a:r>
-              <a:rPr lang="en-US" dirty="0"/>
-              <a:t>A house with a good view  will sell for more</a:t>
-            </a:r>
-          </a:p>
-          <a:p>
-            <a:pPr lvl="1"/>
-            <a:r>
-              <a:rPr lang="en-US" dirty="0"/>
-              <a:t>Sqftg_living15 – the bigger the houses around you, the price goes up</a:t>
-            </a:r>
-          </a:p>
-          <a:p>
-            <a:r>
-              <a:rPr lang="en-US" dirty="0"/>
-              <a:t>Grades count!</a:t>
-            </a:r>
-          </a:p>
-          <a:p>
-            <a:r>
-              <a:rPr lang="en-US" dirty="0"/>
-              <a:t>            Grade 9,10,11 – Better, Very Good. Excellent =&gt; increase in price if house in this cat</a:t>
-            </a:r>
-          </a:p>
-          <a:p>
-            <a:r>
-              <a:rPr lang="en-US" dirty="0"/>
-              <a:t>	Condition – Good, Very Good =&gt; Increase in price if house in this cat, </a:t>
-            </a:r>
-          </a:p>
-          <a:p>
-            <a:endParaRPr lang="en-US" dirty="0"/>
+              <a:t>Alex D</a:t>
+            </a:r>
           </a:p>
         </p:txBody>
       </p:sp>
@@ -5825,7 +5823,7 @@
           <a:p>
             <a:fld id="{7908473F-620A-46E7-939F-1AD0939B3342}" type="slidenum">
               <a:rPr lang="en-US" smtClean="0"/>
-              <a:t>3</a:t>
+              <a:t>2</a:t>
             </a:fld>
             <a:endParaRPr lang="en-US"/>
           </a:p>
@@ -5834,7 +5832,7 @@
     </p:spTree>
     <p:extLst>
       <p:ext uri="{BB962C8B-B14F-4D97-AF65-F5344CB8AC3E}">
-        <p14:creationId xmlns:p14="http://schemas.microsoft.com/office/powerpoint/2010/main" val="1072579159"/>
+        <p14:creationId xmlns:p14="http://schemas.microsoft.com/office/powerpoint/2010/main" val="2952180285"/>
       </p:ext>
     </p:extLst>
   </p:cSld>
@@ -5889,9 +5887,95 @@
           <a:lstStyle/>
           <a:p>
             <a:r>
+              <a:rPr lang="en-US" dirty="0" err="1"/>
+              <a:t>AlexM</a:t>
+            </a:r>
+            <a:r>
               <a:rPr lang="en-US" dirty="0"/>
-              <a:t>Alex M/Alex D</a:t>
-            </a:r>
+              <a:t>/ Alex D</a:t>
+            </a:r>
+          </a:p>
+          <a:p>
+            <a:r>
+              <a:rPr lang="en-US" dirty="0"/>
+              <a:t>Bigger is better! </a:t>
+            </a:r>
+          </a:p>
+          <a:p>
+            <a:pPr lvl="1"/>
+            <a:r>
+              <a:rPr lang="en-US" dirty="0"/>
+              <a:t>The larger a property’s square footage, the more a house will sell for</a:t>
+            </a:r>
+          </a:p>
+          <a:p>
+            <a:r>
+              <a:rPr lang="en-US" dirty="0"/>
+              <a:t>… but More isn’t necessarily</a:t>
+            </a:r>
+          </a:p>
+          <a:p>
+            <a:pPr lvl="1"/>
+            <a:r>
+              <a:rPr lang="en-US" dirty="0"/>
+              <a:t>More bedrooms will bring down the price of a house</a:t>
+            </a:r>
+          </a:p>
+          <a:p>
+            <a:r>
+              <a:rPr lang="en-US" dirty="0"/>
+              <a:t>Location! Location! Location! </a:t>
+            </a:r>
+          </a:p>
+          <a:p>
+            <a:pPr lvl="1"/>
+            <a:r>
+              <a:rPr lang="en-US" dirty="0"/>
+              <a:t>A house located close to points of interest (schools, hospitals, </a:t>
+            </a:r>
+            <a:r>
+              <a:rPr lang="en-US" dirty="0" err="1"/>
+              <a:t>etc</a:t>
+            </a:r>
+            <a:r>
+              <a:rPr lang="en-US" dirty="0"/>
+              <a:t>) will sell for more</a:t>
+            </a:r>
+          </a:p>
+          <a:p>
+            <a:pPr lvl="1"/>
+            <a:r>
+              <a:rPr lang="en-US" dirty="0"/>
+              <a:t>A house with a good view  will sell for more</a:t>
+            </a:r>
+          </a:p>
+          <a:p>
+            <a:pPr lvl="1"/>
+            <a:r>
+              <a:rPr lang="en-US" dirty="0"/>
+              <a:t>Sqftg_living15 – the bigger the houses around you, the price goes up</a:t>
+            </a:r>
+          </a:p>
+          <a:p>
+            <a:r>
+              <a:rPr lang="en-US" dirty="0"/>
+              <a:t>Grades count!</a:t>
+            </a:r>
+          </a:p>
+          <a:p>
+            <a:r>
+              <a:rPr lang="en-US" dirty="0"/>
+              <a:t>            Grade 9,10,11 – Better, Very Good. Excellent =&gt; increase in price if house in this cat</a:t>
+            </a:r>
+          </a:p>
+          <a:p>
+            <a:r>
+              <a:rPr lang="en-US" dirty="0"/>
+              <a:t>	Condition – Good, Very Good =&gt; Increase in price if house in this cat, </a:t>
+            </a:r>
+          </a:p>
+          <a:p>
+            <a:endParaRPr lang="en-US" dirty="0"/>
           </a:p>
         </p:txBody>
       </p:sp>
@@ -5912,7 +5996,7 @@
           <a:p>
             <a:fld id="{7908473F-620A-46E7-939F-1AD0939B3342}" type="slidenum">
               <a:rPr lang="en-US" smtClean="0"/>
-              <a:t>4</a:t>
+              <a:t>3</a:t>
             </a:fld>
             <a:endParaRPr lang="en-US"/>
           </a:p>
@@ -5921,7 +6005,7 @@
     </p:spTree>
     <p:extLst>
       <p:ext uri="{BB962C8B-B14F-4D97-AF65-F5344CB8AC3E}">
-        <p14:creationId xmlns:p14="http://schemas.microsoft.com/office/powerpoint/2010/main" val="2293795253"/>
+        <p14:creationId xmlns:p14="http://schemas.microsoft.com/office/powerpoint/2010/main" val="1072579159"/>
       </p:ext>
     </p:extLst>
   </p:cSld>
@@ -5977,7 +6061,7 @@
           <a:p>
             <a:r>
               <a:rPr lang="en-US" dirty="0"/>
-              <a:t>Scott S</a:t>
+              <a:t>Alex M/Alex D</a:t>
             </a:r>
           </a:p>
         </p:txBody>
@@ -5999,7 +6083,7 @@
           <a:p>
             <a:fld id="{7908473F-620A-46E7-939F-1AD0939B3342}" type="slidenum">
               <a:rPr lang="en-US" smtClean="0"/>
-              <a:t>5</a:t>
+              <a:t>4</a:t>
             </a:fld>
             <a:endParaRPr lang="en-US"/>
           </a:p>
@@ -6008,7 +6092,7 @@
     </p:spTree>
     <p:extLst>
       <p:ext uri="{BB962C8B-B14F-4D97-AF65-F5344CB8AC3E}">
-        <p14:creationId xmlns:p14="http://schemas.microsoft.com/office/powerpoint/2010/main" val="214429018"/>
+        <p14:creationId xmlns:p14="http://schemas.microsoft.com/office/powerpoint/2010/main" val="2293795253"/>
       </p:ext>
     </p:extLst>
   </p:cSld>
@@ -6064,13 +6148,7 @@
           <a:p>
             <a:r>
               <a:rPr lang="en-US" dirty="0"/>
-              <a:t>Alex M</a:t>
-            </a:r>
-          </a:p>
-          <a:p>
-            <a:r>
-              <a:rPr lang="en-US" dirty="0"/>
-              <a:t>Engineering the feature, confirming viability </a:t>
+              <a:t>Scott S</a:t>
             </a:r>
           </a:p>
         </p:txBody>
@@ -6092,7 +6170,7 @@
           <a:p>
             <a:fld id="{7908473F-620A-46E7-939F-1AD0939B3342}" type="slidenum">
               <a:rPr lang="en-US" smtClean="0"/>
-              <a:t>6</a:t>
+              <a:t>5</a:t>
             </a:fld>
             <a:endParaRPr lang="en-US"/>
           </a:p>
@@ -6101,7 +6179,7 @@
     </p:spTree>
     <p:extLst>
       <p:ext uri="{BB962C8B-B14F-4D97-AF65-F5344CB8AC3E}">
-        <p14:creationId xmlns:p14="http://schemas.microsoft.com/office/powerpoint/2010/main" val="1747988218"/>
+        <p14:creationId xmlns:p14="http://schemas.microsoft.com/office/powerpoint/2010/main" val="214429018"/>
       </p:ext>
     </p:extLst>
   </p:cSld>
@@ -6157,7 +6235,7 @@
           <a:p>
             <a:r>
               <a:rPr lang="en-US" dirty="0"/>
-              <a:t>Scott S</a:t>
+              <a:t>Alex M</a:t>
             </a:r>
           </a:p>
           <a:p>
@@ -6185,7 +6263,7 @@
           <a:p>
             <a:fld id="{7908473F-620A-46E7-939F-1AD0939B3342}" type="slidenum">
               <a:rPr lang="en-US" smtClean="0"/>
-              <a:t>7</a:t>
+              <a:t>6</a:t>
             </a:fld>
             <a:endParaRPr lang="en-US"/>
           </a:p>
@@ -6194,7 +6272,7 @@
     </p:spTree>
     <p:extLst>
       <p:ext uri="{BB962C8B-B14F-4D97-AF65-F5344CB8AC3E}">
-        <p14:creationId xmlns:p14="http://schemas.microsoft.com/office/powerpoint/2010/main" val="750104532"/>
+        <p14:creationId xmlns:p14="http://schemas.microsoft.com/office/powerpoint/2010/main" val="1747988218"/>
       </p:ext>
     </p:extLst>
   </p:cSld>
@@ -6253,6 +6331,12 @@
               <a:t>Scott S</a:t>
             </a:r>
           </a:p>
+          <a:p>
+            <a:r>
+              <a:rPr lang="en-US" dirty="0"/>
+              <a:t>Engineering the feature, confirming viability </a:t>
+            </a:r>
+          </a:p>
         </p:txBody>
       </p:sp>
       <p:sp>
@@ -6272,7 +6356,7 @@
           <a:p>
             <a:fld id="{7908473F-620A-46E7-939F-1AD0939B3342}" type="slidenum">
               <a:rPr lang="en-US" smtClean="0"/>
-              <a:t>8</a:t>
+              <a:t>7</a:t>
             </a:fld>
             <a:endParaRPr lang="en-US"/>
           </a:p>
@@ -6281,7 +6365,7 @@
     </p:spTree>
     <p:extLst>
       <p:ext uri="{BB962C8B-B14F-4D97-AF65-F5344CB8AC3E}">
-        <p14:creationId xmlns:p14="http://schemas.microsoft.com/office/powerpoint/2010/main" val="1355775321"/>
+        <p14:creationId xmlns:p14="http://schemas.microsoft.com/office/powerpoint/2010/main" val="750104532"/>
       </p:ext>
     </p:extLst>
   </p:cSld>
@@ -6359,7 +6443,7 @@
           <a:p>
             <a:fld id="{7908473F-620A-46E7-939F-1AD0939B3342}" type="slidenum">
               <a:rPr lang="en-US" smtClean="0"/>
-              <a:t>9</a:t>
+              <a:t>8</a:t>
             </a:fld>
             <a:endParaRPr lang="en-US"/>
           </a:p>
@@ -6368,7 +6452,7 @@
     </p:spTree>
     <p:extLst>
       <p:ext uri="{BB962C8B-B14F-4D97-AF65-F5344CB8AC3E}">
-        <p14:creationId xmlns:p14="http://schemas.microsoft.com/office/powerpoint/2010/main" val="450208951"/>
+        <p14:creationId xmlns:p14="http://schemas.microsoft.com/office/powerpoint/2010/main" val="1355775321"/>
       </p:ext>
     </p:extLst>
   </p:cSld>
@@ -6424,7 +6508,7 @@
           <a:p>
             <a:r>
               <a:rPr lang="en-US" dirty="0"/>
-              <a:t>Alex M</a:t>
+              <a:t>Scott S</a:t>
             </a:r>
           </a:p>
         </p:txBody>
@@ -6446,7 +6530,7 @@
           <a:p>
             <a:fld id="{7908473F-620A-46E7-939F-1AD0939B3342}" type="slidenum">
               <a:rPr lang="en-US" smtClean="0"/>
-              <a:t>10</a:t>
+              <a:t>9</a:t>
             </a:fld>
             <a:endParaRPr lang="en-US"/>
           </a:p>
@@ -6455,7 +6539,7 @@
     </p:spTree>
     <p:extLst>
       <p:ext uri="{BB962C8B-B14F-4D97-AF65-F5344CB8AC3E}">
-        <p14:creationId xmlns:p14="http://schemas.microsoft.com/office/powerpoint/2010/main" val="1949708796"/>
+        <p14:creationId xmlns:p14="http://schemas.microsoft.com/office/powerpoint/2010/main" val="450208951"/>
       </p:ext>
     </p:extLst>
   </p:cSld>
@@ -6614,7 +6698,7 @@
           <a:p>
             <a:fld id="{3C2B07E4-CDF9-4C88-A2F3-04620E58224D}" type="datetimeFigureOut">
               <a:rPr lang="en-US" smtClean="0"/>
-              <a:t>10/7/2021</a:t>
+              <a:t>10/8/2021</a:t>
             </a:fld>
             <a:endParaRPr lang="en-US"/>
           </a:p>
@@ -6904,7 +6988,7 @@
           <a:p>
             <a:fld id="{3C2B07E4-CDF9-4C88-A2F3-04620E58224D}" type="datetimeFigureOut">
               <a:rPr lang="en-US" smtClean="0"/>
-              <a:t>10/7/2021</a:t>
+              <a:t>10/8/2021</a:t>
             </a:fld>
             <a:endParaRPr lang="en-US"/>
           </a:p>
@@ -7156,7 +7240,7 @@
           <a:p>
             <a:fld id="{3C2B07E4-CDF9-4C88-A2F3-04620E58224D}" type="datetimeFigureOut">
               <a:rPr lang="en-US" smtClean="0"/>
-              <a:t>10/7/2021</a:t>
+              <a:t>10/8/2021</a:t>
             </a:fld>
             <a:endParaRPr lang="en-US"/>
           </a:p>
@@ -7408,7 +7492,7 @@
           <a:p>
             <a:fld id="{3C2B07E4-CDF9-4C88-A2F3-04620E58224D}" type="datetimeFigureOut">
               <a:rPr lang="en-US" smtClean="0"/>
-              <a:t>10/7/2021</a:t>
+              <a:t>10/8/2021</a:t>
             </a:fld>
             <a:endParaRPr lang="en-US"/>
           </a:p>
@@ -7737,7 +7821,7 @@
           <a:p>
             <a:fld id="{3C2B07E4-CDF9-4C88-A2F3-04620E58224D}" type="datetimeFigureOut">
               <a:rPr lang="en-US" smtClean="0"/>
-              <a:t>10/7/2021</a:t>
+              <a:t>10/8/2021</a:t>
             </a:fld>
             <a:endParaRPr lang="en-US"/>
           </a:p>
@@ -8087,7 +8171,7 @@
           <a:p>
             <a:fld id="{3C2B07E4-CDF9-4C88-A2F3-04620E58224D}" type="datetimeFigureOut">
               <a:rPr lang="en-US" smtClean="0"/>
-              <a:t>10/7/2021</a:t>
+              <a:t>10/8/2021</a:t>
             </a:fld>
             <a:endParaRPr lang="en-US"/>
           </a:p>
@@ -8599,7 +8683,7 @@
           <a:p>
             <a:fld id="{3C2B07E4-CDF9-4C88-A2F3-04620E58224D}" type="datetimeFigureOut">
               <a:rPr lang="en-US" smtClean="0"/>
-              <a:t>10/7/2021</a:t>
+              <a:t>10/8/2021</a:t>
             </a:fld>
             <a:endParaRPr lang="en-US"/>
           </a:p>
@@ -8927,7 +9011,7 @@
           <a:p>
             <a:fld id="{3C2B07E4-CDF9-4C88-A2F3-04620E58224D}" type="datetimeFigureOut">
               <a:rPr lang="en-US" smtClean="0"/>
-              <a:t>10/7/2021</a:t>
+              <a:t>10/8/2021</a:t>
             </a:fld>
             <a:endParaRPr lang="en-US"/>
           </a:p>
@@ -9040,7 +9124,7 @@
           <a:p>
             <a:fld id="{3C2B07E4-CDF9-4C88-A2F3-04620E58224D}" type="datetimeFigureOut">
               <a:rPr lang="en-US" smtClean="0"/>
-              <a:t>10/7/2021</a:t>
+              <a:t>10/8/2021</a:t>
             </a:fld>
             <a:endParaRPr lang="en-US"/>
           </a:p>
@@ -9381,7 +9465,7 @@
           <a:p>
             <a:fld id="{3C2B07E4-CDF9-4C88-A2F3-04620E58224D}" type="datetimeFigureOut">
               <a:rPr lang="en-US" smtClean="0"/>
-              <a:t>10/7/2021</a:t>
+              <a:t>10/8/2021</a:t>
             </a:fld>
             <a:endParaRPr lang="en-US"/>
           </a:p>
@@ -9681,7 +9765,7 @@
           <a:p>
             <a:fld id="{3C2B07E4-CDF9-4C88-A2F3-04620E58224D}" type="datetimeFigureOut">
               <a:rPr lang="en-US" smtClean="0"/>
-              <a:t>10/7/2021</a:t>
+              <a:t>10/8/2021</a:t>
             </a:fld>
             <a:endParaRPr lang="en-US"/>
           </a:p>
@@ -9921,7 +10005,7 @@
             <a:fld id="{3C2B07E4-CDF9-4C88-A2F3-04620E58224D}" type="datetimeFigureOut">
               <a:rPr lang="en-US" smtClean="0"/>
               <a:pPr/>
-              <a:t>10/7/2021</a:t>
+              <a:t>10/8/2021</a:t>
             </a:fld>
             <a:endParaRPr lang="en-US" dirty="0"/>
           </a:p>
@@ -10432,7 +10516,7 @@
           <p:nvPr/>
         </p:nvPicPr>
         <p:blipFill rotWithShape="1">
-          <a:blip r:embed="rId2">
+          <a:blip r:embed="rId3">
             <a:alphaModFix amt="50000"/>
           </a:blip>
           <a:srcRect l="5533" r="5579"/>
@@ -10440,7 +10524,7 @@
         </p:blipFill>
         <p:spPr>
           <a:xfrm>
-            <a:off x="20" y="10"/>
+            <a:off x="0" y="10"/>
             <a:ext cx="12191980" cy="6857990"/>
           </a:xfrm>
           <a:prstGeom prst="rect">
@@ -10466,7 +10550,7 @@
         </p:nvSpPr>
         <p:spPr>
           <a:xfrm>
-            <a:off x="1429612" y="1013984"/>
+            <a:off x="1429612" y="524051"/>
             <a:ext cx="6952388" cy="3260635"/>
           </a:xfrm>
         </p:spPr>
@@ -10477,7 +10561,7 @@
           <a:lstStyle/>
           <a:p>
             <a:r>
-              <a:rPr lang="en-US" dirty="0">
+              <a:rPr lang="en-US" sz="4800" dirty="0">
                 <a:solidFill>
                   <a:srgbClr val="FFFFFF"/>
                 </a:solidFill>
@@ -10505,13 +10589,13 @@
         </p:nvSpPr>
         <p:spPr>
           <a:xfrm>
-            <a:off x="1429612" y="4848464"/>
+            <a:off x="1429612" y="4632448"/>
             <a:ext cx="7714388" cy="1085849"/>
           </a:xfrm>
         </p:spPr>
         <p:txBody>
           <a:bodyPr>
-            <a:normAutofit fontScale="47500" lnSpcReduction="20000"/>
+            <a:noAutofit/>
           </a:bodyPr>
           <a:lstStyle/>
           <a:p>
@@ -10669,7 +10753,7 @@
             <p:nvPr/>
           </p:nvPicPr>
           <p:blipFill>
-            <a:blip r:embed="rId3">
+            <a:blip r:embed="rId4">
               <a:extLst>
                 <a:ext uri="{28A0092B-C50C-407E-A947-70E740481C1C}">
                   <a14:useLocalDpi xmlns:a14="http://schemas.microsoft.com/office/drawing/2010/main" val="0"/>

</xml_diff>